<commit_message>
sudah sangat baik penerapan notfound di 2 zona, yaitu zona public, dan zona login
</commit_message>
<xml_diff>
--- a/perlengkapan/Prototype peminjaman alat.pptx
+++ b/perlengkapan/Prototype peminjaman alat.pptx
@@ -5,17 +5,18 @@
     <p:sldMasterId id="2147483648" r:id="rId1"/>
   </p:sldMasterIdLst>
   <p:notesMasterIdLst>
-    <p:notesMasterId r:id="rId10"/>
+    <p:notesMasterId r:id="rId11"/>
   </p:notesMasterIdLst>
   <p:sldIdLst>
     <p:sldId id="303" r:id="rId2"/>
-    <p:sldId id="273" r:id="rId3"/>
-    <p:sldId id="301" r:id="rId4"/>
-    <p:sldId id="300" r:id="rId5"/>
-    <p:sldId id="299" r:id="rId6"/>
-    <p:sldId id="271" r:id="rId7"/>
-    <p:sldId id="263" r:id="rId8"/>
-    <p:sldId id="302" r:id="rId9"/>
+    <p:sldId id="304" r:id="rId3"/>
+    <p:sldId id="273" r:id="rId4"/>
+    <p:sldId id="301" r:id="rId5"/>
+    <p:sldId id="300" r:id="rId6"/>
+    <p:sldId id="299" r:id="rId7"/>
+    <p:sldId id="271" r:id="rId8"/>
+    <p:sldId id="263" r:id="rId9"/>
+    <p:sldId id="302" r:id="rId10"/>
   </p:sldIdLst>
   <p:sldSz cx="12192000" cy="6858000"/>
   <p:notesSz cx="6858000" cy="9144000"/>
@@ -536,7 +537,7 @@
           <a:p>
             <a:fld id="{70E1CBBE-7A89-4A0C-BDED-306C13EFE26F}" type="slidenum">
               <a:rPr lang="en-US" smtClean="0"/>
-              <a:t>7</a:t>
+              <a:t>8</a:t>
             </a:fld>
             <a:endParaRPr lang="en-US"/>
           </a:p>
@@ -620,7 +621,7 @@
           <a:p>
             <a:fld id="{70E1CBBE-7A89-4A0C-BDED-306C13EFE26F}" type="slidenum">
               <a:rPr lang="en-US" smtClean="0"/>
-              <a:t>8</a:t>
+              <a:t>9</a:t>
             </a:fld>
             <a:endParaRPr lang="en-US"/>
           </a:p>
@@ -4074,10 +4075,10 @@
       </p:grpSpPr>
       <p:pic>
         <p:nvPicPr>
-          <p:cNvPr id="12" name="Picture 11">
-            <a:extLst>
-              <a:ext uri="{FF2B5EF4-FFF2-40B4-BE49-F238E27FC236}">
-                <a16:creationId xmlns:a16="http://schemas.microsoft.com/office/drawing/2014/main" id="{6876EEC1-F8E0-45ED-7D8B-25D7330C5DD7}"/>
+          <p:cNvPr id="6" name="Picture 5">
+            <a:extLst>
+              <a:ext uri="{FF2B5EF4-FFF2-40B4-BE49-F238E27FC236}">
+                <a16:creationId xmlns:a16="http://schemas.microsoft.com/office/drawing/2014/main" id="{473584C1-7503-2711-B293-C3A49DFDEAAE}"/>
               </a:ext>
             </a:extLst>
           </p:cNvPr>
@@ -4094,8 +4095,8 @@
         </p:blipFill>
         <p:spPr>
           <a:xfrm>
-            <a:off x="0" y="1050164"/>
-            <a:ext cx="12192000" cy="5001512"/>
+            <a:off x="6882384" y="1489568"/>
+            <a:ext cx="4198984" cy="3337849"/>
           </a:xfrm>
           <a:prstGeom prst="rect">
             <a:avLst/>
@@ -4104,10 +4105,10 @@
       </p:pic>
       <p:sp>
         <p:nvSpPr>
-          <p:cNvPr id="8" name="Rectangle 7">
-            <a:extLst>
-              <a:ext uri="{FF2B5EF4-FFF2-40B4-BE49-F238E27FC236}">
-                <a16:creationId xmlns:a16="http://schemas.microsoft.com/office/drawing/2014/main" id="{59FD0BE4-7AFA-2695-C147-E637E0B5B500}"/>
+          <p:cNvPr id="11" name="Rectangle 10">
+            <a:extLst>
+              <a:ext uri="{FF2B5EF4-FFF2-40B4-BE49-F238E27FC236}">
+                <a16:creationId xmlns:a16="http://schemas.microsoft.com/office/drawing/2014/main" id="{23691AEF-75E1-68DF-79B0-CCAC7194F27E}"/>
               </a:ext>
             </a:extLst>
           </p:cNvPr>
@@ -4116,14 +4117,14 @@
         </p:nvSpPr>
         <p:spPr>
           <a:xfrm>
-            <a:off x="8164945" y="3484416"/>
-            <a:ext cx="1487055" cy="200891"/>
+            <a:off x="6998573" y="1489568"/>
+            <a:ext cx="3966607" cy="667931"/>
           </a:xfrm>
           <a:prstGeom prst="rect">
             <a:avLst/>
           </a:prstGeom>
           <a:solidFill>
-            <a:srgbClr val="FFC000"/>
+            <a:srgbClr val="0070C0"/>
           </a:solidFill>
           <a:ln>
             <a:noFill/>
@@ -4149,85 +4150,68 @@
           <a:bodyPr rtlCol="0" anchor="ctr"/>
           <a:lstStyle/>
           <a:p>
-            <a:r>
-              <a:rPr lang="en-US" sz="1100" b="1">
+            <a:pPr algn="ctr"/>
+            <a:r>
+              <a:rPr lang="en-US" sz="2400" b="1">
                 <a:solidFill>
-                  <a:sysClr val="windowText" lastClr="000000"/>
+                  <a:schemeClr val="bg1"/>
                 </a:solidFill>
               </a:rPr>
-              <a:t>Denda jika terlambat</a:t>
-            </a:r>
-          </a:p>
-        </p:txBody>
-      </p:sp>
-      <p:sp>
-        <p:nvSpPr>
-          <p:cNvPr id="10" name="Rectangle 9">
-            <a:extLst>
-              <a:ext uri="{FF2B5EF4-FFF2-40B4-BE49-F238E27FC236}">
-                <a16:creationId xmlns:a16="http://schemas.microsoft.com/office/drawing/2014/main" id="{DC5A2866-AACA-B673-8255-E02CDB948F48}"/>
-              </a:ext>
-            </a:extLst>
-          </p:cNvPr>
-          <p:cNvSpPr/>
+              <a:t>Login User</a:t>
+            </a:r>
+          </a:p>
+          <a:p>
+            <a:pPr algn="ctr"/>
+            <a:r>
+              <a:rPr lang="en-US" sz="1400">
+                <a:solidFill>
+                  <a:schemeClr val="bg1"/>
+                </a:solidFill>
+              </a:rPr>
+              <a:t>(admin / petugas)</a:t>
+            </a:r>
+            <a:endParaRPr lang="en-US" sz="2000">
+              <a:solidFill>
+                <a:schemeClr val="bg1"/>
+              </a:solidFill>
+            </a:endParaRPr>
+          </a:p>
+        </p:txBody>
+      </p:sp>
+      <p:pic>
+        <p:nvPicPr>
+          <p:cNvPr id="3" name="Picture 2">
+            <a:extLst>
+              <a:ext uri="{FF2B5EF4-FFF2-40B4-BE49-F238E27FC236}">
+                <a16:creationId xmlns:a16="http://schemas.microsoft.com/office/drawing/2014/main" id="{07006EC8-A697-F0EA-CDF9-CF4AE91E500D}"/>
+              </a:ext>
+            </a:extLst>
+          </p:cNvPr>
+          <p:cNvPicPr>
+            <a:picLocks noChangeAspect="1"/>
+          </p:cNvPicPr>
           <p:nvPr/>
-        </p:nvSpPr>
-        <p:spPr>
-          <a:xfrm>
-            <a:off x="8164944" y="3752273"/>
-            <a:ext cx="3833092" cy="311727"/>
+        </p:nvPicPr>
+        <p:blipFill>
+          <a:blip r:embed="rId2"/>
+          <a:stretch>
+            <a:fillRect/>
+          </a:stretch>
+        </p:blipFill>
+        <p:spPr>
+          <a:xfrm>
+            <a:off x="985453" y="1489568"/>
+            <a:ext cx="4198984" cy="3337849"/>
           </a:xfrm>
           <a:prstGeom prst="rect">
             <a:avLst/>
           </a:prstGeom>
-          <a:solidFill>
-            <a:schemeClr val="tx2">
-              <a:lumMod val="20000"/>
-              <a:lumOff val="80000"/>
-            </a:schemeClr>
-          </a:solidFill>
-          <a:ln>
-            <a:noFill/>
-          </a:ln>
-        </p:spPr>
-        <p:style>
-          <a:lnRef idx="2">
-            <a:schemeClr val="accent1">
-              <a:shade val="15000"/>
-            </a:schemeClr>
-          </a:lnRef>
-          <a:fillRef idx="1">
-            <a:schemeClr val="accent1"/>
-          </a:fillRef>
-          <a:effectRef idx="0">
-            <a:schemeClr val="accent1"/>
-          </a:effectRef>
-          <a:fontRef idx="minor">
-            <a:schemeClr val="lt1"/>
-          </a:fontRef>
-        </p:style>
-        <p:txBody>
-          <a:bodyPr rtlCol="0" anchor="ctr"/>
-          <a:lstStyle/>
-          <a:p>
-            <a:r>
-              <a:rPr lang="en-US" sz="1100" b="1">
-                <a:solidFill>
-                  <a:schemeClr val="tx1">
-                    <a:lumMod val="50000"/>
-                    <a:lumOff val="50000"/>
-                  </a:schemeClr>
-                </a:solidFill>
-              </a:rPr>
-              <a:t>Rp 1000, - per hari</a:t>
-            </a:r>
-          </a:p>
-        </p:txBody>
-      </p:sp>
+        </p:spPr>
+      </p:pic>
     </p:spTree>
     <p:extLst>
       <p:ext uri="{BB962C8B-B14F-4D97-AF65-F5344CB8AC3E}">
-        <p14:creationId xmlns:p14="http://schemas.microsoft.com/office/powerpoint/2010/main" val="697332089"/>
+        <p14:creationId xmlns:p14="http://schemas.microsoft.com/office/powerpoint/2010/main" val="521380036"/>
       </p:ext>
     </p:extLst>
   </p:cSld>
@@ -4262,10 +4246,10 @@
       </p:grpSpPr>
       <p:pic>
         <p:nvPicPr>
-          <p:cNvPr id="3" name="Picture 2">
-            <a:extLst>
-              <a:ext uri="{FF2B5EF4-FFF2-40B4-BE49-F238E27FC236}">
-                <a16:creationId xmlns:a16="http://schemas.microsoft.com/office/drawing/2014/main" id="{E616BB34-1EE0-AAB0-1A24-48F30F896989}"/>
+          <p:cNvPr id="12" name="Picture 11">
+            <a:extLst>
+              <a:ext uri="{FF2B5EF4-FFF2-40B4-BE49-F238E27FC236}">
+                <a16:creationId xmlns:a16="http://schemas.microsoft.com/office/drawing/2014/main" id="{6876EEC1-F8E0-45ED-7D8B-25D7330C5DD7}"/>
               </a:ext>
             </a:extLst>
           </p:cNvPr>
@@ -4282,59 +4266,140 @@
         </p:blipFill>
         <p:spPr>
           <a:xfrm>
-            <a:off x="0" y="887397"/>
-            <a:ext cx="12192000" cy="5083205"/>
+            <a:off x="0" y="1050164"/>
+            <a:ext cx="12192000" cy="5001512"/>
           </a:xfrm>
           <a:prstGeom prst="rect">
             <a:avLst/>
           </a:prstGeom>
         </p:spPr>
       </p:pic>
-      <p:cxnSp>
-        <p:nvCxnSpPr>
-          <p:cNvPr id="7" name="Straight Connector 6">
-            <a:extLst>
-              <a:ext uri="{FF2B5EF4-FFF2-40B4-BE49-F238E27FC236}">
-                <a16:creationId xmlns:a16="http://schemas.microsoft.com/office/drawing/2014/main" id="{ED65703F-4EA9-E602-F9C6-247DD5AEE06E}"/>
-              </a:ext>
-            </a:extLst>
-          </p:cNvPr>
-          <p:cNvCxnSpPr/>
+      <p:sp>
+        <p:nvSpPr>
+          <p:cNvPr id="8" name="Rectangle 7">
+            <a:extLst>
+              <a:ext uri="{FF2B5EF4-FFF2-40B4-BE49-F238E27FC236}">
+                <a16:creationId xmlns:a16="http://schemas.microsoft.com/office/drawing/2014/main" id="{59FD0BE4-7AFA-2695-C147-E637E0B5B500}"/>
+              </a:ext>
+            </a:extLst>
+          </p:cNvPr>
+          <p:cNvSpPr/>
           <p:nvPr/>
-        </p:nvCxnSpPr>
-        <p:spPr>
-          <a:xfrm>
-            <a:off x="83820" y="1409700"/>
-            <a:ext cx="12054840" cy="0"/>
-          </a:xfrm>
-          <a:prstGeom prst="line">
+        </p:nvSpPr>
+        <p:spPr>
+          <a:xfrm>
+            <a:off x="8164945" y="3484416"/>
+            <a:ext cx="1487055" cy="200891"/>
+          </a:xfrm>
+          <a:prstGeom prst="rect">
             <a:avLst/>
           </a:prstGeom>
-          <a:ln w="19050">
-            <a:solidFill>
-              <a:schemeClr val="tx1"/>
-            </a:solidFill>
+          <a:solidFill>
+            <a:srgbClr val="FFC000"/>
+          </a:solidFill>
+          <a:ln>
+            <a:noFill/>
           </a:ln>
         </p:spPr>
         <p:style>
-          <a:lnRef idx="1">
-            <a:schemeClr val="accent1"/>
+          <a:lnRef idx="2">
+            <a:schemeClr val="accent1">
+              <a:shade val="15000"/>
+            </a:schemeClr>
           </a:lnRef>
-          <a:fillRef idx="0">
+          <a:fillRef idx="1">
             <a:schemeClr val="accent1"/>
           </a:fillRef>
           <a:effectRef idx="0">
             <a:schemeClr val="accent1"/>
           </a:effectRef>
           <a:fontRef idx="minor">
-            <a:schemeClr val="tx1"/>
+            <a:schemeClr val="lt1"/>
           </a:fontRef>
         </p:style>
-      </p:cxnSp>
+        <p:txBody>
+          <a:bodyPr rtlCol="0" anchor="ctr"/>
+          <a:lstStyle/>
+          <a:p>
+            <a:r>
+              <a:rPr lang="en-US" sz="1100" b="1">
+                <a:solidFill>
+                  <a:sysClr val="windowText" lastClr="000000"/>
+                </a:solidFill>
+              </a:rPr>
+              <a:t>Denda jika terlambat</a:t>
+            </a:r>
+          </a:p>
+        </p:txBody>
+      </p:sp>
+      <p:sp>
+        <p:nvSpPr>
+          <p:cNvPr id="10" name="Rectangle 9">
+            <a:extLst>
+              <a:ext uri="{FF2B5EF4-FFF2-40B4-BE49-F238E27FC236}">
+                <a16:creationId xmlns:a16="http://schemas.microsoft.com/office/drawing/2014/main" id="{DC5A2866-AACA-B673-8255-E02CDB948F48}"/>
+              </a:ext>
+            </a:extLst>
+          </p:cNvPr>
+          <p:cNvSpPr/>
+          <p:nvPr/>
+        </p:nvSpPr>
+        <p:spPr>
+          <a:xfrm>
+            <a:off x="8164944" y="3752273"/>
+            <a:ext cx="3833092" cy="311727"/>
+          </a:xfrm>
+          <a:prstGeom prst="rect">
+            <a:avLst/>
+          </a:prstGeom>
+          <a:solidFill>
+            <a:schemeClr val="tx2">
+              <a:lumMod val="20000"/>
+              <a:lumOff val="80000"/>
+            </a:schemeClr>
+          </a:solidFill>
+          <a:ln>
+            <a:noFill/>
+          </a:ln>
+        </p:spPr>
+        <p:style>
+          <a:lnRef idx="2">
+            <a:schemeClr val="accent1">
+              <a:shade val="15000"/>
+            </a:schemeClr>
+          </a:lnRef>
+          <a:fillRef idx="1">
+            <a:schemeClr val="accent1"/>
+          </a:fillRef>
+          <a:effectRef idx="0">
+            <a:schemeClr val="accent1"/>
+          </a:effectRef>
+          <a:fontRef idx="minor">
+            <a:schemeClr val="lt1"/>
+          </a:fontRef>
+        </p:style>
+        <p:txBody>
+          <a:bodyPr rtlCol="0" anchor="ctr"/>
+          <a:lstStyle/>
+          <a:p>
+            <a:r>
+              <a:rPr lang="en-US" sz="1100" b="1">
+                <a:solidFill>
+                  <a:schemeClr val="tx1">
+                    <a:lumMod val="50000"/>
+                    <a:lumOff val="50000"/>
+                  </a:schemeClr>
+                </a:solidFill>
+              </a:rPr>
+              <a:t>Rp 1000, - per hari</a:t>
+            </a:r>
+          </a:p>
+        </p:txBody>
+      </p:sp>
     </p:spTree>
     <p:extLst>
       <p:ext uri="{BB962C8B-B14F-4D97-AF65-F5344CB8AC3E}">
-        <p14:creationId xmlns:p14="http://schemas.microsoft.com/office/powerpoint/2010/main" val="1378670042"/>
+        <p14:creationId xmlns:p14="http://schemas.microsoft.com/office/powerpoint/2010/main" val="697332089"/>
       </p:ext>
     </p:extLst>
   </p:cSld>
@@ -4369,10 +4434,10 @@
       </p:grpSpPr>
       <p:pic>
         <p:nvPicPr>
-          <p:cNvPr id="4" name="Picture 3">
-            <a:extLst>
-              <a:ext uri="{FF2B5EF4-FFF2-40B4-BE49-F238E27FC236}">
-                <a16:creationId xmlns:a16="http://schemas.microsoft.com/office/drawing/2014/main" id="{9D34F94F-87EE-81C0-9B11-893F5FE9482C}"/>
+          <p:cNvPr id="3" name="Picture 2">
+            <a:extLst>
+              <a:ext uri="{FF2B5EF4-FFF2-40B4-BE49-F238E27FC236}">
+                <a16:creationId xmlns:a16="http://schemas.microsoft.com/office/drawing/2014/main" id="{E616BB34-1EE0-AAB0-1A24-48F30F896989}"/>
               </a:ext>
             </a:extLst>
           </p:cNvPr>
@@ -4389,78 +4454,59 @@
         </p:blipFill>
         <p:spPr>
           <a:xfrm>
-            <a:off x="0" y="825056"/>
-            <a:ext cx="12192000" cy="5207888"/>
+            <a:off x="0" y="887397"/>
+            <a:ext cx="12192000" cy="5083205"/>
           </a:xfrm>
           <a:prstGeom prst="rect">
             <a:avLst/>
           </a:prstGeom>
         </p:spPr>
       </p:pic>
-      <p:pic>
-        <p:nvPicPr>
-          <p:cNvPr id="8" name="Picture 7">
-            <a:extLst>
-              <a:ext uri="{FF2B5EF4-FFF2-40B4-BE49-F238E27FC236}">
-                <a16:creationId xmlns:a16="http://schemas.microsoft.com/office/drawing/2014/main" id="{EACD1DE6-4685-E01D-FEE8-E1BD8FAF49E0}"/>
-              </a:ext>
-            </a:extLst>
-          </p:cNvPr>
-          <p:cNvPicPr>
-            <a:picLocks noChangeAspect="1"/>
-          </p:cNvPicPr>
+      <p:cxnSp>
+        <p:nvCxnSpPr>
+          <p:cNvPr id="7" name="Straight Connector 6">
+            <a:extLst>
+              <a:ext uri="{FF2B5EF4-FFF2-40B4-BE49-F238E27FC236}">
+                <a16:creationId xmlns:a16="http://schemas.microsoft.com/office/drawing/2014/main" id="{ED65703F-4EA9-E602-F9C6-247DD5AEE06E}"/>
+              </a:ext>
+            </a:extLst>
+          </p:cNvPr>
+          <p:cNvCxnSpPr/>
           <p:nvPr/>
-        </p:nvPicPr>
-        <p:blipFill>
-          <a:blip r:embed="rId3"/>
-          <a:stretch>
-            <a:fillRect/>
-          </a:stretch>
-        </p:blipFill>
-        <p:spPr>
-          <a:xfrm>
-            <a:off x="9094390" y="825056"/>
-            <a:ext cx="1851820" cy="533446"/>
-          </a:xfrm>
-          <a:prstGeom prst="rect">
+        </p:nvCxnSpPr>
+        <p:spPr>
+          <a:xfrm>
+            <a:off x="83820" y="1409700"/>
+            <a:ext cx="12054840" cy="0"/>
+          </a:xfrm>
+          <a:prstGeom prst="line">
             <a:avLst/>
           </a:prstGeom>
-        </p:spPr>
-      </p:pic>
-      <p:pic>
-        <p:nvPicPr>
-          <p:cNvPr id="6" name="Picture 5">
-            <a:extLst>
-              <a:ext uri="{FF2B5EF4-FFF2-40B4-BE49-F238E27FC236}">
-                <a16:creationId xmlns:a16="http://schemas.microsoft.com/office/drawing/2014/main" id="{4B482F57-6F08-0D65-E5E2-5D73F4525E07}"/>
-              </a:ext>
-            </a:extLst>
-          </p:cNvPr>
-          <p:cNvPicPr>
-            <a:picLocks noChangeAspect="1"/>
-          </p:cNvPicPr>
-          <p:nvPr/>
-        </p:nvPicPr>
-        <p:blipFill>
-          <a:blip r:embed="rId4"/>
-          <a:stretch>
-            <a:fillRect/>
-          </a:stretch>
-        </p:blipFill>
-        <p:spPr>
-          <a:xfrm>
-            <a:off x="10891547" y="825056"/>
-            <a:ext cx="995653" cy="975819"/>
-          </a:xfrm>
-          <a:prstGeom prst="rect">
-            <a:avLst/>
-          </a:prstGeom>
-        </p:spPr>
-      </p:pic>
+          <a:ln w="19050">
+            <a:solidFill>
+              <a:schemeClr val="tx1"/>
+            </a:solidFill>
+          </a:ln>
+        </p:spPr>
+        <p:style>
+          <a:lnRef idx="1">
+            <a:schemeClr val="accent1"/>
+          </a:lnRef>
+          <a:fillRef idx="0">
+            <a:schemeClr val="accent1"/>
+          </a:fillRef>
+          <a:effectRef idx="0">
+            <a:schemeClr val="accent1"/>
+          </a:effectRef>
+          <a:fontRef idx="minor">
+            <a:schemeClr val="tx1"/>
+          </a:fontRef>
+        </p:style>
+      </p:cxnSp>
     </p:spTree>
     <p:extLst>
       <p:ext uri="{BB962C8B-B14F-4D97-AF65-F5344CB8AC3E}">
-        <p14:creationId xmlns:p14="http://schemas.microsoft.com/office/powerpoint/2010/main" val="2740473774"/>
+        <p14:creationId xmlns:p14="http://schemas.microsoft.com/office/powerpoint/2010/main" val="1378670042"/>
       </p:ext>
     </p:extLst>
   </p:cSld>
@@ -4495,10 +4541,10 @@
       </p:grpSpPr>
       <p:pic>
         <p:nvPicPr>
-          <p:cNvPr id="3" name="Picture 2">
-            <a:extLst>
-              <a:ext uri="{FF2B5EF4-FFF2-40B4-BE49-F238E27FC236}">
-                <a16:creationId xmlns:a16="http://schemas.microsoft.com/office/drawing/2014/main" id="{B5E4C823-3076-E737-BD9C-9E1E0250C209}"/>
+          <p:cNvPr id="4" name="Picture 3">
+            <a:extLst>
+              <a:ext uri="{FF2B5EF4-FFF2-40B4-BE49-F238E27FC236}">
+                <a16:creationId xmlns:a16="http://schemas.microsoft.com/office/drawing/2014/main" id="{9D34F94F-87EE-81C0-9B11-893F5FE9482C}"/>
               </a:ext>
             </a:extLst>
           </p:cNvPr>
@@ -4515,8 +4561,8 @@
         </p:blipFill>
         <p:spPr>
           <a:xfrm>
-            <a:off x="1834557" y="3690948"/>
-            <a:ext cx="7399788" cy="3028507"/>
+            <a:off x="0" y="825056"/>
+            <a:ext cx="12192000" cy="5207888"/>
           </a:xfrm>
           <a:prstGeom prst="rect">
             <a:avLst/>
@@ -4525,10 +4571,10 @@
       </p:pic>
       <p:pic>
         <p:nvPicPr>
-          <p:cNvPr id="7" name="Picture 6">
-            <a:extLst>
-              <a:ext uri="{FF2B5EF4-FFF2-40B4-BE49-F238E27FC236}">
-                <a16:creationId xmlns:a16="http://schemas.microsoft.com/office/drawing/2014/main" id="{04718C61-7734-8584-62FE-27EAA79A2988}"/>
+          <p:cNvPr id="8" name="Picture 7">
+            <a:extLst>
+              <a:ext uri="{FF2B5EF4-FFF2-40B4-BE49-F238E27FC236}">
+                <a16:creationId xmlns:a16="http://schemas.microsoft.com/office/drawing/2014/main" id="{EACD1DE6-4685-E01D-FEE8-E1BD8FAF49E0}"/>
               </a:ext>
             </a:extLst>
           </p:cNvPr>
@@ -4545,8 +4591,38 @@
         </p:blipFill>
         <p:spPr>
           <a:xfrm>
-            <a:off x="1834557" y="138545"/>
-            <a:ext cx="7161661" cy="3018961"/>
+            <a:off x="9094390" y="825056"/>
+            <a:ext cx="1851820" cy="533446"/>
+          </a:xfrm>
+          <a:prstGeom prst="rect">
+            <a:avLst/>
+          </a:prstGeom>
+        </p:spPr>
+      </p:pic>
+      <p:pic>
+        <p:nvPicPr>
+          <p:cNvPr id="6" name="Picture 5">
+            <a:extLst>
+              <a:ext uri="{FF2B5EF4-FFF2-40B4-BE49-F238E27FC236}">
+                <a16:creationId xmlns:a16="http://schemas.microsoft.com/office/drawing/2014/main" id="{4B482F57-6F08-0D65-E5E2-5D73F4525E07}"/>
+              </a:ext>
+            </a:extLst>
+          </p:cNvPr>
+          <p:cNvPicPr>
+            <a:picLocks noChangeAspect="1"/>
+          </p:cNvPicPr>
+          <p:nvPr/>
+        </p:nvPicPr>
+        <p:blipFill>
+          <a:blip r:embed="rId4"/>
+          <a:stretch>
+            <a:fillRect/>
+          </a:stretch>
+        </p:blipFill>
+        <p:spPr>
+          <a:xfrm>
+            <a:off x="10891547" y="825056"/>
+            <a:ext cx="995653" cy="975819"/>
           </a:xfrm>
           <a:prstGeom prst="rect">
             <a:avLst/>
@@ -4556,7 +4632,7 @@
     </p:spTree>
     <p:extLst>
       <p:ext uri="{BB962C8B-B14F-4D97-AF65-F5344CB8AC3E}">
-        <p14:creationId xmlns:p14="http://schemas.microsoft.com/office/powerpoint/2010/main" val="3691796962"/>
+        <p14:creationId xmlns:p14="http://schemas.microsoft.com/office/powerpoint/2010/main" val="2740473774"/>
       </p:ext>
     </p:extLst>
   </p:cSld>
@@ -4594,6 +4670,102 @@
           <p:cNvPr id="3" name="Picture 2">
             <a:extLst>
               <a:ext uri="{FF2B5EF4-FFF2-40B4-BE49-F238E27FC236}">
+                <a16:creationId xmlns:a16="http://schemas.microsoft.com/office/drawing/2014/main" id="{B5E4C823-3076-E737-BD9C-9E1E0250C209}"/>
+              </a:ext>
+            </a:extLst>
+          </p:cNvPr>
+          <p:cNvPicPr>
+            <a:picLocks noChangeAspect="1"/>
+          </p:cNvPicPr>
+          <p:nvPr/>
+        </p:nvPicPr>
+        <p:blipFill>
+          <a:blip r:embed="rId2"/>
+          <a:stretch>
+            <a:fillRect/>
+          </a:stretch>
+        </p:blipFill>
+        <p:spPr>
+          <a:xfrm>
+            <a:off x="1834557" y="3690948"/>
+            <a:ext cx="7399788" cy="3028507"/>
+          </a:xfrm>
+          <a:prstGeom prst="rect">
+            <a:avLst/>
+          </a:prstGeom>
+        </p:spPr>
+      </p:pic>
+      <p:pic>
+        <p:nvPicPr>
+          <p:cNvPr id="7" name="Picture 6">
+            <a:extLst>
+              <a:ext uri="{FF2B5EF4-FFF2-40B4-BE49-F238E27FC236}">
+                <a16:creationId xmlns:a16="http://schemas.microsoft.com/office/drawing/2014/main" id="{04718C61-7734-8584-62FE-27EAA79A2988}"/>
+              </a:ext>
+            </a:extLst>
+          </p:cNvPr>
+          <p:cNvPicPr>
+            <a:picLocks noChangeAspect="1"/>
+          </p:cNvPicPr>
+          <p:nvPr/>
+        </p:nvPicPr>
+        <p:blipFill>
+          <a:blip r:embed="rId3"/>
+          <a:stretch>
+            <a:fillRect/>
+          </a:stretch>
+        </p:blipFill>
+        <p:spPr>
+          <a:xfrm>
+            <a:off x="1834557" y="138545"/>
+            <a:ext cx="7161661" cy="3018961"/>
+          </a:xfrm>
+          <a:prstGeom prst="rect">
+            <a:avLst/>
+          </a:prstGeom>
+        </p:spPr>
+      </p:pic>
+    </p:spTree>
+    <p:extLst>
+      <p:ext uri="{BB962C8B-B14F-4D97-AF65-F5344CB8AC3E}">
+        <p14:creationId xmlns:p14="http://schemas.microsoft.com/office/powerpoint/2010/main" val="3691796962"/>
+      </p:ext>
+    </p:extLst>
+  </p:cSld>
+  <p:clrMapOvr>
+    <a:masterClrMapping/>
+  </p:clrMapOvr>
+</p:sld>
+</file>
+
+<file path=ppt/slides/slide7.xml><?xml version="1.0" encoding="utf-8"?>
+<p:sld xmlns:a="http://schemas.openxmlformats.org/drawingml/2006/main" xmlns:r="http://schemas.openxmlformats.org/officeDocument/2006/relationships" xmlns:p="http://schemas.openxmlformats.org/presentationml/2006/main">
+  <p:cSld>
+    <p:spTree>
+      <p:nvGrpSpPr>
+        <p:cNvPr id="1" name="">
+          <a:extLst>
+            <a:ext uri="{FF2B5EF4-FFF2-40B4-BE49-F238E27FC236}">
+              <a16:creationId xmlns:a16="http://schemas.microsoft.com/office/drawing/2014/main" id="{163110F5-6F6D-413E-FC99-133EC870DC5D}"/>
+            </a:ext>
+          </a:extLst>
+        </p:cNvPr>
+        <p:cNvGrpSpPr/>
+        <p:nvPr/>
+      </p:nvGrpSpPr>
+      <p:grpSpPr>
+        <a:xfrm>
+          <a:off x="0" y="0"/>
+          <a:ext cx="0" cy="0"/>
+          <a:chOff x="0" y="0"/>
+          <a:chExt cx="0" cy="0"/>
+        </a:xfrm>
+      </p:grpSpPr>
+      <p:pic>
+        <p:nvPicPr>
+          <p:cNvPr id="3" name="Picture 2">
+            <a:extLst>
+              <a:ext uri="{FF2B5EF4-FFF2-40B4-BE49-F238E27FC236}">
                 <a16:creationId xmlns:a16="http://schemas.microsoft.com/office/drawing/2014/main" id="{06022873-A011-166D-D2A3-D51EE18559D6}"/>
               </a:ext>
             </a:extLst>
@@ -4752,7 +4924,7 @@
 </p:sld>
 </file>
 
-<file path=ppt/slides/slide7.xml><?xml version="1.0" encoding="utf-8"?>
+<file path=ppt/slides/slide8.xml><?xml version="1.0" encoding="utf-8"?>
 <p:sld xmlns:a="http://schemas.openxmlformats.org/drawingml/2006/main" xmlns:r="http://schemas.openxmlformats.org/officeDocument/2006/relationships" xmlns:p="http://schemas.openxmlformats.org/presentationml/2006/main">
   <p:cSld>
     <p:spTree>
@@ -4848,7 +5020,7 @@
 </p:sld>
 </file>
 
-<file path=ppt/slides/slide8.xml><?xml version="1.0" encoding="utf-8"?>
+<file path=ppt/slides/slide9.xml><?xml version="1.0" encoding="utf-8"?>
 <p:sld xmlns:a="http://schemas.openxmlformats.org/drawingml/2006/main" xmlns:r="http://schemas.openxmlformats.org/officeDocument/2006/relationships" xmlns:p="http://schemas.openxmlformats.org/presentationml/2006/main">
   <p:cSld>
     <p:spTree>

</xml_diff>

<commit_message>
sudah lengkap semua fitur di sisi auth user (admin & petugas) di peminjam juga sudha lumaua, tinggal kejar peminjaman, pengembalian, dan laporan juga
</commit_message>
<xml_diff>
--- a/perlengkapan/Prototype peminjaman alat.pptx
+++ b/perlengkapan/Prototype peminjaman alat.pptx
@@ -5,18 +5,19 @@
     <p:sldMasterId id="2147483648" r:id="rId1"/>
   </p:sldMasterIdLst>
   <p:notesMasterIdLst>
-    <p:notesMasterId r:id="rId11"/>
+    <p:notesMasterId r:id="rId12"/>
   </p:notesMasterIdLst>
   <p:sldIdLst>
     <p:sldId id="303" r:id="rId2"/>
-    <p:sldId id="304" r:id="rId3"/>
-    <p:sldId id="273" r:id="rId4"/>
-    <p:sldId id="301" r:id="rId5"/>
-    <p:sldId id="300" r:id="rId6"/>
-    <p:sldId id="299" r:id="rId7"/>
-    <p:sldId id="271" r:id="rId8"/>
-    <p:sldId id="263" r:id="rId9"/>
-    <p:sldId id="302" r:id="rId10"/>
+    <p:sldId id="305" r:id="rId3"/>
+    <p:sldId id="304" r:id="rId4"/>
+    <p:sldId id="273" r:id="rId5"/>
+    <p:sldId id="301" r:id="rId6"/>
+    <p:sldId id="300" r:id="rId7"/>
+    <p:sldId id="299" r:id="rId8"/>
+    <p:sldId id="271" r:id="rId9"/>
+    <p:sldId id="263" r:id="rId10"/>
+    <p:sldId id="302" r:id="rId11"/>
   </p:sldIdLst>
   <p:sldSz cx="12192000" cy="6858000"/>
   <p:notesSz cx="6858000" cy="9144000"/>
@@ -205,7 +206,7 @@
           <a:p>
             <a:fld id="{355C5232-37C6-4E6A-90C1-0FFEE7DE1D89}" type="datetimeFigureOut">
               <a:rPr lang="en-US" smtClean="0"/>
-              <a:t>11/20/2025</a:t>
+              <a:t>11/21/2025</a:t>
             </a:fld>
             <a:endParaRPr lang="en-US"/>
           </a:p>
@@ -537,7 +538,7 @@
           <a:p>
             <a:fld id="{70E1CBBE-7A89-4A0C-BDED-306C13EFE26F}" type="slidenum">
               <a:rPr lang="en-US" smtClean="0"/>
-              <a:t>8</a:t>
+              <a:t>9</a:t>
             </a:fld>
             <a:endParaRPr lang="en-US"/>
           </a:p>
@@ -621,7 +622,7 @@
           <a:p>
             <a:fld id="{70E1CBBE-7A89-4A0C-BDED-306C13EFE26F}" type="slidenum">
               <a:rPr lang="en-US" smtClean="0"/>
-              <a:t>9</a:t>
+              <a:t>10</a:t>
             </a:fld>
             <a:endParaRPr lang="en-US"/>
           </a:p>
@@ -787,7 +788,7 @@
           <a:p>
             <a:fld id="{A34D38E4-6B21-4E99-BB2B-D81E1D56BAB8}" type="datetimeFigureOut">
               <a:rPr lang="en-US" smtClean="0"/>
-              <a:t>11/20/2025</a:t>
+              <a:t>11/21/2025</a:t>
             </a:fld>
             <a:endParaRPr lang="en-US"/>
           </a:p>
@@ -985,7 +986,7 @@
           <a:p>
             <a:fld id="{A34D38E4-6B21-4E99-BB2B-D81E1D56BAB8}" type="datetimeFigureOut">
               <a:rPr lang="en-US" smtClean="0"/>
-              <a:t>11/20/2025</a:t>
+              <a:t>11/21/2025</a:t>
             </a:fld>
             <a:endParaRPr lang="en-US"/>
           </a:p>
@@ -1193,7 +1194,7 @@
           <a:p>
             <a:fld id="{A34D38E4-6B21-4E99-BB2B-D81E1D56BAB8}" type="datetimeFigureOut">
               <a:rPr lang="en-US" smtClean="0"/>
-              <a:t>11/20/2025</a:t>
+              <a:t>11/21/2025</a:t>
             </a:fld>
             <a:endParaRPr lang="en-US"/>
           </a:p>
@@ -1391,7 +1392,7 @@
           <a:p>
             <a:fld id="{A34D38E4-6B21-4E99-BB2B-D81E1D56BAB8}" type="datetimeFigureOut">
               <a:rPr lang="en-US" smtClean="0"/>
-              <a:t>11/20/2025</a:t>
+              <a:t>11/21/2025</a:t>
             </a:fld>
             <a:endParaRPr lang="en-US"/>
           </a:p>
@@ -1666,7 +1667,7 @@
           <a:p>
             <a:fld id="{A34D38E4-6B21-4E99-BB2B-D81E1D56BAB8}" type="datetimeFigureOut">
               <a:rPr lang="en-US" smtClean="0"/>
-              <a:t>11/20/2025</a:t>
+              <a:t>11/21/2025</a:t>
             </a:fld>
             <a:endParaRPr lang="en-US"/>
           </a:p>
@@ -1931,7 +1932,7 @@
           <a:p>
             <a:fld id="{A34D38E4-6B21-4E99-BB2B-D81E1D56BAB8}" type="datetimeFigureOut">
               <a:rPr lang="en-US" smtClean="0"/>
-              <a:t>11/20/2025</a:t>
+              <a:t>11/21/2025</a:t>
             </a:fld>
             <a:endParaRPr lang="en-US"/>
           </a:p>
@@ -2343,7 +2344,7 @@
           <a:p>
             <a:fld id="{A34D38E4-6B21-4E99-BB2B-D81E1D56BAB8}" type="datetimeFigureOut">
               <a:rPr lang="en-US" smtClean="0"/>
-              <a:t>11/20/2025</a:t>
+              <a:t>11/21/2025</a:t>
             </a:fld>
             <a:endParaRPr lang="en-US"/>
           </a:p>
@@ -2484,7 +2485,7 @@
           <a:p>
             <a:fld id="{A34D38E4-6B21-4E99-BB2B-D81E1D56BAB8}" type="datetimeFigureOut">
               <a:rPr lang="en-US" smtClean="0"/>
-              <a:t>11/20/2025</a:t>
+              <a:t>11/21/2025</a:t>
             </a:fld>
             <a:endParaRPr lang="en-US"/>
           </a:p>
@@ -2597,7 +2598,7 @@
           <a:p>
             <a:fld id="{A34D38E4-6B21-4E99-BB2B-D81E1D56BAB8}" type="datetimeFigureOut">
               <a:rPr lang="en-US" smtClean="0"/>
-              <a:t>11/20/2025</a:t>
+              <a:t>11/21/2025</a:t>
             </a:fld>
             <a:endParaRPr lang="en-US"/>
           </a:p>
@@ -2908,7 +2909,7 @@
           <a:p>
             <a:fld id="{A34D38E4-6B21-4E99-BB2B-D81E1D56BAB8}" type="datetimeFigureOut">
               <a:rPr lang="en-US" smtClean="0"/>
-              <a:t>11/20/2025</a:t>
+              <a:t>11/21/2025</a:t>
             </a:fld>
             <a:endParaRPr lang="en-US"/>
           </a:p>
@@ -3196,7 +3197,7 @@
           <a:p>
             <a:fld id="{A34D38E4-6B21-4E99-BB2B-D81E1D56BAB8}" type="datetimeFigureOut">
               <a:rPr lang="en-US" smtClean="0"/>
-              <a:t>11/20/2025</a:t>
+              <a:t>11/21/2025</a:t>
             </a:fld>
             <a:endParaRPr lang="en-US"/>
           </a:p>
@@ -3437,7 +3438,7 @@
           <a:p>
             <a:fld id="{A34D38E4-6B21-4E99-BB2B-D81E1D56BAB8}" type="datetimeFigureOut">
               <a:rPr lang="en-US" smtClean="0"/>
-              <a:t>11/20/2025</a:t>
+              <a:t>11/21/2025</a:t>
             </a:fld>
             <a:endParaRPr lang="en-US"/>
           </a:p>
@@ -3862,10 +3863,10 @@
       </p:grpSpPr>
       <p:pic>
         <p:nvPicPr>
-          <p:cNvPr id="4" name="Picture 3">
-            <a:extLst>
-              <a:ext uri="{FF2B5EF4-FFF2-40B4-BE49-F238E27FC236}">
-                <a16:creationId xmlns:a16="http://schemas.microsoft.com/office/drawing/2014/main" id="{B103EDB9-54CA-69B0-DC52-FE66B219F5AE}"/>
+          <p:cNvPr id="3" name="Picture 2">
+            <a:extLst>
+              <a:ext uri="{FF2B5EF4-FFF2-40B4-BE49-F238E27FC236}">
+                <a16:creationId xmlns:a16="http://schemas.microsoft.com/office/drawing/2014/main" id="{1C9A5415-F0EC-48F9-2213-9B8EBDBA55DE}"/>
               </a:ext>
             </a:extLst>
           </p:cNvPr>
@@ -3882,8 +3883,8 @@
         </p:blipFill>
         <p:spPr>
           <a:xfrm>
-            <a:off x="878548" y="1522582"/>
-            <a:ext cx="4061812" cy="3406435"/>
+            <a:off x="0" y="727436"/>
+            <a:ext cx="12192000" cy="5403128"/>
           </a:xfrm>
           <a:prstGeom prst="rect">
             <a:avLst/>
@@ -3892,10 +3893,10 @@
       </p:pic>
       <p:sp>
         <p:nvSpPr>
-          <p:cNvPr id="5" name="Rectangle: Rounded Corners 4">
-            <a:extLst>
-              <a:ext uri="{FF2B5EF4-FFF2-40B4-BE49-F238E27FC236}">
-                <a16:creationId xmlns:a16="http://schemas.microsoft.com/office/drawing/2014/main" id="{D8CE2272-6537-12DE-BB9F-CA0E5BEE3AC6}"/>
+          <p:cNvPr id="6" name="Rectangle: Rounded Corners 5">
+            <a:extLst>
+              <a:ext uri="{FF2B5EF4-FFF2-40B4-BE49-F238E27FC236}">
+                <a16:creationId xmlns:a16="http://schemas.microsoft.com/office/drawing/2014/main" id="{C46E9BAB-E7DC-29CE-A3B6-21811DCEF236}"/>
               </a:ext>
             </a:extLst>
           </p:cNvPr>
@@ -3904,14 +3905,14 @@
         </p:nvSpPr>
         <p:spPr>
           <a:xfrm>
-            <a:off x="3158835" y="3807689"/>
-            <a:ext cx="1487055" cy="284020"/>
+            <a:off x="1406143" y="4448323"/>
+            <a:ext cx="5326797" cy="284020"/>
           </a:xfrm>
           <a:prstGeom prst="roundRect">
             <a:avLst/>
           </a:prstGeom>
           <a:solidFill>
-            <a:srgbClr val="00B0F0"/>
+            <a:srgbClr val="FF0000"/>
           </a:solidFill>
           <a:ln>
             <a:noFill/>
@@ -3940,20 +3941,762 @@
             <a:r>
               <a:rPr lang="en-US" sz="1100" b="1">
                 <a:solidFill>
-                  <a:sysClr val="windowText" lastClr="000000"/>
+                  <a:schemeClr val="bg1"/>
                 </a:solidFill>
               </a:rPr>
-              <a:t>Daftar akun Baru</a:t>
-            </a:r>
-          </a:p>
-        </p:txBody>
-      </p:sp>
+              <a:t>Peminjaman terbaru</a:t>
+            </a:r>
+          </a:p>
+        </p:txBody>
+      </p:sp>
+      <p:graphicFrame>
+        <p:nvGraphicFramePr>
+          <p:cNvPr id="7" name="Table 6">
+            <a:extLst>
+              <a:ext uri="{FF2B5EF4-FFF2-40B4-BE49-F238E27FC236}">
+                <a16:creationId xmlns:a16="http://schemas.microsoft.com/office/drawing/2014/main" id="{6E8143C7-618D-D9E5-4A27-B7E2BBFAD99E}"/>
+              </a:ext>
+            </a:extLst>
+          </p:cNvPr>
+          <p:cNvGraphicFramePr>
+            <a:graphicFrameLocks noGrp="1"/>
+          </p:cNvGraphicFramePr>
+          <p:nvPr>
+            <p:extLst>
+              <p:ext uri="{D42A27DB-BD31-4B8C-83A1-F6EECF244321}">
+                <p14:modId xmlns:p14="http://schemas.microsoft.com/office/powerpoint/2010/main" val="957581502"/>
+              </p:ext>
+            </p:extLst>
+          </p:nvPr>
+        </p:nvGraphicFramePr>
+        <p:xfrm>
+          <a:off x="1472092" y="4858557"/>
+          <a:ext cx="5199888" cy="1097280"/>
+        </p:xfrm>
+        <a:graphic>
+          <a:graphicData uri="http://schemas.openxmlformats.org/drawingml/2006/table">
+            <a:tbl>
+              <a:tblPr>
+                <a:tableStyleId>{5C22544A-7EE6-4342-B048-85BDC9FD1C3A}</a:tableStyleId>
+              </a:tblPr>
+              <a:tblGrid>
+                <a:gridCol w="517266">
+                  <a:extLst>
+                    <a:ext uri="{9D8B030D-6E8A-4147-A177-3AD203B41FA5}">
+                      <a16:colId xmlns:a16="http://schemas.microsoft.com/office/drawing/2014/main" val="2536449118"/>
+                    </a:ext>
+                  </a:extLst>
+                </a:gridCol>
+                <a:gridCol w="1334003">
+                  <a:extLst>
+                    <a:ext uri="{9D8B030D-6E8A-4147-A177-3AD203B41FA5}">
+                      <a16:colId xmlns:a16="http://schemas.microsoft.com/office/drawing/2014/main" val="937342880"/>
+                    </a:ext>
+                  </a:extLst>
+                </a:gridCol>
+                <a:gridCol w="1415676">
+                  <a:extLst>
+                    <a:ext uri="{9D8B030D-6E8A-4147-A177-3AD203B41FA5}">
+                      <a16:colId xmlns:a16="http://schemas.microsoft.com/office/drawing/2014/main" val="527141037"/>
+                    </a:ext>
+                  </a:extLst>
+                </a:gridCol>
+                <a:gridCol w="1932943">
+                  <a:extLst>
+                    <a:ext uri="{9D8B030D-6E8A-4147-A177-3AD203B41FA5}">
+                      <a16:colId xmlns:a16="http://schemas.microsoft.com/office/drawing/2014/main" val="3342315033"/>
+                    </a:ext>
+                  </a:extLst>
+                </a:gridCol>
+              </a:tblGrid>
+              <a:tr h="182880">
+                <a:tc>
+                  <a:txBody>
+                    <a:bodyPr/>
+                    <a:lstStyle/>
+                    <a:p>
+                      <a:pPr algn="l" fontAlgn="b">
+                        <a:buNone/>
+                      </a:pPr>
+                      <a:r>
+                        <a:rPr lang="en-US" sz="1100" u="none" strike="noStrike">
+                          <a:effectLst/>
+                        </a:rPr>
+                        <a:t>No</a:t>
+                      </a:r>
+                      <a:endParaRPr lang="en-US" sz="1100" b="0" i="0" u="none" strike="noStrike">
+                        <a:solidFill>
+                          <a:srgbClr val="000000"/>
+                        </a:solidFill>
+                        <a:effectLst/>
+                        <a:latin typeface="Calibri" panose="020F0502020204030204" pitchFamily="34" charset="0"/>
+                      </a:endParaRPr>
+                    </a:p>
+                  </a:txBody>
+                  <a:tcPr marL="7620" marR="7620" marT="7620" marB="0" anchor="b"/>
+                </a:tc>
+                <a:tc>
+                  <a:txBody>
+                    <a:bodyPr/>
+                    <a:lstStyle/>
+                    <a:p>
+                      <a:pPr algn="l" fontAlgn="b">
+                        <a:buNone/>
+                      </a:pPr>
+                      <a:r>
+                        <a:rPr lang="en-US" sz="1100" u="none" strike="noStrike">
+                          <a:effectLst/>
+                        </a:rPr>
+                        <a:t>Peminjam</a:t>
+                      </a:r>
+                      <a:endParaRPr lang="en-US" sz="1100" b="0" i="0" u="none" strike="noStrike">
+                        <a:solidFill>
+                          <a:srgbClr val="000000"/>
+                        </a:solidFill>
+                        <a:effectLst/>
+                        <a:latin typeface="Calibri" panose="020F0502020204030204" pitchFamily="34" charset="0"/>
+                      </a:endParaRPr>
+                    </a:p>
+                  </a:txBody>
+                  <a:tcPr marL="7620" marR="7620" marT="7620" marB="0" anchor="b"/>
+                </a:tc>
+                <a:tc>
+                  <a:txBody>
+                    <a:bodyPr/>
+                    <a:lstStyle/>
+                    <a:p>
+                      <a:pPr algn="l" fontAlgn="b">
+                        <a:buNone/>
+                      </a:pPr>
+                      <a:r>
+                        <a:rPr lang="en-US" sz="1100" u="none" strike="noStrike">
+                          <a:effectLst/>
+                        </a:rPr>
+                        <a:t>Nama Alat</a:t>
+                      </a:r>
+                      <a:endParaRPr lang="en-US" sz="1100" b="0" i="0" u="none" strike="noStrike">
+                        <a:solidFill>
+                          <a:srgbClr val="000000"/>
+                        </a:solidFill>
+                        <a:effectLst/>
+                        <a:latin typeface="Calibri" panose="020F0502020204030204" pitchFamily="34" charset="0"/>
+                      </a:endParaRPr>
+                    </a:p>
+                  </a:txBody>
+                  <a:tcPr marL="7620" marR="7620" marT="7620" marB="0" anchor="b"/>
+                </a:tc>
+                <a:tc>
+                  <a:txBody>
+                    <a:bodyPr/>
+                    <a:lstStyle/>
+                    <a:p>
+                      <a:pPr algn="l" fontAlgn="b">
+                        <a:buNone/>
+                      </a:pPr>
+                      <a:r>
+                        <a:rPr lang="en-US" sz="1100" u="none" strike="noStrike">
+                          <a:effectLst/>
+                        </a:rPr>
+                        <a:t>Tanggal Pinjam</a:t>
+                      </a:r>
+                      <a:endParaRPr lang="en-US" sz="1100" b="0" i="0" u="none" strike="noStrike">
+                        <a:solidFill>
+                          <a:srgbClr val="000000"/>
+                        </a:solidFill>
+                        <a:effectLst/>
+                        <a:latin typeface="Calibri" panose="020F0502020204030204" pitchFamily="34" charset="0"/>
+                      </a:endParaRPr>
+                    </a:p>
+                  </a:txBody>
+                  <a:tcPr marL="7620" marR="7620" marT="7620" marB="0" anchor="b"/>
+                </a:tc>
+                <a:extLst>
+                  <a:ext uri="{0D108BD9-81ED-4DB2-BD59-A6C34878D82A}">
+                    <a16:rowId xmlns:a16="http://schemas.microsoft.com/office/drawing/2014/main" val="1479695290"/>
+                  </a:ext>
+                </a:extLst>
+              </a:tr>
+              <a:tr h="182880">
+                <a:tc>
+                  <a:txBody>
+                    <a:bodyPr/>
+                    <a:lstStyle/>
+                    <a:p>
+                      <a:pPr algn="r" fontAlgn="b">
+                        <a:buNone/>
+                      </a:pPr>
+                      <a:r>
+                        <a:rPr lang="en-US" sz="1100" u="none" strike="noStrike">
+                          <a:effectLst/>
+                        </a:rPr>
+                        <a:t>1</a:t>
+                      </a:r>
+                      <a:endParaRPr lang="en-US" sz="1100" b="0" i="0" u="none" strike="noStrike">
+                        <a:solidFill>
+                          <a:srgbClr val="000000"/>
+                        </a:solidFill>
+                        <a:effectLst/>
+                        <a:latin typeface="Calibri" panose="020F0502020204030204" pitchFamily="34" charset="0"/>
+                      </a:endParaRPr>
+                    </a:p>
+                  </a:txBody>
+                  <a:tcPr marL="7620" marR="7620" marT="7620" marB="0" anchor="b"/>
+                </a:tc>
+                <a:tc>
+                  <a:txBody>
+                    <a:bodyPr/>
+                    <a:lstStyle/>
+                    <a:p>
+                      <a:pPr algn="l" fontAlgn="b">
+                        <a:buNone/>
+                      </a:pPr>
+                      <a:r>
+                        <a:rPr lang="en-US" sz="1100" u="none" strike="noStrike">
+                          <a:effectLst/>
+                        </a:rPr>
+                        <a:t> </a:t>
+                      </a:r>
+                      <a:endParaRPr lang="en-US" sz="1100" b="0" i="0" u="none" strike="noStrike">
+                        <a:solidFill>
+                          <a:srgbClr val="000000"/>
+                        </a:solidFill>
+                        <a:effectLst/>
+                        <a:latin typeface="Calibri" panose="020F0502020204030204" pitchFamily="34" charset="0"/>
+                      </a:endParaRPr>
+                    </a:p>
+                  </a:txBody>
+                  <a:tcPr marL="7620" marR="7620" marT="7620" marB="0" anchor="b"/>
+                </a:tc>
+                <a:tc>
+                  <a:txBody>
+                    <a:bodyPr/>
+                    <a:lstStyle/>
+                    <a:p>
+                      <a:pPr algn="l" fontAlgn="b">
+                        <a:buNone/>
+                      </a:pPr>
+                      <a:r>
+                        <a:rPr lang="en-US" sz="1100" u="none" strike="noStrike">
+                          <a:effectLst/>
+                        </a:rPr>
+                        <a:t> </a:t>
+                      </a:r>
+                      <a:endParaRPr lang="en-US" sz="1100" b="0" i="0" u="none" strike="noStrike">
+                        <a:solidFill>
+                          <a:srgbClr val="000000"/>
+                        </a:solidFill>
+                        <a:effectLst/>
+                        <a:latin typeface="Calibri" panose="020F0502020204030204" pitchFamily="34" charset="0"/>
+                      </a:endParaRPr>
+                    </a:p>
+                  </a:txBody>
+                  <a:tcPr marL="7620" marR="7620" marT="7620" marB="0" anchor="b"/>
+                </a:tc>
+                <a:tc>
+                  <a:txBody>
+                    <a:bodyPr/>
+                    <a:lstStyle/>
+                    <a:p>
+                      <a:pPr algn="l" fontAlgn="b">
+                        <a:buNone/>
+                      </a:pPr>
+                      <a:r>
+                        <a:rPr lang="en-US" sz="1100" u="none" strike="noStrike">
+                          <a:effectLst/>
+                        </a:rPr>
+                        <a:t> </a:t>
+                      </a:r>
+                      <a:endParaRPr lang="en-US" sz="1100" b="0" i="0" u="none" strike="noStrike">
+                        <a:solidFill>
+                          <a:srgbClr val="000000"/>
+                        </a:solidFill>
+                        <a:effectLst/>
+                        <a:latin typeface="Calibri" panose="020F0502020204030204" pitchFamily="34" charset="0"/>
+                      </a:endParaRPr>
+                    </a:p>
+                  </a:txBody>
+                  <a:tcPr marL="7620" marR="7620" marT="7620" marB="0" anchor="b"/>
+                </a:tc>
+                <a:extLst>
+                  <a:ext uri="{0D108BD9-81ED-4DB2-BD59-A6C34878D82A}">
+                    <a16:rowId xmlns:a16="http://schemas.microsoft.com/office/drawing/2014/main" val="2403968294"/>
+                  </a:ext>
+                </a:extLst>
+              </a:tr>
+              <a:tr h="182880">
+                <a:tc>
+                  <a:txBody>
+                    <a:bodyPr/>
+                    <a:lstStyle/>
+                    <a:p>
+                      <a:pPr algn="r" fontAlgn="b">
+                        <a:buNone/>
+                      </a:pPr>
+                      <a:r>
+                        <a:rPr lang="en-US" sz="1100" u="none" strike="noStrike">
+                          <a:effectLst/>
+                        </a:rPr>
+                        <a:t>2</a:t>
+                      </a:r>
+                      <a:endParaRPr lang="en-US" sz="1100" b="0" i="0" u="none" strike="noStrike">
+                        <a:solidFill>
+                          <a:srgbClr val="000000"/>
+                        </a:solidFill>
+                        <a:effectLst/>
+                        <a:latin typeface="Calibri" panose="020F0502020204030204" pitchFamily="34" charset="0"/>
+                      </a:endParaRPr>
+                    </a:p>
+                  </a:txBody>
+                  <a:tcPr marL="7620" marR="7620" marT="7620" marB="0" anchor="b"/>
+                </a:tc>
+                <a:tc>
+                  <a:txBody>
+                    <a:bodyPr/>
+                    <a:lstStyle/>
+                    <a:p>
+                      <a:pPr algn="l" fontAlgn="b">
+                        <a:buNone/>
+                      </a:pPr>
+                      <a:r>
+                        <a:rPr lang="en-US" sz="1100" u="none" strike="noStrike">
+                          <a:effectLst/>
+                        </a:rPr>
+                        <a:t> </a:t>
+                      </a:r>
+                      <a:endParaRPr lang="en-US" sz="1100" b="0" i="0" u="none" strike="noStrike">
+                        <a:solidFill>
+                          <a:srgbClr val="000000"/>
+                        </a:solidFill>
+                        <a:effectLst/>
+                        <a:latin typeface="Calibri" panose="020F0502020204030204" pitchFamily="34" charset="0"/>
+                      </a:endParaRPr>
+                    </a:p>
+                  </a:txBody>
+                  <a:tcPr marL="7620" marR="7620" marT="7620" marB="0" anchor="b"/>
+                </a:tc>
+                <a:tc>
+                  <a:txBody>
+                    <a:bodyPr/>
+                    <a:lstStyle/>
+                    <a:p>
+                      <a:pPr algn="l" fontAlgn="b">
+                        <a:buNone/>
+                      </a:pPr>
+                      <a:r>
+                        <a:rPr lang="en-US" sz="1100" u="none" strike="noStrike">
+                          <a:effectLst/>
+                        </a:rPr>
+                        <a:t> </a:t>
+                      </a:r>
+                      <a:endParaRPr lang="en-US" sz="1100" b="0" i="0" u="none" strike="noStrike">
+                        <a:solidFill>
+                          <a:srgbClr val="000000"/>
+                        </a:solidFill>
+                        <a:effectLst/>
+                        <a:latin typeface="Calibri" panose="020F0502020204030204" pitchFamily="34" charset="0"/>
+                      </a:endParaRPr>
+                    </a:p>
+                  </a:txBody>
+                  <a:tcPr marL="7620" marR="7620" marT="7620" marB="0" anchor="b"/>
+                </a:tc>
+                <a:tc>
+                  <a:txBody>
+                    <a:bodyPr/>
+                    <a:lstStyle/>
+                    <a:p>
+                      <a:pPr algn="l" fontAlgn="b">
+                        <a:buNone/>
+                      </a:pPr>
+                      <a:r>
+                        <a:rPr lang="en-US" sz="1100" u="none" strike="noStrike">
+                          <a:effectLst/>
+                        </a:rPr>
+                        <a:t> </a:t>
+                      </a:r>
+                      <a:endParaRPr lang="en-US" sz="1100" b="0" i="0" u="none" strike="noStrike">
+                        <a:solidFill>
+                          <a:srgbClr val="000000"/>
+                        </a:solidFill>
+                        <a:effectLst/>
+                        <a:latin typeface="Calibri" panose="020F0502020204030204" pitchFamily="34" charset="0"/>
+                      </a:endParaRPr>
+                    </a:p>
+                  </a:txBody>
+                  <a:tcPr marL="7620" marR="7620" marT="7620" marB="0" anchor="b"/>
+                </a:tc>
+                <a:extLst>
+                  <a:ext uri="{0D108BD9-81ED-4DB2-BD59-A6C34878D82A}">
+                    <a16:rowId xmlns:a16="http://schemas.microsoft.com/office/drawing/2014/main" val="2983074990"/>
+                  </a:ext>
+                </a:extLst>
+              </a:tr>
+              <a:tr h="182880">
+                <a:tc>
+                  <a:txBody>
+                    <a:bodyPr/>
+                    <a:lstStyle/>
+                    <a:p>
+                      <a:pPr algn="r" fontAlgn="b">
+                        <a:buNone/>
+                      </a:pPr>
+                      <a:r>
+                        <a:rPr lang="en-US" sz="1100" u="none" strike="noStrike">
+                          <a:effectLst/>
+                        </a:rPr>
+                        <a:t>3</a:t>
+                      </a:r>
+                      <a:endParaRPr lang="en-US" sz="1100" b="0" i="0" u="none" strike="noStrike">
+                        <a:solidFill>
+                          <a:srgbClr val="000000"/>
+                        </a:solidFill>
+                        <a:effectLst/>
+                        <a:latin typeface="Calibri" panose="020F0502020204030204" pitchFamily="34" charset="0"/>
+                      </a:endParaRPr>
+                    </a:p>
+                  </a:txBody>
+                  <a:tcPr marL="7620" marR="7620" marT="7620" marB="0" anchor="b"/>
+                </a:tc>
+                <a:tc>
+                  <a:txBody>
+                    <a:bodyPr/>
+                    <a:lstStyle/>
+                    <a:p>
+                      <a:pPr algn="l" fontAlgn="b">
+                        <a:buNone/>
+                      </a:pPr>
+                      <a:r>
+                        <a:rPr lang="en-US" sz="1100" u="none" strike="noStrike">
+                          <a:effectLst/>
+                        </a:rPr>
+                        <a:t> </a:t>
+                      </a:r>
+                      <a:endParaRPr lang="en-US" sz="1100" b="0" i="0" u="none" strike="noStrike">
+                        <a:solidFill>
+                          <a:srgbClr val="000000"/>
+                        </a:solidFill>
+                        <a:effectLst/>
+                        <a:latin typeface="Calibri" panose="020F0502020204030204" pitchFamily="34" charset="0"/>
+                      </a:endParaRPr>
+                    </a:p>
+                  </a:txBody>
+                  <a:tcPr marL="7620" marR="7620" marT="7620" marB="0" anchor="b"/>
+                </a:tc>
+                <a:tc>
+                  <a:txBody>
+                    <a:bodyPr/>
+                    <a:lstStyle/>
+                    <a:p>
+                      <a:pPr algn="l" fontAlgn="b">
+                        <a:buNone/>
+                      </a:pPr>
+                      <a:r>
+                        <a:rPr lang="en-US" sz="1100" u="none" strike="noStrike">
+                          <a:effectLst/>
+                        </a:rPr>
+                        <a:t> </a:t>
+                      </a:r>
+                      <a:endParaRPr lang="en-US" sz="1100" b="0" i="0" u="none" strike="noStrike">
+                        <a:solidFill>
+                          <a:srgbClr val="000000"/>
+                        </a:solidFill>
+                        <a:effectLst/>
+                        <a:latin typeface="Calibri" panose="020F0502020204030204" pitchFamily="34" charset="0"/>
+                      </a:endParaRPr>
+                    </a:p>
+                  </a:txBody>
+                  <a:tcPr marL="7620" marR="7620" marT="7620" marB="0" anchor="b"/>
+                </a:tc>
+                <a:tc>
+                  <a:txBody>
+                    <a:bodyPr/>
+                    <a:lstStyle/>
+                    <a:p>
+                      <a:pPr algn="l" fontAlgn="b">
+                        <a:buNone/>
+                      </a:pPr>
+                      <a:r>
+                        <a:rPr lang="en-US" sz="1100" u="none" strike="noStrike">
+                          <a:effectLst/>
+                        </a:rPr>
+                        <a:t> </a:t>
+                      </a:r>
+                      <a:endParaRPr lang="en-US" sz="1100" b="0" i="0" u="none" strike="noStrike">
+                        <a:solidFill>
+                          <a:srgbClr val="000000"/>
+                        </a:solidFill>
+                        <a:effectLst/>
+                        <a:latin typeface="Calibri" panose="020F0502020204030204" pitchFamily="34" charset="0"/>
+                      </a:endParaRPr>
+                    </a:p>
+                  </a:txBody>
+                  <a:tcPr marL="7620" marR="7620" marT="7620" marB="0" anchor="b"/>
+                </a:tc>
+                <a:extLst>
+                  <a:ext uri="{0D108BD9-81ED-4DB2-BD59-A6C34878D82A}">
+                    <a16:rowId xmlns:a16="http://schemas.microsoft.com/office/drawing/2014/main" val="2033012975"/>
+                  </a:ext>
+                </a:extLst>
+              </a:tr>
+              <a:tr h="182880">
+                <a:tc>
+                  <a:txBody>
+                    <a:bodyPr/>
+                    <a:lstStyle/>
+                    <a:p>
+                      <a:pPr algn="r" fontAlgn="b">
+                        <a:buNone/>
+                      </a:pPr>
+                      <a:r>
+                        <a:rPr lang="en-US" sz="1100" u="none" strike="noStrike">
+                          <a:effectLst/>
+                        </a:rPr>
+                        <a:t>4</a:t>
+                      </a:r>
+                      <a:endParaRPr lang="en-US" sz="1100" b="0" i="0" u="none" strike="noStrike">
+                        <a:solidFill>
+                          <a:srgbClr val="000000"/>
+                        </a:solidFill>
+                        <a:effectLst/>
+                        <a:latin typeface="Calibri" panose="020F0502020204030204" pitchFamily="34" charset="0"/>
+                      </a:endParaRPr>
+                    </a:p>
+                  </a:txBody>
+                  <a:tcPr marL="7620" marR="7620" marT="7620" marB="0" anchor="b"/>
+                </a:tc>
+                <a:tc>
+                  <a:txBody>
+                    <a:bodyPr/>
+                    <a:lstStyle/>
+                    <a:p>
+                      <a:pPr algn="l" fontAlgn="b">
+                        <a:buNone/>
+                      </a:pPr>
+                      <a:r>
+                        <a:rPr lang="en-US" sz="1100" u="none" strike="noStrike">
+                          <a:effectLst/>
+                        </a:rPr>
+                        <a:t> </a:t>
+                      </a:r>
+                      <a:endParaRPr lang="en-US" sz="1100" b="0" i="0" u="none" strike="noStrike">
+                        <a:solidFill>
+                          <a:srgbClr val="000000"/>
+                        </a:solidFill>
+                        <a:effectLst/>
+                        <a:latin typeface="Calibri" panose="020F0502020204030204" pitchFamily="34" charset="0"/>
+                      </a:endParaRPr>
+                    </a:p>
+                  </a:txBody>
+                  <a:tcPr marL="7620" marR="7620" marT="7620" marB="0" anchor="b"/>
+                </a:tc>
+                <a:tc>
+                  <a:txBody>
+                    <a:bodyPr/>
+                    <a:lstStyle/>
+                    <a:p>
+                      <a:pPr algn="l" fontAlgn="b">
+                        <a:buNone/>
+                      </a:pPr>
+                      <a:r>
+                        <a:rPr lang="en-US" sz="1100" u="none" strike="noStrike">
+                          <a:effectLst/>
+                        </a:rPr>
+                        <a:t> </a:t>
+                      </a:r>
+                      <a:endParaRPr lang="en-US" sz="1100" b="0" i="0" u="none" strike="noStrike">
+                        <a:solidFill>
+                          <a:srgbClr val="000000"/>
+                        </a:solidFill>
+                        <a:effectLst/>
+                        <a:latin typeface="Calibri" panose="020F0502020204030204" pitchFamily="34" charset="0"/>
+                      </a:endParaRPr>
+                    </a:p>
+                  </a:txBody>
+                  <a:tcPr marL="7620" marR="7620" marT="7620" marB="0" anchor="b"/>
+                </a:tc>
+                <a:tc>
+                  <a:txBody>
+                    <a:bodyPr/>
+                    <a:lstStyle/>
+                    <a:p>
+                      <a:pPr algn="l" fontAlgn="b">
+                        <a:buNone/>
+                      </a:pPr>
+                      <a:r>
+                        <a:rPr lang="en-US" sz="1100" u="none" strike="noStrike">
+                          <a:effectLst/>
+                        </a:rPr>
+                        <a:t> </a:t>
+                      </a:r>
+                      <a:endParaRPr lang="en-US" sz="1100" b="0" i="0" u="none" strike="noStrike">
+                        <a:solidFill>
+                          <a:srgbClr val="000000"/>
+                        </a:solidFill>
+                        <a:effectLst/>
+                        <a:latin typeface="Calibri" panose="020F0502020204030204" pitchFamily="34" charset="0"/>
+                      </a:endParaRPr>
+                    </a:p>
+                  </a:txBody>
+                  <a:tcPr marL="7620" marR="7620" marT="7620" marB="0" anchor="b"/>
+                </a:tc>
+                <a:extLst>
+                  <a:ext uri="{0D108BD9-81ED-4DB2-BD59-A6C34878D82A}">
+                    <a16:rowId xmlns:a16="http://schemas.microsoft.com/office/drawing/2014/main" val="998884347"/>
+                  </a:ext>
+                </a:extLst>
+              </a:tr>
+              <a:tr h="182880">
+                <a:tc>
+                  <a:txBody>
+                    <a:bodyPr/>
+                    <a:lstStyle/>
+                    <a:p>
+                      <a:pPr algn="r" fontAlgn="b">
+                        <a:buNone/>
+                      </a:pPr>
+                      <a:r>
+                        <a:rPr lang="en-US" sz="1100" u="none" strike="noStrike">
+                          <a:effectLst/>
+                        </a:rPr>
+                        <a:t>5</a:t>
+                      </a:r>
+                      <a:endParaRPr lang="en-US" sz="1100" b="0" i="0" u="none" strike="noStrike">
+                        <a:solidFill>
+                          <a:srgbClr val="000000"/>
+                        </a:solidFill>
+                        <a:effectLst/>
+                        <a:latin typeface="Calibri" panose="020F0502020204030204" pitchFamily="34" charset="0"/>
+                      </a:endParaRPr>
+                    </a:p>
+                  </a:txBody>
+                  <a:tcPr marL="7620" marR="7620" marT="7620" marB="0" anchor="b"/>
+                </a:tc>
+                <a:tc>
+                  <a:txBody>
+                    <a:bodyPr/>
+                    <a:lstStyle/>
+                    <a:p>
+                      <a:pPr algn="l" fontAlgn="b">
+                        <a:buNone/>
+                      </a:pPr>
+                      <a:r>
+                        <a:rPr lang="en-US" sz="1100" u="none" strike="noStrike">
+                          <a:effectLst/>
+                        </a:rPr>
+                        <a:t> </a:t>
+                      </a:r>
+                      <a:endParaRPr lang="en-US" sz="1100" b="0" i="0" u="none" strike="noStrike">
+                        <a:solidFill>
+                          <a:srgbClr val="000000"/>
+                        </a:solidFill>
+                        <a:effectLst/>
+                        <a:latin typeface="Calibri" panose="020F0502020204030204" pitchFamily="34" charset="0"/>
+                      </a:endParaRPr>
+                    </a:p>
+                  </a:txBody>
+                  <a:tcPr marL="7620" marR="7620" marT="7620" marB="0" anchor="b"/>
+                </a:tc>
+                <a:tc>
+                  <a:txBody>
+                    <a:bodyPr/>
+                    <a:lstStyle/>
+                    <a:p>
+                      <a:pPr algn="l" fontAlgn="b">
+                        <a:buNone/>
+                      </a:pPr>
+                      <a:r>
+                        <a:rPr lang="en-US" sz="1100" u="none" strike="noStrike">
+                          <a:effectLst/>
+                        </a:rPr>
+                        <a:t> </a:t>
+                      </a:r>
+                      <a:endParaRPr lang="en-US" sz="1100" b="0" i="0" u="none" strike="noStrike">
+                        <a:solidFill>
+                          <a:srgbClr val="000000"/>
+                        </a:solidFill>
+                        <a:effectLst/>
+                        <a:latin typeface="Calibri" panose="020F0502020204030204" pitchFamily="34" charset="0"/>
+                      </a:endParaRPr>
+                    </a:p>
+                  </a:txBody>
+                  <a:tcPr marL="7620" marR="7620" marT="7620" marB="0" anchor="b"/>
+                </a:tc>
+                <a:tc>
+                  <a:txBody>
+                    <a:bodyPr/>
+                    <a:lstStyle/>
+                    <a:p>
+                      <a:pPr algn="l" fontAlgn="b">
+                        <a:buNone/>
+                      </a:pPr>
+                      <a:r>
+                        <a:rPr lang="en-US" sz="1100" u="none" strike="noStrike">
+                          <a:effectLst/>
+                        </a:rPr>
+                        <a:t> </a:t>
+                      </a:r>
+                      <a:endParaRPr lang="en-US" sz="1100" b="0" i="0" u="none" strike="noStrike">
+                        <a:solidFill>
+                          <a:srgbClr val="000000"/>
+                        </a:solidFill>
+                        <a:effectLst/>
+                        <a:latin typeface="Calibri" panose="020F0502020204030204" pitchFamily="34" charset="0"/>
+                      </a:endParaRPr>
+                    </a:p>
+                  </a:txBody>
+                  <a:tcPr marL="7620" marR="7620" marT="7620" marB="0" anchor="b"/>
+                </a:tc>
+                <a:extLst>
+                  <a:ext uri="{0D108BD9-81ED-4DB2-BD59-A6C34878D82A}">
+                    <a16:rowId xmlns:a16="http://schemas.microsoft.com/office/drawing/2014/main" val="2828225722"/>
+                  </a:ext>
+                </a:extLst>
+              </a:tr>
+            </a:tbl>
+          </a:graphicData>
+        </a:graphic>
+      </p:graphicFrame>
+    </p:spTree>
+    <p:extLst>
+      <p:ext uri="{BB962C8B-B14F-4D97-AF65-F5344CB8AC3E}">
+        <p14:creationId xmlns:p14="http://schemas.microsoft.com/office/powerpoint/2010/main" val="1597641754"/>
+      </p:ext>
+    </p:extLst>
+  </p:cSld>
+  <p:clrMapOvr>
+    <a:masterClrMapping/>
+  </p:clrMapOvr>
+</p:sld>
+</file>
+
+<file path=ppt/slides/slide10.xml><?xml version="1.0" encoding="utf-8"?>
+<p:sld xmlns:a="http://schemas.openxmlformats.org/drawingml/2006/main" xmlns:r="http://schemas.openxmlformats.org/officeDocument/2006/relationships" xmlns:p="http://schemas.openxmlformats.org/presentationml/2006/main">
+  <p:cSld>
+    <p:spTree>
+      <p:nvGrpSpPr>
+        <p:cNvPr id="1" name="">
+          <a:extLst>
+            <a:ext uri="{FF2B5EF4-FFF2-40B4-BE49-F238E27FC236}">
+              <a16:creationId xmlns:a16="http://schemas.microsoft.com/office/drawing/2014/main" id="{613E1468-512E-D483-8B23-3F382B04231B}"/>
+            </a:ext>
+          </a:extLst>
+        </p:cNvPr>
+        <p:cNvGrpSpPr/>
+        <p:nvPr/>
+      </p:nvGrpSpPr>
+      <p:grpSpPr>
+        <a:xfrm>
+          <a:off x="0" y="0"/>
+          <a:ext cx="0" cy="0"/>
+          <a:chOff x="0" y="0"/>
+          <a:chExt cx="0" cy="0"/>
+        </a:xfrm>
+      </p:grpSpPr>
       <p:pic>
         <p:nvPicPr>
-          <p:cNvPr id="10" name="Picture 9">
-            <a:extLst>
-              <a:ext uri="{FF2B5EF4-FFF2-40B4-BE49-F238E27FC236}">
-                <a16:creationId xmlns:a16="http://schemas.microsoft.com/office/drawing/2014/main" id="{C7B9FF38-6C90-712C-F20B-5E31EB518D00}"/>
+          <p:cNvPr id="3" name="Picture 2">
+            <a:extLst>
+              <a:ext uri="{FF2B5EF4-FFF2-40B4-BE49-F238E27FC236}">
+                <a16:creationId xmlns:a16="http://schemas.microsoft.com/office/drawing/2014/main" id="{82DAF03B-F2C1-CC6C-2011-C7790721DA07}"/>
               </a:ext>
             </a:extLst>
           </p:cNvPr>
@@ -3964,14 +4707,15 @@
         </p:nvPicPr>
         <p:blipFill>
           <a:blip r:embed="rId3"/>
+          <a:srcRect b="21528"/>
           <a:stretch>
             <a:fillRect/>
           </a:stretch>
         </p:blipFill>
         <p:spPr>
           <a:xfrm>
-            <a:off x="6926177" y="1420982"/>
-            <a:ext cx="4206605" cy="3406435"/>
+            <a:off x="0" y="592152"/>
+            <a:ext cx="12192000" cy="4452288"/>
           </a:xfrm>
           <a:prstGeom prst="rect">
             <a:avLst/>
@@ -3980,10 +4724,10 @@
       </p:pic>
       <p:sp>
         <p:nvSpPr>
-          <p:cNvPr id="11" name="Rectangle 10">
-            <a:extLst>
-              <a:ext uri="{FF2B5EF4-FFF2-40B4-BE49-F238E27FC236}">
-                <a16:creationId xmlns:a16="http://schemas.microsoft.com/office/drawing/2014/main" id="{23691AEF-75E1-68DF-79B0-CCAC7194F27E}"/>
+          <p:cNvPr id="4" name="Rectangle 3">
+            <a:extLst>
+              <a:ext uri="{FF2B5EF4-FFF2-40B4-BE49-F238E27FC236}">
+                <a16:creationId xmlns:a16="http://schemas.microsoft.com/office/drawing/2014/main" id="{1A347928-C4DF-A1D6-849E-A47A9F8F79C9}"/>
               </a:ext>
             </a:extLst>
           </p:cNvPr>
@@ -3992,17 +4736,19 @@
         </p:nvSpPr>
         <p:spPr>
           <a:xfrm>
-            <a:off x="6998573" y="1631027"/>
-            <a:ext cx="3966607" cy="526472"/>
+            <a:off x="1478280" y="4434840"/>
+            <a:ext cx="9791700" cy="281940"/>
           </a:xfrm>
           <a:prstGeom prst="rect">
             <a:avLst/>
           </a:prstGeom>
           <a:solidFill>
-            <a:srgbClr val="FFC000"/>
+            <a:schemeClr val="bg1"/>
           </a:solidFill>
           <a:ln>
-            <a:noFill/>
+            <a:solidFill>
+              <a:schemeClr val="bg1"/>
+            </a:solidFill>
           </a:ln>
         </p:spPr>
         <p:style>
@@ -4026,13 +4772,148 @@
           <a:lstStyle/>
           <a:p>
             <a:pPr algn="ctr"/>
-            <a:r>
-              <a:rPr lang="en-US" sz="2000" b="1">
+            <a:endParaRPr lang="en-US"/>
+          </a:p>
+        </p:txBody>
+      </p:sp>
+      <p:pic>
+        <p:nvPicPr>
+          <p:cNvPr id="6" name="Picture 5">
+            <a:extLst>
+              <a:ext uri="{FF2B5EF4-FFF2-40B4-BE49-F238E27FC236}">
+                <a16:creationId xmlns:a16="http://schemas.microsoft.com/office/drawing/2014/main" id="{699CC983-AD80-9789-4BA4-884172C145B7}"/>
+              </a:ext>
+            </a:extLst>
+          </p:cNvPr>
+          <p:cNvPicPr>
+            <a:picLocks noChangeAspect="1"/>
+          </p:cNvPicPr>
+          <p:nvPr/>
+        </p:nvPicPr>
+        <p:blipFill>
+          <a:blip r:embed="rId4"/>
+          <a:stretch>
+            <a:fillRect/>
+          </a:stretch>
+        </p:blipFill>
+        <p:spPr>
+          <a:xfrm>
+            <a:off x="1478280" y="4434840"/>
+            <a:ext cx="7986259" cy="343112"/>
+          </a:xfrm>
+          <a:prstGeom prst="rect">
+            <a:avLst/>
+          </a:prstGeom>
+        </p:spPr>
+      </p:pic>
+      <p:pic>
+        <p:nvPicPr>
+          <p:cNvPr id="7" name="Picture 6">
+            <a:extLst>
+              <a:ext uri="{FF2B5EF4-FFF2-40B4-BE49-F238E27FC236}">
+                <a16:creationId xmlns:a16="http://schemas.microsoft.com/office/drawing/2014/main" id="{6D44F9E4-22D9-5425-4E57-954D4A5E66EC}"/>
+              </a:ext>
+            </a:extLst>
+          </p:cNvPr>
+          <p:cNvPicPr>
+            <a:picLocks noChangeAspect="1"/>
+          </p:cNvPicPr>
+          <p:nvPr/>
+        </p:nvPicPr>
+        <p:blipFill>
+          <a:blip r:embed="rId3"/>
+          <a:srcRect t="79278"/>
+          <a:stretch>
+            <a:fillRect/>
+          </a:stretch>
+        </p:blipFill>
+        <p:spPr>
+          <a:xfrm>
+            <a:off x="0" y="5276850"/>
+            <a:ext cx="12192000" cy="1175688"/>
+          </a:xfrm>
+          <a:prstGeom prst="rect">
+            <a:avLst/>
+          </a:prstGeom>
+        </p:spPr>
+      </p:pic>
+      <p:pic>
+        <p:nvPicPr>
+          <p:cNvPr id="8" name="Picture 7">
+            <a:extLst>
+              <a:ext uri="{FF2B5EF4-FFF2-40B4-BE49-F238E27FC236}">
+                <a16:creationId xmlns:a16="http://schemas.microsoft.com/office/drawing/2014/main" id="{8C5AEB47-647F-9F34-5132-A54C343C5714}"/>
+              </a:ext>
+            </a:extLst>
+          </p:cNvPr>
+          <p:cNvPicPr>
+            <a:picLocks noChangeAspect="1"/>
+          </p:cNvPicPr>
+          <p:nvPr/>
+        </p:nvPicPr>
+        <p:blipFill>
+          <a:blip r:embed="rId5"/>
+          <a:srcRect t="1404" b="78551"/>
+          <a:stretch>
+            <a:fillRect/>
+          </a:stretch>
+        </p:blipFill>
+        <p:spPr>
+          <a:xfrm>
+            <a:off x="1478280" y="5048038"/>
+            <a:ext cx="9517837" cy="343112"/>
+          </a:xfrm>
+          <a:prstGeom prst="rect">
+            <a:avLst/>
+          </a:prstGeom>
+        </p:spPr>
+      </p:pic>
+      <p:sp>
+        <p:nvSpPr>
+          <p:cNvPr id="9" name="TextBox 8">
+            <a:extLst>
+              <a:ext uri="{FF2B5EF4-FFF2-40B4-BE49-F238E27FC236}">
+                <a16:creationId xmlns:a16="http://schemas.microsoft.com/office/drawing/2014/main" id="{1633556E-68F2-9723-C725-FB4913D0DC62}"/>
+              </a:ext>
+            </a:extLst>
+          </p:cNvPr>
+          <p:cNvSpPr txBox="1"/>
+          <p:nvPr/>
+        </p:nvSpPr>
+        <p:spPr>
+          <a:xfrm>
+            <a:off x="9464539" y="4434840"/>
+            <a:ext cx="1866401" cy="430887"/>
+          </a:xfrm>
+          <a:prstGeom prst="rect">
+            <a:avLst/>
+          </a:prstGeom>
+          <a:noFill/>
+          <a:ln>
+            <a:solidFill>
+              <a:schemeClr val="bg1">
+                <a:lumMod val="85000"/>
+              </a:schemeClr>
+            </a:solidFill>
+          </a:ln>
+        </p:spPr>
+        <p:txBody>
+          <a:bodyPr wrap="square" rtlCol="0">
+            <a:spAutoFit/>
+          </a:bodyPr>
+          <a:lstStyle/>
+          <a:p>
+            <a:pPr algn="ctr"/>
+            <a:r>
+              <a:rPr lang="en-US" sz="1100">
                 <a:solidFill>
-                  <a:sysClr val="windowText" lastClr="000000"/>
+                  <a:schemeClr val="accent2">
+                    <a:lumMod val="60000"/>
+                    <a:lumOff val="40000"/>
+                  </a:schemeClr>
                 </a:solidFill>
               </a:rPr>
-              <a:t>Login Peminjam</a:t>
+              <a:t>[harga ambil data dari tb gedung]</a:t>
             </a:r>
           </a:p>
         </p:txBody>
@@ -4040,7 +4921,7 @@
     </p:spTree>
     <p:extLst>
       <p:ext uri="{BB962C8B-B14F-4D97-AF65-F5344CB8AC3E}">
-        <p14:creationId xmlns:p14="http://schemas.microsoft.com/office/powerpoint/2010/main" val="1597641754"/>
+        <p14:creationId xmlns:p14="http://schemas.microsoft.com/office/powerpoint/2010/main" val="560037392"/>
       </p:ext>
     </p:extLst>
   </p:cSld>
@@ -4075,6 +4956,219 @@
       </p:grpSpPr>
       <p:pic>
         <p:nvPicPr>
+          <p:cNvPr id="4" name="Picture 3">
+            <a:extLst>
+              <a:ext uri="{FF2B5EF4-FFF2-40B4-BE49-F238E27FC236}">
+                <a16:creationId xmlns:a16="http://schemas.microsoft.com/office/drawing/2014/main" id="{B103EDB9-54CA-69B0-DC52-FE66B219F5AE}"/>
+              </a:ext>
+            </a:extLst>
+          </p:cNvPr>
+          <p:cNvPicPr>
+            <a:picLocks noChangeAspect="1"/>
+          </p:cNvPicPr>
+          <p:nvPr/>
+        </p:nvPicPr>
+        <p:blipFill>
+          <a:blip r:embed="rId2"/>
+          <a:stretch>
+            <a:fillRect/>
+          </a:stretch>
+        </p:blipFill>
+        <p:spPr>
+          <a:xfrm>
+            <a:off x="878548" y="1522582"/>
+            <a:ext cx="4061812" cy="3406435"/>
+          </a:xfrm>
+          <a:prstGeom prst="rect">
+            <a:avLst/>
+          </a:prstGeom>
+        </p:spPr>
+      </p:pic>
+      <p:sp>
+        <p:nvSpPr>
+          <p:cNvPr id="5" name="Rectangle: Rounded Corners 4">
+            <a:extLst>
+              <a:ext uri="{FF2B5EF4-FFF2-40B4-BE49-F238E27FC236}">
+                <a16:creationId xmlns:a16="http://schemas.microsoft.com/office/drawing/2014/main" id="{D8CE2272-6537-12DE-BB9F-CA0E5BEE3AC6}"/>
+              </a:ext>
+            </a:extLst>
+          </p:cNvPr>
+          <p:cNvSpPr/>
+          <p:nvPr/>
+        </p:nvSpPr>
+        <p:spPr>
+          <a:xfrm>
+            <a:off x="3158835" y="3807689"/>
+            <a:ext cx="1487055" cy="284020"/>
+          </a:xfrm>
+          <a:prstGeom prst="roundRect">
+            <a:avLst/>
+          </a:prstGeom>
+          <a:solidFill>
+            <a:srgbClr val="00B0F0"/>
+          </a:solidFill>
+          <a:ln>
+            <a:noFill/>
+          </a:ln>
+        </p:spPr>
+        <p:style>
+          <a:lnRef idx="2">
+            <a:schemeClr val="accent1">
+              <a:shade val="15000"/>
+            </a:schemeClr>
+          </a:lnRef>
+          <a:fillRef idx="1">
+            <a:schemeClr val="accent1"/>
+          </a:fillRef>
+          <a:effectRef idx="0">
+            <a:schemeClr val="accent1"/>
+          </a:effectRef>
+          <a:fontRef idx="minor">
+            <a:schemeClr val="lt1"/>
+          </a:fontRef>
+        </p:style>
+        <p:txBody>
+          <a:bodyPr rtlCol="0" anchor="ctr"/>
+          <a:lstStyle/>
+          <a:p>
+            <a:r>
+              <a:rPr lang="en-US" sz="1100" b="1">
+                <a:solidFill>
+                  <a:sysClr val="windowText" lastClr="000000"/>
+                </a:solidFill>
+              </a:rPr>
+              <a:t>Daftar akun Baru</a:t>
+            </a:r>
+          </a:p>
+        </p:txBody>
+      </p:sp>
+      <p:pic>
+        <p:nvPicPr>
+          <p:cNvPr id="10" name="Picture 9">
+            <a:extLst>
+              <a:ext uri="{FF2B5EF4-FFF2-40B4-BE49-F238E27FC236}">
+                <a16:creationId xmlns:a16="http://schemas.microsoft.com/office/drawing/2014/main" id="{C7B9FF38-6C90-712C-F20B-5E31EB518D00}"/>
+              </a:ext>
+            </a:extLst>
+          </p:cNvPr>
+          <p:cNvPicPr>
+            <a:picLocks noChangeAspect="1"/>
+          </p:cNvPicPr>
+          <p:nvPr/>
+        </p:nvPicPr>
+        <p:blipFill>
+          <a:blip r:embed="rId3"/>
+          <a:stretch>
+            <a:fillRect/>
+          </a:stretch>
+        </p:blipFill>
+        <p:spPr>
+          <a:xfrm>
+            <a:off x="6926177" y="1420982"/>
+            <a:ext cx="4206605" cy="3406435"/>
+          </a:xfrm>
+          <a:prstGeom prst="rect">
+            <a:avLst/>
+          </a:prstGeom>
+        </p:spPr>
+      </p:pic>
+      <p:sp>
+        <p:nvSpPr>
+          <p:cNvPr id="11" name="Rectangle 10">
+            <a:extLst>
+              <a:ext uri="{FF2B5EF4-FFF2-40B4-BE49-F238E27FC236}">
+                <a16:creationId xmlns:a16="http://schemas.microsoft.com/office/drawing/2014/main" id="{23691AEF-75E1-68DF-79B0-CCAC7194F27E}"/>
+              </a:ext>
+            </a:extLst>
+          </p:cNvPr>
+          <p:cNvSpPr/>
+          <p:nvPr/>
+        </p:nvSpPr>
+        <p:spPr>
+          <a:xfrm>
+            <a:off x="6998573" y="1631027"/>
+            <a:ext cx="3966607" cy="526472"/>
+          </a:xfrm>
+          <a:prstGeom prst="rect">
+            <a:avLst/>
+          </a:prstGeom>
+          <a:solidFill>
+            <a:srgbClr val="FFC000"/>
+          </a:solidFill>
+          <a:ln>
+            <a:noFill/>
+          </a:ln>
+        </p:spPr>
+        <p:style>
+          <a:lnRef idx="2">
+            <a:schemeClr val="accent1">
+              <a:shade val="15000"/>
+            </a:schemeClr>
+          </a:lnRef>
+          <a:fillRef idx="1">
+            <a:schemeClr val="accent1"/>
+          </a:fillRef>
+          <a:effectRef idx="0">
+            <a:schemeClr val="accent1"/>
+          </a:effectRef>
+          <a:fontRef idx="minor">
+            <a:schemeClr val="lt1"/>
+          </a:fontRef>
+        </p:style>
+        <p:txBody>
+          <a:bodyPr rtlCol="0" anchor="ctr"/>
+          <a:lstStyle/>
+          <a:p>
+            <a:pPr algn="ctr"/>
+            <a:r>
+              <a:rPr lang="en-US" sz="2000" b="1">
+                <a:solidFill>
+                  <a:sysClr val="windowText" lastClr="000000"/>
+                </a:solidFill>
+              </a:rPr>
+              <a:t>Login Peminjam</a:t>
+            </a:r>
+          </a:p>
+        </p:txBody>
+      </p:sp>
+    </p:spTree>
+    <p:extLst>
+      <p:ext uri="{BB962C8B-B14F-4D97-AF65-F5344CB8AC3E}">
+        <p14:creationId xmlns:p14="http://schemas.microsoft.com/office/powerpoint/2010/main" val="1323503123"/>
+      </p:ext>
+    </p:extLst>
+  </p:cSld>
+  <p:clrMapOvr>
+    <a:masterClrMapping/>
+  </p:clrMapOvr>
+</p:sld>
+</file>
+
+<file path=ppt/slides/slide3.xml><?xml version="1.0" encoding="utf-8"?>
+<p:sld xmlns:a="http://schemas.openxmlformats.org/drawingml/2006/main" xmlns:r="http://schemas.openxmlformats.org/officeDocument/2006/relationships" xmlns:p="http://schemas.openxmlformats.org/presentationml/2006/main">
+  <p:cSld>
+    <p:spTree>
+      <p:nvGrpSpPr>
+        <p:cNvPr id="1" name="">
+          <a:extLst>
+            <a:ext uri="{FF2B5EF4-FFF2-40B4-BE49-F238E27FC236}">
+              <a16:creationId xmlns:a16="http://schemas.microsoft.com/office/drawing/2014/main" id="{163110F5-6F6D-413E-FC99-133EC870DC5D}"/>
+            </a:ext>
+          </a:extLst>
+        </p:cNvPr>
+        <p:cNvGrpSpPr/>
+        <p:nvPr/>
+      </p:nvGrpSpPr>
+      <p:grpSpPr>
+        <a:xfrm>
+          <a:off x="0" y="0"/>
+          <a:ext cx="0" cy="0"/>
+          <a:chOff x="0" y="0"/>
+          <a:chExt cx="0" cy="0"/>
+        </a:xfrm>
+      </p:grpSpPr>
+      <p:pic>
+        <p:nvPicPr>
           <p:cNvPr id="6" name="Picture 5">
             <a:extLst>
               <a:ext uri="{FF2B5EF4-FFF2-40B4-BE49-F238E27FC236}">
@@ -4221,7 +5315,7 @@
 </p:sld>
 </file>
 
-<file path=ppt/slides/slide3.xml><?xml version="1.0" encoding="utf-8"?>
+<file path=ppt/slides/slide4.xml><?xml version="1.0" encoding="utf-8"?>
 <p:sld xmlns:a="http://schemas.openxmlformats.org/drawingml/2006/main" xmlns:r="http://schemas.openxmlformats.org/officeDocument/2006/relationships" xmlns:p="http://schemas.openxmlformats.org/presentationml/2006/main">
   <p:cSld>
     <p:spTree>
@@ -4409,7 +5503,7 @@
 </p:sld>
 </file>
 
-<file path=ppt/slides/slide4.xml><?xml version="1.0" encoding="utf-8"?>
+<file path=ppt/slides/slide5.xml><?xml version="1.0" encoding="utf-8"?>
 <p:sld xmlns:a="http://schemas.openxmlformats.org/drawingml/2006/main" xmlns:r="http://schemas.openxmlformats.org/officeDocument/2006/relationships" xmlns:p="http://schemas.openxmlformats.org/presentationml/2006/main">
   <p:cSld>
     <p:spTree>
@@ -4516,7 +5610,7 @@
 </p:sld>
 </file>
 
-<file path=ppt/slides/slide5.xml><?xml version="1.0" encoding="utf-8"?>
+<file path=ppt/slides/slide6.xml><?xml version="1.0" encoding="utf-8"?>
 <p:sld xmlns:a="http://schemas.openxmlformats.org/drawingml/2006/main" xmlns:r="http://schemas.openxmlformats.org/officeDocument/2006/relationships" xmlns:p="http://schemas.openxmlformats.org/presentationml/2006/main">
   <p:cSld>
     <p:spTree>
@@ -4633,102 +5727,6 @@
     <p:extLst>
       <p:ext uri="{BB962C8B-B14F-4D97-AF65-F5344CB8AC3E}">
         <p14:creationId xmlns:p14="http://schemas.microsoft.com/office/powerpoint/2010/main" val="2740473774"/>
-      </p:ext>
-    </p:extLst>
-  </p:cSld>
-  <p:clrMapOvr>
-    <a:masterClrMapping/>
-  </p:clrMapOvr>
-</p:sld>
-</file>
-
-<file path=ppt/slides/slide6.xml><?xml version="1.0" encoding="utf-8"?>
-<p:sld xmlns:a="http://schemas.openxmlformats.org/drawingml/2006/main" xmlns:r="http://schemas.openxmlformats.org/officeDocument/2006/relationships" xmlns:p="http://schemas.openxmlformats.org/presentationml/2006/main">
-  <p:cSld>
-    <p:spTree>
-      <p:nvGrpSpPr>
-        <p:cNvPr id="1" name="">
-          <a:extLst>
-            <a:ext uri="{FF2B5EF4-FFF2-40B4-BE49-F238E27FC236}">
-              <a16:creationId xmlns:a16="http://schemas.microsoft.com/office/drawing/2014/main" id="{163110F5-6F6D-413E-FC99-133EC870DC5D}"/>
-            </a:ext>
-          </a:extLst>
-        </p:cNvPr>
-        <p:cNvGrpSpPr/>
-        <p:nvPr/>
-      </p:nvGrpSpPr>
-      <p:grpSpPr>
-        <a:xfrm>
-          <a:off x="0" y="0"/>
-          <a:ext cx="0" cy="0"/>
-          <a:chOff x="0" y="0"/>
-          <a:chExt cx="0" cy="0"/>
-        </a:xfrm>
-      </p:grpSpPr>
-      <p:pic>
-        <p:nvPicPr>
-          <p:cNvPr id="3" name="Picture 2">
-            <a:extLst>
-              <a:ext uri="{FF2B5EF4-FFF2-40B4-BE49-F238E27FC236}">
-                <a16:creationId xmlns:a16="http://schemas.microsoft.com/office/drawing/2014/main" id="{B5E4C823-3076-E737-BD9C-9E1E0250C209}"/>
-              </a:ext>
-            </a:extLst>
-          </p:cNvPr>
-          <p:cNvPicPr>
-            <a:picLocks noChangeAspect="1"/>
-          </p:cNvPicPr>
-          <p:nvPr/>
-        </p:nvPicPr>
-        <p:blipFill>
-          <a:blip r:embed="rId2"/>
-          <a:stretch>
-            <a:fillRect/>
-          </a:stretch>
-        </p:blipFill>
-        <p:spPr>
-          <a:xfrm>
-            <a:off x="1834557" y="3690948"/>
-            <a:ext cx="7399788" cy="3028507"/>
-          </a:xfrm>
-          <a:prstGeom prst="rect">
-            <a:avLst/>
-          </a:prstGeom>
-        </p:spPr>
-      </p:pic>
-      <p:pic>
-        <p:nvPicPr>
-          <p:cNvPr id="7" name="Picture 6">
-            <a:extLst>
-              <a:ext uri="{FF2B5EF4-FFF2-40B4-BE49-F238E27FC236}">
-                <a16:creationId xmlns:a16="http://schemas.microsoft.com/office/drawing/2014/main" id="{04718C61-7734-8584-62FE-27EAA79A2988}"/>
-              </a:ext>
-            </a:extLst>
-          </p:cNvPr>
-          <p:cNvPicPr>
-            <a:picLocks noChangeAspect="1"/>
-          </p:cNvPicPr>
-          <p:nvPr/>
-        </p:nvPicPr>
-        <p:blipFill>
-          <a:blip r:embed="rId3"/>
-          <a:stretch>
-            <a:fillRect/>
-          </a:stretch>
-        </p:blipFill>
-        <p:spPr>
-          <a:xfrm>
-            <a:off x="1834557" y="138545"/>
-            <a:ext cx="7161661" cy="3018961"/>
-          </a:xfrm>
-          <a:prstGeom prst="rect">
-            <a:avLst/>
-          </a:prstGeom>
-        </p:spPr>
-      </p:pic>
-    </p:spTree>
-    <p:extLst>
-      <p:ext uri="{BB962C8B-B14F-4D97-AF65-F5344CB8AC3E}">
-        <p14:creationId xmlns:p14="http://schemas.microsoft.com/office/powerpoint/2010/main" val="3691796962"/>
       </p:ext>
     </p:extLst>
   </p:cSld>
@@ -4766,6 +5764,102 @@
           <p:cNvPr id="3" name="Picture 2">
             <a:extLst>
               <a:ext uri="{FF2B5EF4-FFF2-40B4-BE49-F238E27FC236}">
+                <a16:creationId xmlns:a16="http://schemas.microsoft.com/office/drawing/2014/main" id="{B5E4C823-3076-E737-BD9C-9E1E0250C209}"/>
+              </a:ext>
+            </a:extLst>
+          </p:cNvPr>
+          <p:cNvPicPr>
+            <a:picLocks noChangeAspect="1"/>
+          </p:cNvPicPr>
+          <p:nvPr/>
+        </p:nvPicPr>
+        <p:blipFill>
+          <a:blip r:embed="rId2"/>
+          <a:stretch>
+            <a:fillRect/>
+          </a:stretch>
+        </p:blipFill>
+        <p:spPr>
+          <a:xfrm>
+            <a:off x="1834557" y="3690948"/>
+            <a:ext cx="7399788" cy="3028507"/>
+          </a:xfrm>
+          <a:prstGeom prst="rect">
+            <a:avLst/>
+          </a:prstGeom>
+        </p:spPr>
+      </p:pic>
+      <p:pic>
+        <p:nvPicPr>
+          <p:cNvPr id="7" name="Picture 6">
+            <a:extLst>
+              <a:ext uri="{FF2B5EF4-FFF2-40B4-BE49-F238E27FC236}">
+                <a16:creationId xmlns:a16="http://schemas.microsoft.com/office/drawing/2014/main" id="{04718C61-7734-8584-62FE-27EAA79A2988}"/>
+              </a:ext>
+            </a:extLst>
+          </p:cNvPr>
+          <p:cNvPicPr>
+            <a:picLocks noChangeAspect="1"/>
+          </p:cNvPicPr>
+          <p:nvPr/>
+        </p:nvPicPr>
+        <p:blipFill>
+          <a:blip r:embed="rId3"/>
+          <a:stretch>
+            <a:fillRect/>
+          </a:stretch>
+        </p:blipFill>
+        <p:spPr>
+          <a:xfrm>
+            <a:off x="1834557" y="138545"/>
+            <a:ext cx="7161661" cy="3018961"/>
+          </a:xfrm>
+          <a:prstGeom prst="rect">
+            <a:avLst/>
+          </a:prstGeom>
+        </p:spPr>
+      </p:pic>
+    </p:spTree>
+    <p:extLst>
+      <p:ext uri="{BB962C8B-B14F-4D97-AF65-F5344CB8AC3E}">
+        <p14:creationId xmlns:p14="http://schemas.microsoft.com/office/powerpoint/2010/main" val="3691796962"/>
+      </p:ext>
+    </p:extLst>
+  </p:cSld>
+  <p:clrMapOvr>
+    <a:masterClrMapping/>
+  </p:clrMapOvr>
+</p:sld>
+</file>
+
+<file path=ppt/slides/slide8.xml><?xml version="1.0" encoding="utf-8"?>
+<p:sld xmlns:a="http://schemas.openxmlformats.org/drawingml/2006/main" xmlns:r="http://schemas.openxmlformats.org/officeDocument/2006/relationships" xmlns:p="http://schemas.openxmlformats.org/presentationml/2006/main">
+  <p:cSld>
+    <p:spTree>
+      <p:nvGrpSpPr>
+        <p:cNvPr id="1" name="">
+          <a:extLst>
+            <a:ext uri="{FF2B5EF4-FFF2-40B4-BE49-F238E27FC236}">
+              <a16:creationId xmlns:a16="http://schemas.microsoft.com/office/drawing/2014/main" id="{163110F5-6F6D-413E-FC99-133EC870DC5D}"/>
+            </a:ext>
+          </a:extLst>
+        </p:cNvPr>
+        <p:cNvGrpSpPr/>
+        <p:nvPr/>
+      </p:nvGrpSpPr>
+      <p:grpSpPr>
+        <a:xfrm>
+          <a:off x="0" y="0"/>
+          <a:ext cx="0" cy="0"/>
+          <a:chOff x="0" y="0"/>
+          <a:chExt cx="0" cy="0"/>
+        </a:xfrm>
+      </p:grpSpPr>
+      <p:pic>
+        <p:nvPicPr>
+          <p:cNvPr id="3" name="Picture 2">
+            <a:extLst>
+              <a:ext uri="{FF2B5EF4-FFF2-40B4-BE49-F238E27FC236}">
                 <a16:creationId xmlns:a16="http://schemas.microsoft.com/office/drawing/2014/main" id="{06022873-A011-166D-D2A3-D51EE18559D6}"/>
               </a:ext>
             </a:extLst>
@@ -4924,7 +6018,7 @@
 </p:sld>
 </file>
 
-<file path=ppt/slides/slide8.xml><?xml version="1.0" encoding="utf-8"?>
+<file path=ppt/slides/slide9.xml><?xml version="1.0" encoding="utf-8"?>
 <p:sld xmlns:a="http://schemas.openxmlformats.org/drawingml/2006/main" xmlns:r="http://schemas.openxmlformats.org/officeDocument/2006/relationships" xmlns:p="http://schemas.openxmlformats.org/presentationml/2006/main">
   <p:cSld>
     <p:spTree>
@@ -5011,269 +6105,6 @@
     <p:extLst>
       <p:ext uri="{BB962C8B-B14F-4D97-AF65-F5344CB8AC3E}">
         <p14:creationId xmlns:p14="http://schemas.microsoft.com/office/powerpoint/2010/main" val="1649722496"/>
-      </p:ext>
-    </p:extLst>
-  </p:cSld>
-  <p:clrMapOvr>
-    <a:masterClrMapping/>
-  </p:clrMapOvr>
-</p:sld>
-</file>
-
-<file path=ppt/slides/slide9.xml><?xml version="1.0" encoding="utf-8"?>
-<p:sld xmlns:a="http://schemas.openxmlformats.org/drawingml/2006/main" xmlns:r="http://schemas.openxmlformats.org/officeDocument/2006/relationships" xmlns:p="http://schemas.openxmlformats.org/presentationml/2006/main">
-  <p:cSld>
-    <p:spTree>
-      <p:nvGrpSpPr>
-        <p:cNvPr id="1" name="">
-          <a:extLst>
-            <a:ext uri="{FF2B5EF4-FFF2-40B4-BE49-F238E27FC236}">
-              <a16:creationId xmlns:a16="http://schemas.microsoft.com/office/drawing/2014/main" id="{613E1468-512E-D483-8B23-3F382B04231B}"/>
-            </a:ext>
-          </a:extLst>
-        </p:cNvPr>
-        <p:cNvGrpSpPr/>
-        <p:nvPr/>
-      </p:nvGrpSpPr>
-      <p:grpSpPr>
-        <a:xfrm>
-          <a:off x="0" y="0"/>
-          <a:ext cx="0" cy="0"/>
-          <a:chOff x="0" y="0"/>
-          <a:chExt cx="0" cy="0"/>
-        </a:xfrm>
-      </p:grpSpPr>
-      <p:pic>
-        <p:nvPicPr>
-          <p:cNvPr id="3" name="Picture 2">
-            <a:extLst>
-              <a:ext uri="{FF2B5EF4-FFF2-40B4-BE49-F238E27FC236}">
-                <a16:creationId xmlns:a16="http://schemas.microsoft.com/office/drawing/2014/main" id="{82DAF03B-F2C1-CC6C-2011-C7790721DA07}"/>
-              </a:ext>
-            </a:extLst>
-          </p:cNvPr>
-          <p:cNvPicPr>
-            <a:picLocks noChangeAspect="1"/>
-          </p:cNvPicPr>
-          <p:nvPr/>
-        </p:nvPicPr>
-        <p:blipFill>
-          <a:blip r:embed="rId3"/>
-          <a:srcRect b="21528"/>
-          <a:stretch>
-            <a:fillRect/>
-          </a:stretch>
-        </p:blipFill>
-        <p:spPr>
-          <a:xfrm>
-            <a:off x="0" y="592152"/>
-            <a:ext cx="12192000" cy="4452288"/>
-          </a:xfrm>
-          <a:prstGeom prst="rect">
-            <a:avLst/>
-          </a:prstGeom>
-        </p:spPr>
-      </p:pic>
-      <p:sp>
-        <p:nvSpPr>
-          <p:cNvPr id="4" name="Rectangle 3">
-            <a:extLst>
-              <a:ext uri="{FF2B5EF4-FFF2-40B4-BE49-F238E27FC236}">
-                <a16:creationId xmlns:a16="http://schemas.microsoft.com/office/drawing/2014/main" id="{1A347928-C4DF-A1D6-849E-A47A9F8F79C9}"/>
-              </a:ext>
-            </a:extLst>
-          </p:cNvPr>
-          <p:cNvSpPr/>
-          <p:nvPr/>
-        </p:nvSpPr>
-        <p:spPr>
-          <a:xfrm>
-            <a:off x="1478280" y="4434840"/>
-            <a:ext cx="9791700" cy="281940"/>
-          </a:xfrm>
-          <a:prstGeom prst="rect">
-            <a:avLst/>
-          </a:prstGeom>
-          <a:solidFill>
-            <a:schemeClr val="bg1"/>
-          </a:solidFill>
-          <a:ln>
-            <a:solidFill>
-              <a:schemeClr val="bg1"/>
-            </a:solidFill>
-          </a:ln>
-        </p:spPr>
-        <p:style>
-          <a:lnRef idx="2">
-            <a:schemeClr val="accent1">
-              <a:shade val="15000"/>
-            </a:schemeClr>
-          </a:lnRef>
-          <a:fillRef idx="1">
-            <a:schemeClr val="accent1"/>
-          </a:fillRef>
-          <a:effectRef idx="0">
-            <a:schemeClr val="accent1"/>
-          </a:effectRef>
-          <a:fontRef idx="minor">
-            <a:schemeClr val="lt1"/>
-          </a:fontRef>
-        </p:style>
-        <p:txBody>
-          <a:bodyPr rtlCol="0" anchor="ctr"/>
-          <a:lstStyle/>
-          <a:p>
-            <a:pPr algn="ctr"/>
-            <a:endParaRPr lang="en-US"/>
-          </a:p>
-        </p:txBody>
-      </p:sp>
-      <p:pic>
-        <p:nvPicPr>
-          <p:cNvPr id="6" name="Picture 5">
-            <a:extLst>
-              <a:ext uri="{FF2B5EF4-FFF2-40B4-BE49-F238E27FC236}">
-                <a16:creationId xmlns:a16="http://schemas.microsoft.com/office/drawing/2014/main" id="{699CC983-AD80-9789-4BA4-884172C145B7}"/>
-              </a:ext>
-            </a:extLst>
-          </p:cNvPr>
-          <p:cNvPicPr>
-            <a:picLocks noChangeAspect="1"/>
-          </p:cNvPicPr>
-          <p:nvPr/>
-        </p:nvPicPr>
-        <p:blipFill>
-          <a:blip r:embed="rId4"/>
-          <a:stretch>
-            <a:fillRect/>
-          </a:stretch>
-        </p:blipFill>
-        <p:spPr>
-          <a:xfrm>
-            <a:off x="1478280" y="4434840"/>
-            <a:ext cx="7986259" cy="343112"/>
-          </a:xfrm>
-          <a:prstGeom prst="rect">
-            <a:avLst/>
-          </a:prstGeom>
-        </p:spPr>
-      </p:pic>
-      <p:pic>
-        <p:nvPicPr>
-          <p:cNvPr id="7" name="Picture 6">
-            <a:extLst>
-              <a:ext uri="{FF2B5EF4-FFF2-40B4-BE49-F238E27FC236}">
-                <a16:creationId xmlns:a16="http://schemas.microsoft.com/office/drawing/2014/main" id="{6D44F9E4-22D9-5425-4E57-954D4A5E66EC}"/>
-              </a:ext>
-            </a:extLst>
-          </p:cNvPr>
-          <p:cNvPicPr>
-            <a:picLocks noChangeAspect="1"/>
-          </p:cNvPicPr>
-          <p:nvPr/>
-        </p:nvPicPr>
-        <p:blipFill>
-          <a:blip r:embed="rId3"/>
-          <a:srcRect t="79278"/>
-          <a:stretch>
-            <a:fillRect/>
-          </a:stretch>
-        </p:blipFill>
-        <p:spPr>
-          <a:xfrm>
-            <a:off x="0" y="5276850"/>
-            <a:ext cx="12192000" cy="1175688"/>
-          </a:xfrm>
-          <a:prstGeom prst="rect">
-            <a:avLst/>
-          </a:prstGeom>
-        </p:spPr>
-      </p:pic>
-      <p:pic>
-        <p:nvPicPr>
-          <p:cNvPr id="8" name="Picture 7">
-            <a:extLst>
-              <a:ext uri="{FF2B5EF4-FFF2-40B4-BE49-F238E27FC236}">
-                <a16:creationId xmlns:a16="http://schemas.microsoft.com/office/drawing/2014/main" id="{8C5AEB47-647F-9F34-5132-A54C343C5714}"/>
-              </a:ext>
-            </a:extLst>
-          </p:cNvPr>
-          <p:cNvPicPr>
-            <a:picLocks noChangeAspect="1"/>
-          </p:cNvPicPr>
-          <p:nvPr/>
-        </p:nvPicPr>
-        <p:blipFill>
-          <a:blip r:embed="rId5"/>
-          <a:srcRect t="1404" b="78551"/>
-          <a:stretch>
-            <a:fillRect/>
-          </a:stretch>
-        </p:blipFill>
-        <p:spPr>
-          <a:xfrm>
-            <a:off x="1478280" y="5048038"/>
-            <a:ext cx="9517837" cy="343112"/>
-          </a:xfrm>
-          <a:prstGeom prst="rect">
-            <a:avLst/>
-          </a:prstGeom>
-        </p:spPr>
-      </p:pic>
-      <p:sp>
-        <p:nvSpPr>
-          <p:cNvPr id="9" name="TextBox 8">
-            <a:extLst>
-              <a:ext uri="{FF2B5EF4-FFF2-40B4-BE49-F238E27FC236}">
-                <a16:creationId xmlns:a16="http://schemas.microsoft.com/office/drawing/2014/main" id="{1633556E-68F2-9723-C725-FB4913D0DC62}"/>
-              </a:ext>
-            </a:extLst>
-          </p:cNvPr>
-          <p:cNvSpPr txBox="1"/>
-          <p:nvPr/>
-        </p:nvSpPr>
-        <p:spPr>
-          <a:xfrm>
-            <a:off x="9464539" y="4434840"/>
-            <a:ext cx="1866401" cy="430887"/>
-          </a:xfrm>
-          <a:prstGeom prst="rect">
-            <a:avLst/>
-          </a:prstGeom>
-          <a:noFill/>
-          <a:ln>
-            <a:solidFill>
-              <a:schemeClr val="bg1">
-                <a:lumMod val="85000"/>
-              </a:schemeClr>
-            </a:solidFill>
-          </a:ln>
-        </p:spPr>
-        <p:txBody>
-          <a:bodyPr wrap="square" rtlCol="0">
-            <a:spAutoFit/>
-          </a:bodyPr>
-          <a:lstStyle/>
-          <a:p>
-            <a:pPr algn="ctr"/>
-            <a:r>
-              <a:rPr lang="en-US" sz="1100">
-                <a:solidFill>
-                  <a:schemeClr val="accent2">
-                    <a:lumMod val="60000"/>
-                    <a:lumOff val="40000"/>
-                  </a:schemeClr>
-                </a:solidFill>
-              </a:rPr>
-              <a:t>[harga ambil data dari tb gedung]</a:t>
-            </a:r>
-          </a:p>
-        </p:txBody>
-      </p:sp>
-    </p:spTree>
-    <p:extLst>
-      <p:ext uri="{BB962C8B-B14F-4D97-AF65-F5344CB8AC3E}">
-        <p14:creationId xmlns:p14="http://schemas.microsoft.com/office/powerpoint/2010/main" val="560037392"/>
       </p:ext>
     </p:extLst>
   </p:cSld>

</xml_diff>

<commit_message>
oke saat ini sudah selesai sampai peminjaman, dan pengembalian, sudah ada pendataan denda. tinggal membuat laporan dan perbaikan dashboardadmin dan dashboardpetugas saja
</commit_message>
<xml_diff>
--- a/perlengkapan/Prototype peminjaman alat.pptx
+++ b/perlengkapan/Prototype peminjaman alat.pptx
@@ -5,19 +5,20 @@
     <p:sldMasterId id="2147483648" r:id="rId1"/>
   </p:sldMasterIdLst>
   <p:notesMasterIdLst>
-    <p:notesMasterId r:id="rId12"/>
+    <p:notesMasterId r:id="rId13"/>
   </p:notesMasterIdLst>
   <p:sldIdLst>
     <p:sldId id="303" r:id="rId2"/>
-    <p:sldId id="305" r:id="rId3"/>
-    <p:sldId id="304" r:id="rId4"/>
-    <p:sldId id="273" r:id="rId5"/>
-    <p:sldId id="301" r:id="rId6"/>
-    <p:sldId id="300" r:id="rId7"/>
-    <p:sldId id="299" r:id="rId8"/>
-    <p:sldId id="271" r:id="rId9"/>
-    <p:sldId id="263" r:id="rId10"/>
-    <p:sldId id="302" r:id="rId11"/>
+    <p:sldId id="306" r:id="rId3"/>
+    <p:sldId id="305" r:id="rId4"/>
+    <p:sldId id="304" r:id="rId5"/>
+    <p:sldId id="273" r:id="rId6"/>
+    <p:sldId id="301" r:id="rId7"/>
+    <p:sldId id="300" r:id="rId8"/>
+    <p:sldId id="299" r:id="rId9"/>
+    <p:sldId id="271" r:id="rId10"/>
+    <p:sldId id="263" r:id="rId11"/>
+    <p:sldId id="302" r:id="rId12"/>
   </p:sldIdLst>
   <p:sldSz cx="12192000" cy="6858000"/>
   <p:notesSz cx="6858000" cy="9144000"/>
@@ -538,7 +539,7 @@
           <a:p>
             <a:fld id="{70E1CBBE-7A89-4A0C-BDED-306C13EFE26F}" type="slidenum">
               <a:rPr lang="en-US" smtClean="0"/>
-              <a:t>9</a:t>
+              <a:t>10</a:t>
             </a:fld>
             <a:endParaRPr lang="en-US"/>
           </a:p>
@@ -622,7 +623,7 @@
           <a:p>
             <a:fld id="{70E1CBBE-7A89-4A0C-BDED-306C13EFE26F}" type="slidenum">
               <a:rPr lang="en-US" smtClean="0"/>
-              <a:t>10</a:t>
+              <a:t>11</a:t>
             </a:fld>
             <a:endParaRPr lang="en-US"/>
           </a:p>
@@ -3863,6 +3864,1197 @@
       </p:grpSpPr>
       <p:pic>
         <p:nvPicPr>
+          <p:cNvPr id="4" name="Picture 3">
+            <a:extLst>
+              <a:ext uri="{FF2B5EF4-FFF2-40B4-BE49-F238E27FC236}">
+                <a16:creationId xmlns:a16="http://schemas.microsoft.com/office/drawing/2014/main" id="{B2057215-55E2-FF91-09E3-6BB9FCAAE2D7}"/>
+              </a:ext>
+            </a:extLst>
+          </p:cNvPr>
+          <p:cNvPicPr>
+            <a:picLocks noChangeAspect="1"/>
+          </p:cNvPicPr>
+          <p:nvPr/>
+        </p:nvPicPr>
+        <p:blipFill>
+          <a:blip r:embed="rId2"/>
+          <a:stretch>
+            <a:fillRect/>
+          </a:stretch>
+        </p:blipFill>
+        <p:spPr>
+          <a:xfrm>
+            <a:off x="0" y="670226"/>
+            <a:ext cx="12192000" cy="5517547"/>
+          </a:xfrm>
+          <a:prstGeom prst="rect">
+            <a:avLst/>
+          </a:prstGeom>
+        </p:spPr>
+      </p:pic>
+      <p:sp>
+        <p:nvSpPr>
+          <p:cNvPr id="5" name="Rectangle: Rounded Corners 4">
+            <a:extLst>
+              <a:ext uri="{FF2B5EF4-FFF2-40B4-BE49-F238E27FC236}">
+                <a16:creationId xmlns:a16="http://schemas.microsoft.com/office/drawing/2014/main" id="{1CD15590-33CD-AE9C-4C4C-A1DFC3A79D96}"/>
+              </a:ext>
+            </a:extLst>
+          </p:cNvPr>
+          <p:cNvSpPr/>
+          <p:nvPr/>
+        </p:nvSpPr>
+        <p:spPr>
+          <a:xfrm>
+            <a:off x="1359961" y="3884905"/>
+            <a:ext cx="5326797" cy="284020"/>
+          </a:xfrm>
+          <a:prstGeom prst="roundRect">
+            <a:avLst/>
+          </a:prstGeom>
+          <a:solidFill>
+            <a:schemeClr val="bg1">
+              <a:lumMod val="50000"/>
+            </a:schemeClr>
+          </a:solidFill>
+          <a:ln>
+            <a:noFill/>
+          </a:ln>
+        </p:spPr>
+        <p:style>
+          <a:lnRef idx="2">
+            <a:schemeClr val="accent1">
+              <a:shade val="15000"/>
+            </a:schemeClr>
+          </a:lnRef>
+          <a:fillRef idx="1">
+            <a:schemeClr val="accent1"/>
+          </a:fillRef>
+          <a:effectRef idx="0">
+            <a:schemeClr val="accent1"/>
+          </a:effectRef>
+          <a:fontRef idx="minor">
+            <a:schemeClr val="lt1"/>
+          </a:fontRef>
+        </p:style>
+        <p:txBody>
+          <a:bodyPr rtlCol="0" anchor="ctr"/>
+          <a:lstStyle/>
+          <a:p>
+            <a:r>
+              <a:rPr lang="en-US" sz="800" b="1">
+                <a:solidFill>
+                  <a:schemeClr val="bg1"/>
+                </a:solidFill>
+              </a:rPr>
+              <a:t>peralatan terbaru</a:t>
+            </a:r>
+          </a:p>
+        </p:txBody>
+      </p:sp>
+      <p:graphicFrame>
+        <p:nvGraphicFramePr>
+          <p:cNvPr id="8" name="Table 7">
+            <a:extLst>
+              <a:ext uri="{FF2B5EF4-FFF2-40B4-BE49-F238E27FC236}">
+                <a16:creationId xmlns:a16="http://schemas.microsoft.com/office/drawing/2014/main" id="{D765A743-C1A0-F9A2-9953-A83E4C01036D}"/>
+              </a:ext>
+            </a:extLst>
+          </p:cNvPr>
+          <p:cNvGraphicFramePr>
+            <a:graphicFrameLocks noGrp="1"/>
+          </p:cNvGraphicFramePr>
+          <p:nvPr>
+            <p:extLst>
+              <p:ext uri="{D42A27DB-BD31-4B8C-83A1-F6EECF244321}">
+                <p14:modId xmlns:p14="http://schemas.microsoft.com/office/powerpoint/2010/main" val="3165002608"/>
+              </p:ext>
+            </p:extLst>
+          </p:nvPr>
+        </p:nvGraphicFramePr>
+        <p:xfrm>
+          <a:off x="1425910" y="4295139"/>
+          <a:ext cx="5199888" cy="1097280"/>
+        </p:xfrm>
+        <a:graphic>
+          <a:graphicData uri="http://schemas.openxmlformats.org/drawingml/2006/table">
+            <a:tbl>
+              <a:tblPr>
+                <a:tableStyleId>{5C22544A-7EE6-4342-B048-85BDC9FD1C3A}</a:tableStyleId>
+              </a:tblPr>
+              <a:tblGrid>
+                <a:gridCol w="517266">
+                  <a:extLst>
+                    <a:ext uri="{9D8B030D-6E8A-4147-A177-3AD203B41FA5}">
+                      <a16:colId xmlns:a16="http://schemas.microsoft.com/office/drawing/2014/main" val="2536449118"/>
+                    </a:ext>
+                  </a:extLst>
+                </a:gridCol>
+                <a:gridCol w="1334003">
+                  <a:extLst>
+                    <a:ext uri="{9D8B030D-6E8A-4147-A177-3AD203B41FA5}">
+                      <a16:colId xmlns:a16="http://schemas.microsoft.com/office/drawing/2014/main" val="937342880"/>
+                    </a:ext>
+                  </a:extLst>
+                </a:gridCol>
+                <a:gridCol w="1415676">
+                  <a:extLst>
+                    <a:ext uri="{9D8B030D-6E8A-4147-A177-3AD203B41FA5}">
+                      <a16:colId xmlns:a16="http://schemas.microsoft.com/office/drawing/2014/main" val="527141037"/>
+                    </a:ext>
+                  </a:extLst>
+                </a:gridCol>
+                <a:gridCol w="1932943">
+                  <a:extLst>
+                    <a:ext uri="{9D8B030D-6E8A-4147-A177-3AD203B41FA5}">
+                      <a16:colId xmlns:a16="http://schemas.microsoft.com/office/drawing/2014/main" val="3342315033"/>
+                    </a:ext>
+                  </a:extLst>
+                </a:gridCol>
+              </a:tblGrid>
+              <a:tr h="182880">
+                <a:tc>
+                  <a:txBody>
+                    <a:bodyPr/>
+                    <a:lstStyle/>
+                    <a:p>
+                      <a:pPr algn="l" fontAlgn="b">
+                        <a:buNone/>
+                      </a:pPr>
+                      <a:r>
+                        <a:rPr lang="en-US" sz="900" u="none" strike="noStrike">
+                          <a:effectLst/>
+                        </a:rPr>
+                        <a:t>No</a:t>
+                      </a:r>
+                      <a:endParaRPr lang="en-US" sz="900" b="0" i="0" u="none" strike="noStrike">
+                        <a:solidFill>
+                          <a:srgbClr val="000000"/>
+                        </a:solidFill>
+                        <a:effectLst/>
+                        <a:latin typeface="Calibri" panose="020F0502020204030204" pitchFamily="34" charset="0"/>
+                      </a:endParaRPr>
+                    </a:p>
+                  </a:txBody>
+                  <a:tcPr marL="7620" marR="7620" marT="7620" marB="0" anchor="b"/>
+                </a:tc>
+                <a:tc>
+                  <a:txBody>
+                    <a:bodyPr/>
+                    <a:lstStyle/>
+                    <a:p>
+                      <a:pPr algn="l" fontAlgn="b">
+                        <a:buNone/>
+                      </a:pPr>
+                      <a:r>
+                        <a:rPr lang="en-US" sz="900" u="none" strike="noStrike">
+                          <a:effectLst/>
+                        </a:rPr>
+                        <a:t>Nama Alat</a:t>
+                      </a:r>
+                      <a:endParaRPr lang="en-US" sz="900" b="0" i="0" u="none" strike="noStrike">
+                        <a:solidFill>
+                          <a:srgbClr val="000000"/>
+                        </a:solidFill>
+                        <a:effectLst/>
+                        <a:latin typeface="Calibri" panose="020F0502020204030204" pitchFamily="34" charset="0"/>
+                      </a:endParaRPr>
+                    </a:p>
+                  </a:txBody>
+                  <a:tcPr marL="7620" marR="7620" marT="7620" marB="0" anchor="b"/>
+                </a:tc>
+                <a:tc>
+                  <a:txBody>
+                    <a:bodyPr/>
+                    <a:lstStyle/>
+                    <a:p>
+                      <a:pPr algn="l" fontAlgn="b">
+                        <a:buNone/>
+                      </a:pPr>
+                      <a:r>
+                        <a:rPr lang="en-US" sz="900" u="none" strike="noStrike">
+                          <a:effectLst/>
+                        </a:rPr>
+                        <a:t>posisi</a:t>
+                      </a:r>
+                      <a:endParaRPr lang="en-US" sz="900" b="0" i="0" u="none" strike="noStrike">
+                        <a:solidFill>
+                          <a:srgbClr val="000000"/>
+                        </a:solidFill>
+                        <a:effectLst/>
+                        <a:latin typeface="Calibri" panose="020F0502020204030204" pitchFamily="34" charset="0"/>
+                      </a:endParaRPr>
+                    </a:p>
+                  </a:txBody>
+                  <a:tcPr marL="7620" marR="7620" marT="7620" marB="0" anchor="b"/>
+                </a:tc>
+                <a:tc>
+                  <a:txBody>
+                    <a:bodyPr/>
+                    <a:lstStyle/>
+                    <a:p>
+                      <a:pPr algn="l" fontAlgn="b">
+                        <a:buNone/>
+                      </a:pPr>
+                      <a:r>
+                        <a:rPr lang="en-US" sz="900" u="none" strike="noStrike">
+                          <a:effectLst/>
+                        </a:rPr>
+                        <a:t>kondisi</a:t>
+                      </a:r>
+                      <a:endParaRPr lang="en-US" sz="900" b="0" i="0" u="none" strike="noStrike">
+                        <a:solidFill>
+                          <a:srgbClr val="000000"/>
+                        </a:solidFill>
+                        <a:effectLst/>
+                        <a:latin typeface="Calibri" panose="020F0502020204030204" pitchFamily="34" charset="0"/>
+                      </a:endParaRPr>
+                    </a:p>
+                  </a:txBody>
+                  <a:tcPr marL="7620" marR="7620" marT="7620" marB="0" anchor="b"/>
+                </a:tc>
+                <a:extLst>
+                  <a:ext uri="{0D108BD9-81ED-4DB2-BD59-A6C34878D82A}">
+                    <a16:rowId xmlns:a16="http://schemas.microsoft.com/office/drawing/2014/main" val="1479695290"/>
+                  </a:ext>
+                </a:extLst>
+              </a:tr>
+              <a:tr h="182880">
+                <a:tc>
+                  <a:txBody>
+                    <a:bodyPr/>
+                    <a:lstStyle/>
+                    <a:p>
+                      <a:pPr algn="r" fontAlgn="b">
+                        <a:buNone/>
+                      </a:pPr>
+                      <a:r>
+                        <a:rPr lang="en-US" sz="900" u="none" strike="noStrike">
+                          <a:effectLst/>
+                        </a:rPr>
+                        <a:t>1</a:t>
+                      </a:r>
+                      <a:endParaRPr lang="en-US" sz="900" b="0" i="0" u="none" strike="noStrike">
+                        <a:solidFill>
+                          <a:srgbClr val="000000"/>
+                        </a:solidFill>
+                        <a:effectLst/>
+                        <a:latin typeface="Calibri" panose="020F0502020204030204" pitchFamily="34" charset="0"/>
+                      </a:endParaRPr>
+                    </a:p>
+                  </a:txBody>
+                  <a:tcPr marL="7620" marR="7620" marT="7620" marB="0" anchor="b"/>
+                </a:tc>
+                <a:tc>
+                  <a:txBody>
+                    <a:bodyPr/>
+                    <a:lstStyle/>
+                    <a:p>
+                      <a:pPr algn="l" fontAlgn="b">
+                        <a:buNone/>
+                      </a:pPr>
+                      <a:r>
+                        <a:rPr lang="en-US" sz="900" u="none" strike="noStrike">
+                          <a:effectLst/>
+                        </a:rPr>
+                        <a:t> </a:t>
+                      </a:r>
+                      <a:endParaRPr lang="en-US" sz="900" b="0" i="0" u="none" strike="noStrike">
+                        <a:solidFill>
+                          <a:srgbClr val="000000"/>
+                        </a:solidFill>
+                        <a:effectLst/>
+                        <a:latin typeface="Calibri" panose="020F0502020204030204" pitchFamily="34" charset="0"/>
+                      </a:endParaRPr>
+                    </a:p>
+                  </a:txBody>
+                  <a:tcPr marL="7620" marR="7620" marT="7620" marB="0" anchor="b"/>
+                </a:tc>
+                <a:tc>
+                  <a:txBody>
+                    <a:bodyPr/>
+                    <a:lstStyle/>
+                    <a:p>
+                      <a:pPr algn="l" fontAlgn="b">
+                        <a:buNone/>
+                      </a:pPr>
+                      <a:r>
+                        <a:rPr lang="en-US" sz="900" u="none" strike="noStrike">
+                          <a:effectLst/>
+                        </a:rPr>
+                        <a:t> </a:t>
+                      </a:r>
+                      <a:endParaRPr lang="en-US" sz="900" b="0" i="0" u="none" strike="noStrike">
+                        <a:solidFill>
+                          <a:srgbClr val="000000"/>
+                        </a:solidFill>
+                        <a:effectLst/>
+                        <a:latin typeface="Calibri" panose="020F0502020204030204" pitchFamily="34" charset="0"/>
+                      </a:endParaRPr>
+                    </a:p>
+                  </a:txBody>
+                  <a:tcPr marL="7620" marR="7620" marT="7620" marB="0" anchor="b"/>
+                </a:tc>
+                <a:tc>
+                  <a:txBody>
+                    <a:bodyPr/>
+                    <a:lstStyle/>
+                    <a:p>
+                      <a:pPr algn="l" fontAlgn="b">
+                        <a:buNone/>
+                      </a:pPr>
+                      <a:r>
+                        <a:rPr lang="en-US" sz="900" u="none" strike="noStrike">
+                          <a:effectLst/>
+                        </a:rPr>
+                        <a:t> </a:t>
+                      </a:r>
+                      <a:endParaRPr lang="en-US" sz="900" b="0" i="0" u="none" strike="noStrike">
+                        <a:solidFill>
+                          <a:srgbClr val="000000"/>
+                        </a:solidFill>
+                        <a:effectLst/>
+                        <a:latin typeface="Calibri" panose="020F0502020204030204" pitchFamily="34" charset="0"/>
+                      </a:endParaRPr>
+                    </a:p>
+                  </a:txBody>
+                  <a:tcPr marL="7620" marR="7620" marT="7620" marB="0" anchor="b"/>
+                </a:tc>
+                <a:extLst>
+                  <a:ext uri="{0D108BD9-81ED-4DB2-BD59-A6C34878D82A}">
+                    <a16:rowId xmlns:a16="http://schemas.microsoft.com/office/drawing/2014/main" val="2403968294"/>
+                  </a:ext>
+                </a:extLst>
+              </a:tr>
+              <a:tr h="182880">
+                <a:tc>
+                  <a:txBody>
+                    <a:bodyPr/>
+                    <a:lstStyle/>
+                    <a:p>
+                      <a:pPr algn="r" fontAlgn="b">
+                        <a:buNone/>
+                      </a:pPr>
+                      <a:r>
+                        <a:rPr lang="en-US" sz="900" u="none" strike="noStrike">
+                          <a:effectLst/>
+                        </a:rPr>
+                        <a:t>2</a:t>
+                      </a:r>
+                      <a:endParaRPr lang="en-US" sz="900" b="0" i="0" u="none" strike="noStrike">
+                        <a:solidFill>
+                          <a:srgbClr val="000000"/>
+                        </a:solidFill>
+                        <a:effectLst/>
+                        <a:latin typeface="Calibri" panose="020F0502020204030204" pitchFamily="34" charset="0"/>
+                      </a:endParaRPr>
+                    </a:p>
+                  </a:txBody>
+                  <a:tcPr marL="7620" marR="7620" marT="7620" marB="0" anchor="b"/>
+                </a:tc>
+                <a:tc>
+                  <a:txBody>
+                    <a:bodyPr/>
+                    <a:lstStyle/>
+                    <a:p>
+                      <a:pPr algn="l" fontAlgn="b">
+                        <a:buNone/>
+                      </a:pPr>
+                      <a:r>
+                        <a:rPr lang="en-US" sz="900" u="none" strike="noStrike">
+                          <a:effectLst/>
+                        </a:rPr>
+                        <a:t> </a:t>
+                      </a:r>
+                      <a:endParaRPr lang="en-US" sz="900" b="0" i="0" u="none" strike="noStrike">
+                        <a:solidFill>
+                          <a:srgbClr val="000000"/>
+                        </a:solidFill>
+                        <a:effectLst/>
+                        <a:latin typeface="Calibri" panose="020F0502020204030204" pitchFamily="34" charset="0"/>
+                      </a:endParaRPr>
+                    </a:p>
+                  </a:txBody>
+                  <a:tcPr marL="7620" marR="7620" marT="7620" marB="0" anchor="b"/>
+                </a:tc>
+                <a:tc>
+                  <a:txBody>
+                    <a:bodyPr/>
+                    <a:lstStyle/>
+                    <a:p>
+                      <a:pPr algn="l" fontAlgn="b">
+                        <a:buNone/>
+                      </a:pPr>
+                      <a:r>
+                        <a:rPr lang="en-US" sz="900" u="none" strike="noStrike">
+                          <a:effectLst/>
+                        </a:rPr>
+                        <a:t> </a:t>
+                      </a:r>
+                      <a:endParaRPr lang="en-US" sz="900" b="0" i="0" u="none" strike="noStrike">
+                        <a:solidFill>
+                          <a:srgbClr val="000000"/>
+                        </a:solidFill>
+                        <a:effectLst/>
+                        <a:latin typeface="Calibri" panose="020F0502020204030204" pitchFamily="34" charset="0"/>
+                      </a:endParaRPr>
+                    </a:p>
+                  </a:txBody>
+                  <a:tcPr marL="7620" marR="7620" marT="7620" marB="0" anchor="b"/>
+                </a:tc>
+                <a:tc>
+                  <a:txBody>
+                    <a:bodyPr/>
+                    <a:lstStyle/>
+                    <a:p>
+                      <a:pPr algn="l" fontAlgn="b">
+                        <a:buNone/>
+                      </a:pPr>
+                      <a:r>
+                        <a:rPr lang="en-US" sz="900" u="none" strike="noStrike">
+                          <a:effectLst/>
+                        </a:rPr>
+                        <a:t> </a:t>
+                      </a:r>
+                      <a:endParaRPr lang="en-US" sz="900" b="0" i="0" u="none" strike="noStrike">
+                        <a:solidFill>
+                          <a:srgbClr val="000000"/>
+                        </a:solidFill>
+                        <a:effectLst/>
+                        <a:latin typeface="Calibri" panose="020F0502020204030204" pitchFamily="34" charset="0"/>
+                      </a:endParaRPr>
+                    </a:p>
+                  </a:txBody>
+                  <a:tcPr marL="7620" marR="7620" marT="7620" marB="0" anchor="b"/>
+                </a:tc>
+                <a:extLst>
+                  <a:ext uri="{0D108BD9-81ED-4DB2-BD59-A6C34878D82A}">
+                    <a16:rowId xmlns:a16="http://schemas.microsoft.com/office/drawing/2014/main" val="2983074990"/>
+                  </a:ext>
+                </a:extLst>
+              </a:tr>
+              <a:tr h="182880">
+                <a:tc>
+                  <a:txBody>
+                    <a:bodyPr/>
+                    <a:lstStyle/>
+                    <a:p>
+                      <a:pPr algn="r" fontAlgn="b">
+                        <a:buNone/>
+                      </a:pPr>
+                      <a:r>
+                        <a:rPr lang="en-US" sz="900" u="none" strike="noStrike">
+                          <a:effectLst/>
+                        </a:rPr>
+                        <a:t>3</a:t>
+                      </a:r>
+                      <a:endParaRPr lang="en-US" sz="900" b="0" i="0" u="none" strike="noStrike">
+                        <a:solidFill>
+                          <a:srgbClr val="000000"/>
+                        </a:solidFill>
+                        <a:effectLst/>
+                        <a:latin typeface="Calibri" panose="020F0502020204030204" pitchFamily="34" charset="0"/>
+                      </a:endParaRPr>
+                    </a:p>
+                  </a:txBody>
+                  <a:tcPr marL="7620" marR="7620" marT="7620" marB="0" anchor="b"/>
+                </a:tc>
+                <a:tc>
+                  <a:txBody>
+                    <a:bodyPr/>
+                    <a:lstStyle/>
+                    <a:p>
+                      <a:pPr algn="l" fontAlgn="b">
+                        <a:buNone/>
+                      </a:pPr>
+                      <a:r>
+                        <a:rPr lang="en-US" sz="900" u="none" strike="noStrike">
+                          <a:effectLst/>
+                        </a:rPr>
+                        <a:t> </a:t>
+                      </a:r>
+                      <a:endParaRPr lang="en-US" sz="900" b="0" i="0" u="none" strike="noStrike">
+                        <a:solidFill>
+                          <a:srgbClr val="000000"/>
+                        </a:solidFill>
+                        <a:effectLst/>
+                        <a:latin typeface="Calibri" panose="020F0502020204030204" pitchFamily="34" charset="0"/>
+                      </a:endParaRPr>
+                    </a:p>
+                  </a:txBody>
+                  <a:tcPr marL="7620" marR="7620" marT="7620" marB="0" anchor="b"/>
+                </a:tc>
+                <a:tc>
+                  <a:txBody>
+                    <a:bodyPr/>
+                    <a:lstStyle/>
+                    <a:p>
+                      <a:pPr algn="l" fontAlgn="b">
+                        <a:buNone/>
+                      </a:pPr>
+                      <a:r>
+                        <a:rPr lang="en-US" sz="900" u="none" strike="noStrike">
+                          <a:effectLst/>
+                        </a:rPr>
+                        <a:t> </a:t>
+                      </a:r>
+                      <a:endParaRPr lang="en-US" sz="900" b="0" i="0" u="none" strike="noStrike">
+                        <a:solidFill>
+                          <a:srgbClr val="000000"/>
+                        </a:solidFill>
+                        <a:effectLst/>
+                        <a:latin typeface="Calibri" panose="020F0502020204030204" pitchFamily="34" charset="0"/>
+                      </a:endParaRPr>
+                    </a:p>
+                  </a:txBody>
+                  <a:tcPr marL="7620" marR="7620" marT="7620" marB="0" anchor="b"/>
+                </a:tc>
+                <a:tc>
+                  <a:txBody>
+                    <a:bodyPr/>
+                    <a:lstStyle/>
+                    <a:p>
+                      <a:pPr algn="l" fontAlgn="b">
+                        <a:buNone/>
+                      </a:pPr>
+                      <a:r>
+                        <a:rPr lang="en-US" sz="900" u="none" strike="noStrike">
+                          <a:effectLst/>
+                        </a:rPr>
+                        <a:t> </a:t>
+                      </a:r>
+                      <a:endParaRPr lang="en-US" sz="900" b="0" i="0" u="none" strike="noStrike">
+                        <a:solidFill>
+                          <a:srgbClr val="000000"/>
+                        </a:solidFill>
+                        <a:effectLst/>
+                        <a:latin typeface="Calibri" panose="020F0502020204030204" pitchFamily="34" charset="0"/>
+                      </a:endParaRPr>
+                    </a:p>
+                  </a:txBody>
+                  <a:tcPr marL="7620" marR="7620" marT="7620" marB="0" anchor="b"/>
+                </a:tc>
+                <a:extLst>
+                  <a:ext uri="{0D108BD9-81ED-4DB2-BD59-A6C34878D82A}">
+                    <a16:rowId xmlns:a16="http://schemas.microsoft.com/office/drawing/2014/main" val="2033012975"/>
+                  </a:ext>
+                </a:extLst>
+              </a:tr>
+              <a:tr h="182880">
+                <a:tc>
+                  <a:txBody>
+                    <a:bodyPr/>
+                    <a:lstStyle/>
+                    <a:p>
+                      <a:pPr algn="r" fontAlgn="b">
+                        <a:buNone/>
+                      </a:pPr>
+                      <a:r>
+                        <a:rPr lang="en-US" sz="900" u="none" strike="noStrike">
+                          <a:effectLst/>
+                        </a:rPr>
+                        <a:t>4</a:t>
+                      </a:r>
+                      <a:endParaRPr lang="en-US" sz="900" b="0" i="0" u="none" strike="noStrike">
+                        <a:solidFill>
+                          <a:srgbClr val="000000"/>
+                        </a:solidFill>
+                        <a:effectLst/>
+                        <a:latin typeface="Calibri" panose="020F0502020204030204" pitchFamily="34" charset="0"/>
+                      </a:endParaRPr>
+                    </a:p>
+                  </a:txBody>
+                  <a:tcPr marL="7620" marR="7620" marT="7620" marB="0" anchor="b"/>
+                </a:tc>
+                <a:tc>
+                  <a:txBody>
+                    <a:bodyPr/>
+                    <a:lstStyle/>
+                    <a:p>
+                      <a:pPr algn="l" fontAlgn="b">
+                        <a:buNone/>
+                      </a:pPr>
+                      <a:r>
+                        <a:rPr lang="en-US" sz="900" u="none" strike="noStrike">
+                          <a:effectLst/>
+                        </a:rPr>
+                        <a:t> </a:t>
+                      </a:r>
+                      <a:endParaRPr lang="en-US" sz="900" b="0" i="0" u="none" strike="noStrike">
+                        <a:solidFill>
+                          <a:srgbClr val="000000"/>
+                        </a:solidFill>
+                        <a:effectLst/>
+                        <a:latin typeface="Calibri" panose="020F0502020204030204" pitchFamily="34" charset="0"/>
+                      </a:endParaRPr>
+                    </a:p>
+                  </a:txBody>
+                  <a:tcPr marL="7620" marR="7620" marT="7620" marB="0" anchor="b"/>
+                </a:tc>
+                <a:tc>
+                  <a:txBody>
+                    <a:bodyPr/>
+                    <a:lstStyle/>
+                    <a:p>
+                      <a:pPr algn="l" fontAlgn="b">
+                        <a:buNone/>
+                      </a:pPr>
+                      <a:r>
+                        <a:rPr lang="en-US" sz="900" u="none" strike="noStrike">
+                          <a:effectLst/>
+                        </a:rPr>
+                        <a:t> </a:t>
+                      </a:r>
+                      <a:endParaRPr lang="en-US" sz="900" b="0" i="0" u="none" strike="noStrike">
+                        <a:solidFill>
+                          <a:srgbClr val="000000"/>
+                        </a:solidFill>
+                        <a:effectLst/>
+                        <a:latin typeface="Calibri" panose="020F0502020204030204" pitchFamily="34" charset="0"/>
+                      </a:endParaRPr>
+                    </a:p>
+                  </a:txBody>
+                  <a:tcPr marL="7620" marR="7620" marT="7620" marB="0" anchor="b"/>
+                </a:tc>
+                <a:tc>
+                  <a:txBody>
+                    <a:bodyPr/>
+                    <a:lstStyle/>
+                    <a:p>
+                      <a:pPr algn="l" fontAlgn="b">
+                        <a:buNone/>
+                      </a:pPr>
+                      <a:r>
+                        <a:rPr lang="en-US" sz="900" u="none" strike="noStrike">
+                          <a:effectLst/>
+                        </a:rPr>
+                        <a:t> </a:t>
+                      </a:r>
+                      <a:endParaRPr lang="en-US" sz="900" b="0" i="0" u="none" strike="noStrike">
+                        <a:solidFill>
+                          <a:srgbClr val="000000"/>
+                        </a:solidFill>
+                        <a:effectLst/>
+                        <a:latin typeface="Calibri" panose="020F0502020204030204" pitchFamily="34" charset="0"/>
+                      </a:endParaRPr>
+                    </a:p>
+                  </a:txBody>
+                  <a:tcPr marL="7620" marR="7620" marT="7620" marB="0" anchor="b"/>
+                </a:tc>
+                <a:extLst>
+                  <a:ext uri="{0D108BD9-81ED-4DB2-BD59-A6C34878D82A}">
+                    <a16:rowId xmlns:a16="http://schemas.microsoft.com/office/drawing/2014/main" val="998884347"/>
+                  </a:ext>
+                </a:extLst>
+              </a:tr>
+              <a:tr h="182880">
+                <a:tc>
+                  <a:txBody>
+                    <a:bodyPr/>
+                    <a:lstStyle/>
+                    <a:p>
+                      <a:pPr algn="r" fontAlgn="b">
+                        <a:buNone/>
+                      </a:pPr>
+                      <a:r>
+                        <a:rPr lang="en-US" sz="900" u="none" strike="noStrike">
+                          <a:effectLst/>
+                        </a:rPr>
+                        <a:t>5</a:t>
+                      </a:r>
+                      <a:endParaRPr lang="en-US" sz="900" b="0" i="0" u="none" strike="noStrike">
+                        <a:solidFill>
+                          <a:srgbClr val="000000"/>
+                        </a:solidFill>
+                        <a:effectLst/>
+                        <a:latin typeface="Calibri" panose="020F0502020204030204" pitchFamily="34" charset="0"/>
+                      </a:endParaRPr>
+                    </a:p>
+                  </a:txBody>
+                  <a:tcPr marL="7620" marR="7620" marT="7620" marB="0" anchor="b"/>
+                </a:tc>
+                <a:tc>
+                  <a:txBody>
+                    <a:bodyPr/>
+                    <a:lstStyle/>
+                    <a:p>
+                      <a:pPr algn="l" fontAlgn="b">
+                        <a:buNone/>
+                      </a:pPr>
+                      <a:r>
+                        <a:rPr lang="en-US" sz="900" u="none" strike="noStrike">
+                          <a:effectLst/>
+                        </a:rPr>
+                        <a:t> </a:t>
+                      </a:r>
+                      <a:endParaRPr lang="en-US" sz="900" b="0" i="0" u="none" strike="noStrike">
+                        <a:solidFill>
+                          <a:srgbClr val="000000"/>
+                        </a:solidFill>
+                        <a:effectLst/>
+                        <a:latin typeface="Calibri" panose="020F0502020204030204" pitchFamily="34" charset="0"/>
+                      </a:endParaRPr>
+                    </a:p>
+                  </a:txBody>
+                  <a:tcPr marL="7620" marR="7620" marT="7620" marB="0" anchor="b"/>
+                </a:tc>
+                <a:tc>
+                  <a:txBody>
+                    <a:bodyPr/>
+                    <a:lstStyle/>
+                    <a:p>
+                      <a:pPr algn="l" fontAlgn="b">
+                        <a:buNone/>
+                      </a:pPr>
+                      <a:r>
+                        <a:rPr lang="en-US" sz="900" u="none" strike="noStrike">
+                          <a:effectLst/>
+                        </a:rPr>
+                        <a:t> </a:t>
+                      </a:r>
+                      <a:endParaRPr lang="en-US" sz="900" b="0" i="0" u="none" strike="noStrike">
+                        <a:solidFill>
+                          <a:srgbClr val="000000"/>
+                        </a:solidFill>
+                        <a:effectLst/>
+                        <a:latin typeface="Calibri" panose="020F0502020204030204" pitchFamily="34" charset="0"/>
+                      </a:endParaRPr>
+                    </a:p>
+                  </a:txBody>
+                  <a:tcPr marL="7620" marR="7620" marT="7620" marB="0" anchor="b"/>
+                </a:tc>
+                <a:tc>
+                  <a:txBody>
+                    <a:bodyPr/>
+                    <a:lstStyle/>
+                    <a:p>
+                      <a:pPr algn="l" fontAlgn="b">
+                        <a:buNone/>
+                      </a:pPr>
+                      <a:r>
+                        <a:rPr lang="en-US" sz="900" u="none" strike="noStrike">
+                          <a:effectLst/>
+                        </a:rPr>
+                        <a:t> </a:t>
+                      </a:r>
+                      <a:endParaRPr lang="en-US" sz="900" b="0" i="0" u="none" strike="noStrike">
+                        <a:solidFill>
+                          <a:srgbClr val="000000"/>
+                        </a:solidFill>
+                        <a:effectLst/>
+                        <a:latin typeface="Calibri" panose="020F0502020204030204" pitchFamily="34" charset="0"/>
+                      </a:endParaRPr>
+                    </a:p>
+                  </a:txBody>
+                  <a:tcPr marL="7620" marR="7620" marT="7620" marB="0" anchor="b"/>
+                </a:tc>
+                <a:extLst>
+                  <a:ext uri="{0D108BD9-81ED-4DB2-BD59-A6C34878D82A}">
+                    <a16:rowId xmlns:a16="http://schemas.microsoft.com/office/drawing/2014/main" val="2828225722"/>
+                  </a:ext>
+                </a:extLst>
+              </a:tr>
+            </a:tbl>
+          </a:graphicData>
+        </a:graphic>
+      </p:graphicFrame>
+    </p:spTree>
+    <p:extLst>
+      <p:ext uri="{BB962C8B-B14F-4D97-AF65-F5344CB8AC3E}">
+        <p14:creationId xmlns:p14="http://schemas.microsoft.com/office/powerpoint/2010/main" val="1597641754"/>
+      </p:ext>
+    </p:extLst>
+  </p:cSld>
+  <p:clrMapOvr>
+    <a:masterClrMapping/>
+  </p:clrMapOvr>
+</p:sld>
+</file>
+
+<file path=ppt/slides/slide10.xml><?xml version="1.0" encoding="utf-8"?>
+<p:sld xmlns:a="http://schemas.openxmlformats.org/drawingml/2006/main" xmlns:r="http://schemas.openxmlformats.org/officeDocument/2006/relationships" xmlns:p="http://schemas.openxmlformats.org/presentationml/2006/main">
+  <p:cSld>
+    <p:spTree>
+      <p:nvGrpSpPr>
+        <p:cNvPr id="1" name="">
+          <a:extLst>
+            <a:ext uri="{FF2B5EF4-FFF2-40B4-BE49-F238E27FC236}">
+              <a16:creationId xmlns:a16="http://schemas.microsoft.com/office/drawing/2014/main" id="{613E1468-512E-D483-8B23-3F382B04231B}"/>
+            </a:ext>
+          </a:extLst>
+        </p:cNvPr>
+        <p:cNvGrpSpPr/>
+        <p:nvPr/>
+      </p:nvGrpSpPr>
+      <p:grpSpPr>
+        <a:xfrm>
+          <a:off x="0" y="0"/>
+          <a:ext cx="0" cy="0"/>
+          <a:chOff x="0" y="0"/>
+          <a:chExt cx="0" cy="0"/>
+        </a:xfrm>
+      </p:grpSpPr>
+      <p:pic>
+        <p:nvPicPr>
+          <p:cNvPr id="18" name="Picture 17">
+            <a:extLst>
+              <a:ext uri="{FF2B5EF4-FFF2-40B4-BE49-F238E27FC236}">
+                <a16:creationId xmlns:a16="http://schemas.microsoft.com/office/drawing/2014/main" id="{596D81BC-4A09-9F46-92CD-B86B0CCEEA35}"/>
+              </a:ext>
+            </a:extLst>
+          </p:cNvPr>
+          <p:cNvPicPr>
+            <a:picLocks noChangeAspect="1"/>
+          </p:cNvPicPr>
+          <p:nvPr/>
+        </p:nvPicPr>
+        <p:blipFill>
+          <a:blip r:embed="rId3"/>
+          <a:stretch>
+            <a:fillRect/>
+          </a:stretch>
+        </p:blipFill>
+        <p:spPr>
+          <a:xfrm>
+            <a:off x="1167800" y="397769"/>
+            <a:ext cx="9856400" cy="4561693"/>
+          </a:xfrm>
+          <a:prstGeom prst="rect">
+            <a:avLst/>
+          </a:prstGeom>
+        </p:spPr>
+      </p:pic>
+      <p:pic>
+        <p:nvPicPr>
+          <p:cNvPr id="20" name="Picture 19">
+            <a:extLst>
+              <a:ext uri="{FF2B5EF4-FFF2-40B4-BE49-F238E27FC236}">
+                <a16:creationId xmlns:a16="http://schemas.microsoft.com/office/drawing/2014/main" id="{ADCD799A-D444-D2C4-64C8-E5350B9EFC61}"/>
+              </a:ext>
+            </a:extLst>
+          </p:cNvPr>
+          <p:cNvPicPr>
+            <a:picLocks noChangeAspect="1"/>
+          </p:cNvPicPr>
+          <p:nvPr/>
+        </p:nvPicPr>
+        <p:blipFill>
+          <a:blip r:embed="rId4"/>
+          <a:stretch>
+            <a:fillRect/>
+          </a:stretch>
+        </p:blipFill>
+        <p:spPr>
+          <a:xfrm>
+            <a:off x="3064213" y="4959462"/>
+            <a:ext cx="7855704" cy="1711704"/>
+          </a:xfrm>
+          <a:prstGeom prst="rect">
+            <a:avLst/>
+          </a:prstGeom>
+        </p:spPr>
+      </p:pic>
+    </p:spTree>
+    <p:extLst>
+      <p:ext uri="{BB962C8B-B14F-4D97-AF65-F5344CB8AC3E}">
+        <p14:creationId xmlns:p14="http://schemas.microsoft.com/office/powerpoint/2010/main" val="1649722496"/>
+      </p:ext>
+    </p:extLst>
+  </p:cSld>
+  <p:clrMapOvr>
+    <a:masterClrMapping/>
+  </p:clrMapOvr>
+</p:sld>
+</file>
+
+<file path=ppt/slides/slide11.xml><?xml version="1.0" encoding="utf-8"?>
+<p:sld xmlns:a="http://schemas.openxmlformats.org/drawingml/2006/main" xmlns:r="http://schemas.openxmlformats.org/officeDocument/2006/relationships" xmlns:p="http://schemas.openxmlformats.org/presentationml/2006/main">
+  <p:cSld>
+    <p:spTree>
+      <p:nvGrpSpPr>
+        <p:cNvPr id="1" name="">
+          <a:extLst>
+            <a:ext uri="{FF2B5EF4-FFF2-40B4-BE49-F238E27FC236}">
+              <a16:creationId xmlns:a16="http://schemas.microsoft.com/office/drawing/2014/main" id="{613E1468-512E-D483-8B23-3F382B04231B}"/>
+            </a:ext>
+          </a:extLst>
+        </p:cNvPr>
+        <p:cNvGrpSpPr/>
+        <p:nvPr/>
+      </p:nvGrpSpPr>
+      <p:grpSpPr>
+        <a:xfrm>
+          <a:off x="0" y="0"/>
+          <a:ext cx="0" cy="0"/>
+          <a:chOff x="0" y="0"/>
+          <a:chExt cx="0" cy="0"/>
+        </a:xfrm>
+      </p:grpSpPr>
+      <p:pic>
+        <p:nvPicPr>
+          <p:cNvPr id="3" name="Picture 2">
+            <a:extLst>
+              <a:ext uri="{FF2B5EF4-FFF2-40B4-BE49-F238E27FC236}">
+                <a16:creationId xmlns:a16="http://schemas.microsoft.com/office/drawing/2014/main" id="{82DAF03B-F2C1-CC6C-2011-C7790721DA07}"/>
+              </a:ext>
+            </a:extLst>
+          </p:cNvPr>
+          <p:cNvPicPr>
+            <a:picLocks noChangeAspect="1"/>
+          </p:cNvPicPr>
+          <p:nvPr/>
+        </p:nvPicPr>
+        <p:blipFill>
+          <a:blip r:embed="rId3"/>
+          <a:srcRect b="21528"/>
+          <a:stretch>
+            <a:fillRect/>
+          </a:stretch>
+        </p:blipFill>
+        <p:spPr>
+          <a:xfrm>
+            <a:off x="0" y="592152"/>
+            <a:ext cx="12192000" cy="4452288"/>
+          </a:xfrm>
+          <a:prstGeom prst="rect">
+            <a:avLst/>
+          </a:prstGeom>
+        </p:spPr>
+      </p:pic>
+      <p:sp>
+        <p:nvSpPr>
+          <p:cNvPr id="4" name="Rectangle 3">
+            <a:extLst>
+              <a:ext uri="{FF2B5EF4-FFF2-40B4-BE49-F238E27FC236}">
+                <a16:creationId xmlns:a16="http://schemas.microsoft.com/office/drawing/2014/main" id="{1A347928-C4DF-A1D6-849E-A47A9F8F79C9}"/>
+              </a:ext>
+            </a:extLst>
+          </p:cNvPr>
+          <p:cNvSpPr/>
+          <p:nvPr/>
+        </p:nvSpPr>
+        <p:spPr>
+          <a:xfrm>
+            <a:off x="1478280" y="4434840"/>
+            <a:ext cx="9791700" cy="281940"/>
+          </a:xfrm>
+          <a:prstGeom prst="rect">
+            <a:avLst/>
+          </a:prstGeom>
+          <a:solidFill>
+            <a:schemeClr val="bg1"/>
+          </a:solidFill>
+          <a:ln>
+            <a:solidFill>
+              <a:schemeClr val="bg1"/>
+            </a:solidFill>
+          </a:ln>
+        </p:spPr>
+        <p:style>
+          <a:lnRef idx="2">
+            <a:schemeClr val="accent1">
+              <a:shade val="15000"/>
+            </a:schemeClr>
+          </a:lnRef>
+          <a:fillRef idx="1">
+            <a:schemeClr val="accent1"/>
+          </a:fillRef>
+          <a:effectRef idx="0">
+            <a:schemeClr val="accent1"/>
+          </a:effectRef>
+          <a:fontRef idx="minor">
+            <a:schemeClr val="lt1"/>
+          </a:fontRef>
+        </p:style>
+        <p:txBody>
+          <a:bodyPr rtlCol="0" anchor="ctr"/>
+          <a:lstStyle/>
+          <a:p>
+            <a:pPr algn="ctr"/>
+            <a:endParaRPr lang="en-US"/>
+          </a:p>
+        </p:txBody>
+      </p:sp>
+      <p:pic>
+        <p:nvPicPr>
+          <p:cNvPr id="6" name="Picture 5">
+            <a:extLst>
+              <a:ext uri="{FF2B5EF4-FFF2-40B4-BE49-F238E27FC236}">
+                <a16:creationId xmlns:a16="http://schemas.microsoft.com/office/drawing/2014/main" id="{699CC983-AD80-9789-4BA4-884172C145B7}"/>
+              </a:ext>
+            </a:extLst>
+          </p:cNvPr>
+          <p:cNvPicPr>
+            <a:picLocks noChangeAspect="1"/>
+          </p:cNvPicPr>
+          <p:nvPr/>
+        </p:nvPicPr>
+        <p:blipFill>
+          <a:blip r:embed="rId4"/>
+          <a:stretch>
+            <a:fillRect/>
+          </a:stretch>
+        </p:blipFill>
+        <p:spPr>
+          <a:xfrm>
+            <a:off x="1478280" y="4434840"/>
+            <a:ext cx="7986259" cy="343112"/>
+          </a:xfrm>
+          <a:prstGeom prst="rect">
+            <a:avLst/>
+          </a:prstGeom>
+        </p:spPr>
+      </p:pic>
+      <p:pic>
+        <p:nvPicPr>
+          <p:cNvPr id="7" name="Picture 6">
+            <a:extLst>
+              <a:ext uri="{FF2B5EF4-FFF2-40B4-BE49-F238E27FC236}">
+                <a16:creationId xmlns:a16="http://schemas.microsoft.com/office/drawing/2014/main" id="{6D44F9E4-22D9-5425-4E57-954D4A5E66EC}"/>
+              </a:ext>
+            </a:extLst>
+          </p:cNvPr>
+          <p:cNvPicPr>
+            <a:picLocks noChangeAspect="1"/>
+          </p:cNvPicPr>
+          <p:nvPr/>
+        </p:nvPicPr>
+        <p:blipFill>
+          <a:blip r:embed="rId3"/>
+          <a:srcRect t="79278"/>
+          <a:stretch>
+            <a:fillRect/>
+          </a:stretch>
+        </p:blipFill>
+        <p:spPr>
+          <a:xfrm>
+            <a:off x="0" y="5276850"/>
+            <a:ext cx="12192000" cy="1175688"/>
+          </a:xfrm>
+          <a:prstGeom prst="rect">
+            <a:avLst/>
+          </a:prstGeom>
+        </p:spPr>
+      </p:pic>
+      <p:pic>
+        <p:nvPicPr>
+          <p:cNvPr id="8" name="Picture 7">
+            <a:extLst>
+              <a:ext uri="{FF2B5EF4-FFF2-40B4-BE49-F238E27FC236}">
+                <a16:creationId xmlns:a16="http://schemas.microsoft.com/office/drawing/2014/main" id="{8C5AEB47-647F-9F34-5132-A54C343C5714}"/>
+              </a:ext>
+            </a:extLst>
+          </p:cNvPr>
+          <p:cNvPicPr>
+            <a:picLocks noChangeAspect="1"/>
+          </p:cNvPicPr>
+          <p:nvPr/>
+        </p:nvPicPr>
+        <p:blipFill>
+          <a:blip r:embed="rId5"/>
+          <a:srcRect t="1404" b="78551"/>
+          <a:stretch>
+            <a:fillRect/>
+          </a:stretch>
+        </p:blipFill>
+        <p:spPr>
+          <a:xfrm>
+            <a:off x="1478280" y="5048038"/>
+            <a:ext cx="9517837" cy="343112"/>
+          </a:xfrm>
+          <a:prstGeom prst="rect">
+            <a:avLst/>
+          </a:prstGeom>
+        </p:spPr>
+      </p:pic>
+      <p:sp>
+        <p:nvSpPr>
+          <p:cNvPr id="9" name="TextBox 8">
+            <a:extLst>
+              <a:ext uri="{FF2B5EF4-FFF2-40B4-BE49-F238E27FC236}">
+                <a16:creationId xmlns:a16="http://schemas.microsoft.com/office/drawing/2014/main" id="{1633556E-68F2-9723-C725-FB4913D0DC62}"/>
+              </a:ext>
+            </a:extLst>
+          </p:cNvPr>
+          <p:cNvSpPr txBox="1"/>
+          <p:nvPr/>
+        </p:nvSpPr>
+        <p:spPr>
+          <a:xfrm>
+            <a:off x="9464539" y="4434840"/>
+            <a:ext cx="1866401" cy="430887"/>
+          </a:xfrm>
+          <a:prstGeom prst="rect">
+            <a:avLst/>
+          </a:prstGeom>
+          <a:noFill/>
+          <a:ln>
+            <a:solidFill>
+              <a:schemeClr val="bg1">
+                <a:lumMod val="85000"/>
+              </a:schemeClr>
+            </a:solidFill>
+          </a:ln>
+        </p:spPr>
+        <p:txBody>
+          <a:bodyPr wrap="square" rtlCol="0">
+            <a:spAutoFit/>
+          </a:bodyPr>
+          <a:lstStyle/>
+          <a:p>
+            <a:pPr algn="ctr"/>
+            <a:r>
+              <a:rPr lang="en-US" sz="1100">
+                <a:solidFill>
+                  <a:schemeClr val="accent2">
+                    <a:lumMod val="60000"/>
+                    <a:lumOff val="40000"/>
+                  </a:schemeClr>
+                </a:solidFill>
+              </a:rPr>
+              <a:t>[harga ambil data dari tb gedung]</a:t>
+            </a:r>
+          </a:p>
+        </p:txBody>
+      </p:sp>
+    </p:spTree>
+    <p:extLst>
+      <p:ext uri="{BB962C8B-B14F-4D97-AF65-F5344CB8AC3E}">
+        <p14:creationId xmlns:p14="http://schemas.microsoft.com/office/powerpoint/2010/main" val="560037392"/>
+      </p:ext>
+    </p:extLst>
+  </p:cSld>
+  <p:clrMapOvr>
+    <a:masterClrMapping/>
+  </p:clrMapOvr>
+</p:sld>
+</file>
+
+<file path=ppt/slides/slide2.xml><?xml version="1.0" encoding="utf-8"?>
+<p:sld xmlns:a="http://schemas.openxmlformats.org/drawingml/2006/main" xmlns:r="http://schemas.openxmlformats.org/officeDocument/2006/relationships" xmlns:p="http://schemas.openxmlformats.org/presentationml/2006/main">
+  <p:cSld>
+    <p:spTree>
+      <p:nvGrpSpPr>
+        <p:cNvPr id="1" name="">
+          <a:extLst>
+            <a:ext uri="{FF2B5EF4-FFF2-40B4-BE49-F238E27FC236}">
+              <a16:creationId xmlns:a16="http://schemas.microsoft.com/office/drawing/2014/main" id="{163110F5-6F6D-413E-FC99-133EC870DC5D}"/>
+            </a:ext>
+          </a:extLst>
+        </p:cNvPr>
+        <p:cNvGrpSpPr/>
+        <p:nvPr/>
+      </p:nvGrpSpPr>
+      <p:grpSpPr>
+        <a:xfrm>
+          <a:off x="0" y="0"/>
+          <a:ext cx="0" cy="0"/>
+          <a:chOff x="0" y="0"/>
+          <a:chExt cx="0" cy="0"/>
+        </a:xfrm>
+      </p:grpSpPr>
+      <p:pic>
+        <p:nvPicPr>
           <p:cNvPr id="3" name="Picture 2">
             <a:extLst>
               <a:ext uri="{FF2B5EF4-FFF2-40B4-BE49-F238E27FC236}">
@@ -3961,13 +5153,7 @@
           <p:cNvGraphicFramePr>
             <a:graphicFrameLocks noGrp="1"/>
           </p:cNvGraphicFramePr>
-          <p:nvPr>
-            <p:extLst>
-              <p:ext uri="{D42A27DB-BD31-4B8C-83A1-F6EECF244321}">
-                <p14:modId xmlns:p14="http://schemas.microsoft.com/office/powerpoint/2010/main" val="957581502"/>
-              </p:ext>
-            </p:extLst>
-          </p:nvPr>
+          <p:nvPr/>
         </p:nvGraphicFramePr>
         <p:xfrm>
           <a:off x="1472092" y="4858557"/>
@@ -4658,483 +5844,7 @@
     </p:spTree>
     <p:extLst>
       <p:ext uri="{BB962C8B-B14F-4D97-AF65-F5344CB8AC3E}">
-        <p14:creationId xmlns:p14="http://schemas.microsoft.com/office/powerpoint/2010/main" val="1597641754"/>
-      </p:ext>
-    </p:extLst>
-  </p:cSld>
-  <p:clrMapOvr>
-    <a:masterClrMapping/>
-  </p:clrMapOvr>
-</p:sld>
-</file>
-
-<file path=ppt/slides/slide10.xml><?xml version="1.0" encoding="utf-8"?>
-<p:sld xmlns:a="http://schemas.openxmlformats.org/drawingml/2006/main" xmlns:r="http://schemas.openxmlformats.org/officeDocument/2006/relationships" xmlns:p="http://schemas.openxmlformats.org/presentationml/2006/main">
-  <p:cSld>
-    <p:spTree>
-      <p:nvGrpSpPr>
-        <p:cNvPr id="1" name="">
-          <a:extLst>
-            <a:ext uri="{FF2B5EF4-FFF2-40B4-BE49-F238E27FC236}">
-              <a16:creationId xmlns:a16="http://schemas.microsoft.com/office/drawing/2014/main" id="{613E1468-512E-D483-8B23-3F382B04231B}"/>
-            </a:ext>
-          </a:extLst>
-        </p:cNvPr>
-        <p:cNvGrpSpPr/>
-        <p:nvPr/>
-      </p:nvGrpSpPr>
-      <p:grpSpPr>
-        <a:xfrm>
-          <a:off x="0" y="0"/>
-          <a:ext cx="0" cy="0"/>
-          <a:chOff x="0" y="0"/>
-          <a:chExt cx="0" cy="0"/>
-        </a:xfrm>
-      </p:grpSpPr>
-      <p:pic>
-        <p:nvPicPr>
-          <p:cNvPr id="3" name="Picture 2">
-            <a:extLst>
-              <a:ext uri="{FF2B5EF4-FFF2-40B4-BE49-F238E27FC236}">
-                <a16:creationId xmlns:a16="http://schemas.microsoft.com/office/drawing/2014/main" id="{82DAF03B-F2C1-CC6C-2011-C7790721DA07}"/>
-              </a:ext>
-            </a:extLst>
-          </p:cNvPr>
-          <p:cNvPicPr>
-            <a:picLocks noChangeAspect="1"/>
-          </p:cNvPicPr>
-          <p:nvPr/>
-        </p:nvPicPr>
-        <p:blipFill>
-          <a:blip r:embed="rId3"/>
-          <a:srcRect b="21528"/>
-          <a:stretch>
-            <a:fillRect/>
-          </a:stretch>
-        </p:blipFill>
-        <p:spPr>
-          <a:xfrm>
-            <a:off x="0" y="592152"/>
-            <a:ext cx="12192000" cy="4452288"/>
-          </a:xfrm>
-          <a:prstGeom prst="rect">
-            <a:avLst/>
-          </a:prstGeom>
-        </p:spPr>
-      </p:pic>
-      <p:sp>
-        <p:nvSpPr>
-          <p:cNvPr id="4" name="Rectangle 3">
-            <a:extLst>
-              <a:ext uri="{FF2B5EF4-FFF2-40B4-BE49-F238E27FC236}">
-                <a16:creationId xmlns:a16="http://schemas.microsoft.com/office/drawing/2014/main" id="{1A347928-C4DF-A1D6-849E-A47A9F8F79C9}"/>
-              </a:ext>
-            </a:extLst>
-          </p:cNvPr>
-          <p:cNvSpPr/>
-          <p:nvPr/>
-        </p:nvSpPr>
-        <p:spPr>
-          <a:xfrm>
-            <a:off x="1478280" y="4434840"/>
-            <a:ext cx="9791700" cy="281940"/>
-          </a:xfrm>
-          <a:prstGeom prst="rect">
-            <a:avLst/>
-          </a:prstGeom>
-          <a:solidFill>
-            <a:schemeClr val="bg1"/>
-          </a:solidFill>
-          <a:ln>
-            <a:solidFill>
-              <a:schemeClr val="bg1"/>
-            </a:solidFill>
-          </a:ln>
-        </p:spPr>
-        <p:style>
-          <a:lnRef idx="2">
-            <a:schemeClr val="accent1">
-              <a:shade val="15000"/>
-            </a:schemeClr>
-          </a:lnRef>
-          <a:fillRef idx="1">
-            <a:schemeClr val="accent1"/>
-          </a:fillRef>
-          <a:effectRef idx="0">
-            <a:schemeClr val="accent1"/>
-          </a:effectRef>
-          <a:fontRef idx="minor">
-            <a:schemeClr val="lt1"/>
-          </a:fontRef>
-        </p:style>
-        <p:txBody>
-          <a:bodyPr rtlCol="0" anchor="ctr"/>
-          <a:lstStyle/>
-          <a:p>
-            <a:pPr algn="ctr"/>
-            <a:endParaRPr lang="en-US"/>
-          </a:p>
-        </p:txBody>
-      </p:sp>
-      <p:pic>
-        <p:nvPicPr>
-          <p:cNvPr id="6" name="Picture 5">
-            <a:extLst>
-              <a:ext uri="{FF2B5EF4-FFF2-40B4-BE49-F238E27FC236}">
-                <a16:creationId xmlns:a16="http://schemas.microsoft.com/office/drawing/2014/main" id="{699CC983-AD80-9789-4BA4-884172C145B7}"/>
-              </a:ext>
-            </a:extLst>
-          </p:cNvPr>
-          <p:cNvPicPr>
-            <a:picLocks noChangeAspect="1"/>
-          </p:cNvPicPr>
-          <p:nvPr/>
-        </p:nvPicPr>
-        <p:blipFill>
-          <a:blip r:embed="rId4"/>
-          <a:stretch>
-            <a:fillRect/>
-          </a:stretch>
-        </p:blipFill>
-        <p:spPr>
-          <a:xfrm>
-            <a:off x="1478280" y="4434840"/>
-            <a:ext cx="7986259" cy="343112"/>
-          </a:xfrm>
-          <a:prstGeom prst="rect">
-            <a:avLst/>
-          </a:prstGeom>
-        </p:spPr>
-      </p:pic>
-      <p:pic>
-        <p:nvPicPr>
-          <p:cNvPr id="7" name="Picture 6">
-            <a:extLst>
-              <a:ext uri="{FF2B5EF4-FFF2-40B4-BE49-F238E27FC236}">
-                <a16:creationId xmlns:a16="http://schemas.microsoft.com/office/drawing/2014/main" id="{6D44F9E4-22D9-5425-4E57-954D4A5E66EC}"/>
-              </a:ext>
-            </a:extLst>
-          </p:cNvPr>
-          <p:cNvPicPr>
-            <a:picLocks noChangeAspect="1"/>
-          </p:cNvPicPr>
-          <p:nvPr/>
-        </p:nvPicPr>
-        <p:blipFill>
-          <a:blip r:embed="rId3"/>
-          <a:srcRect t="79278"/>
-          <a:stretch>
-            <a:fillRect/>
-          </a:stretch>
-        </p:blipFill>
-        <p:spPr>
-          <a:xfrm>
-            <a:off x="0" y="5276850"/>
-            <a:ext cx="12192000" cy="1175688"/>
-          </a:xfrm>
-          <a:prstGeom prst="rect">
-            <a:avLst/>
-          </a:prstGeom>
-        </p:spPr>
-      </p:pic>
-      <p:pic>
-        <p:nvPicPr>
-          <p:cNvPr id="8" name="Picture 7">
-            <a:extLst>
-              <a:ext uri="{FF2B5EF4-FFF2-40B4-BE49-F238E27FC236}">
-                <a16:creationId xmlns:a16="http://schemas.microsoft.com/office/drawing/2014/main" id="{8C5AEB47-647F-9F34-5132-A54C343C5714}"/>
-              </a:ext>
-            </a:extLst>
-          </p:cNvPr>
-          <p:cNvPicPr>
-            <a:picLocks noChangeAspect="1"/>
-          </p:cNvPicPr>
-          <p:nvPr/>
-        </p:nvPicPr>
-        <p:blipFill>
-          <a:blip r:embed="rId5"/>
-          <a:srcRect t="1404" b="78551"/>
-          <a:stretch>
-            <a:fillRect/>
-          </a:stretch>
-        </p:blipFill>
-        <p:spPr>
-          <a:xfrm>
-            <a:off x="1478280" y="5048038"/>
-            <a:ext cx="9517837" cy="343112"/>
-          </a:xfrm>
-          <a:prstGeom prst="rect">
-            <a:avLst/>
-          </a:prstGeom>
-        </p:spPr>
-      </p:pic>
-      <p:sp>
-        <p:nvSpPr>
-          <p:cNvPr id="9" name="TextBox 8">
-            <a:extLst>
-              <a:ext uri="{FF2B5EF4-FFF2-40B4-BE49-F238E27FC236}">
-                <a16:creationId xmlns:a16="http://schemas.microsoft.com/office/drawing/2014/main" id="{1633556E-68F2-9723-C725-FB4913D0DC62}"/>
-              </a:ext>
-            </a:extLst>
-          </p:cNvPr>
-          <p:cNvSpPr txBox="1"/>
-          <p:nvPr/>
-        </p:nvSpPr>
-        <p:spPr>
-          <a:xfrm>
-            <a:off x="9464539" y="4434840"/>
-            <a:ext cx="1866401" cy="430887"/>
-          </a:xfrm>
-          <a:prstGeom prst="rect">
-            <a:avLst/>
-          </a:prstGeom>
-          <a:noFill/>
-          <a:ln>
-            <a:solidFill>
-              <a:schemeClr val="bg1">
-                <a:lumMod val="85000"/>
-              </a:schemeClr>
-            </a:solidFill>
-          </a:ln>
-        </p:spPr>
-        <p:txBody>
-          <a:bodyPr wrap="square" rtlCol="0">
-            <a:spAutoFit/>
-          </a:bodyPr>
-          <a:lstStyle/>
-          <a:p>
-            <a:pPr algn="ctr"/>
-            <a:r>
-              <a:rPr lang="en-US" sz="1100">
-                <a:solidFill>
-                  <a:schemeClr val="accent2">
-                    <a:lumMod val="60000"/>
-                    <a:lumOff val="40000"/>
-                  </a:schemeClr>
-                </a:solidFill>
-              </a:rPr>
-              <a:t>[harga ambil data dari tb gedung]</a:t>
-            </a:r>
-          </a:p>
-        </p:txBody>
-      </p:sp>
-    </p:spTree>
-    <p:extLst>
-      <p:ext uri="{BB962C8B-B14F-4D97-AF65-F5344CB8AC3E}">
-        <p14:creationId xmlns:p14="http://schemas.microsoft.com/office/powerpoint/2010/main" val="560037392"/>
-      </p:ext>
-    </p:extLst>
-  </p:cSld>
-  <p:clrMapOvr>
-    <a:masterClrMapping/>
-  </p:clrMapOvr>
-</p:sld>
-</file>
-
-<file path=ppt/slides/slide2.xml><?xml version="1.0" encoding="utf-8"?>
-<p:sld xmlns:a="http://schemas.openxmlformats.org/drawingml/2006/main" xmlns:r="http://schemas.openxmlformats.org/officeDocument/2006/relationships" xmlns:p="http://schemas.openxmlformats.org/presentationml/2006/main">
-  <p:cSld>
-    <p:spTree>
-      <p:nvGrpSpPr>
-        <p:cNvPr id="1" name="">
-          <a:extLst>
-            <a:ext uri="{FF2B5EF4-FFF2-40B4-BE49-F238E27FC236}">
-              <a16:creationId xmlns:a16="http://schemas.microsoft.com/office/drawing/2014/main" id="{163110F5-6F6D-413E-FC99-133EC870DC5D}"/>
-            </a:ext>
-          </a:extLst>
-        </p:cNvPr>
-        <p:cNvGrpSpPr/>
-        <p:nvPr/>
-      </p:nvGrpSpPr>
-      <p:grpSpPr>
-        <a:xfrm>
-          <a:off x="0" y="0"/>
-          <a:ext cx="0" cy="0"/>
-          <a:chOff x="0" y="0"/>
-          <a:chExt cx="0" cy="0"/>
-        </a:xfrm>
-      </p:grpSpPr>
-      <p:pic>
-        <p:nvPicPr>
-          <p:cNvPr id="4" name="Picture 3">
-            <a:extLst>
-              <a:ext uri="{FF2B5EF4-FFF2-40B4-BE49-F238E27FC236}">
-                <a16:creationId xmlns:a16="http://schemas.microsoft.com/office/drawing/2014/main" id="{B103EDB9-54CA-69B0-DC52-FE66B219F5AE}"/>
-              </a:ext>
-            </a:extLst>
-          </p:cNvPr>
-          <p:cNvPicPr>
-            <a:picLocks noChangeAspect="1"/>
-          </p:cNvPicPr>
-          <p:nvPr/>
-        </p:nvPicPr>
-        <p:blipFill>
-          <a:blip r:embed="rId2"/>
-          <a:stretch>
-            <a:fillRect/>
-          </a:stretch>
-        </p:blipFill>
-        <p:spPr>
-          <a:xfrm>
-            <a:off x="878548" y="1522582"/>
-            <a:ext cx="4061812" cy="3406435"/>
-          </a:xfrm>
-          <a:prstGeom prst="rect">
-            <a:avLst/>
-          </a:prstGeom>
-        </p:spPr>
-      </p:pic>
-      <p:sp>
-        <p:nvSpPr>
-          <p:cNvPr id="5" name="Rectangle: Rounded Corners 4">
-            <a:extLst>
-              <a:ext uri="{FF2B5EF4-FFF2-40B4-BE49-F238E27FC236}">
-                <a16:creationId xmlns:a16="http://schemas.microsoft.com/office/drawing/2014/main" id="{D8CE2272-6537-12DE-BB9F-CA0E5BEE3AC6}"/>
-              </a:ext>
-            </a:extLst>
-          </p:cNvPr>
-          <p:cNvSpPr/>
-          <p:nvPr/>
-        </p:nvSpPr>
-        <p:spPr>
-          <a:xfrm>
-            <a:off x="3158835" y="3807689"/>
-            <a:ext cx="1487055" cy="284020"/>
-          </a:xfrm>
-          <a:prstGeom prst="roundRect">
-            <a:avLst/>
-          </a:prstGeom>
-          <a:solidFill>
-            <a:srgbClr val="00B0F0"/>
-          </a:solidFill>
-          <a:ln>
-            <a:noFill/>
-          </a:ln>
-        </p:spPr>
-        <p:style>
-          <a:lnRef idx="2">
-            <a:schemeClr val="accent1">
-              <a:shade val="15000"/>
-            </a:schemeClr>
-          </a:lnRef>
-          <a:fillRef idx="1">
-            <a:schemeClr val="accent1"/>
-          </a:fillRef>
-          <a:effectRef idx="0">
-            <a:schemeClr val="accent1"/>
-          </a:effectRef>
-          <a:fontRef idx="minor">
-            <a:schemeClr val="lt1"/>
-          </a:fontRef>
-        </p:style>
-        <p:txBody>
-          <a:bodyPr rtlCol="0" anchor="ctr"/>
-          <a:lstStyle/>
-          <a:p>
-            <a:r>
-              <a:rPr lang="en-US" sz="1100" b="1">
-                <a:solidFill>
-                  <a:sysClr val="windowText" lastClr="000000"/>
-                </a:solidFill>
-              </a:rPr>
-              <a:t>Daftar akun Baru</a:t>
-            </a:r>
-          </a:p>
-        </p:txBody>
-      </p:sp>
-      <p:pic>
-        <p:nvPicPr>
-          <p:cNvPr id="10" name="Picture 9">
-            <a:extLst>
-              <a:ext uri="{FF2B5EF4-FFF2-40B4-BE49-F238E27FC236}">
-                <a16:creationId xmlns:a16="http://schemas.microsoft.com/office/drawing/2014/main" id="{C7B9FF38-6C90-712C-F20B-5E31EB518D00}"/>
-              </a:ext>
-            </a:extLst>
-          </p:cNvPr>
-          <p:cNvPicPr>
-            <a:picLocks noChangeAspect="1"/>
-          </p:cNvPicPr>
-          <p:nvPr/>
-        </p:nvPicPr>
-        <p:blipFill>
-          <a:blip r:embed="rId3"/>
-          <a:stretch>
-            <a:fillRect/>
-          </a:stretch>
-        </p:blipFill>
-        <p:spPr>
-          <a:xfrm>
-            <a:off x="6926177" y="1420982"/>
-            <a:ext cx="4206605" cy="3406435"/>
-          </a:xfrm>
-          <a:prstGeom prst="rect">
-            <a:avLst/>
-          </a:prstGeom>
-        </p:spPr>
-      </p:pic>
-      <p:sp>
-        <p:nvSpPr>
-          <p:cNvPr id="11" name="Rectangle 10">
-            <a:extLst>
-              <a:ext uri="{FF2B5EF4-FFF2-40B4-BE49-F238E27FC236}">
-                <a16:creationId xmlns:a16="http://schemas.microsoft.com/office/drawing/2014/main" id="{23691AEF-75E1-68DF-79B0-CCAC7194F27E}"/>
-              </a:ext>
-            </a:extLst>
-          </p:cNvPr>
-          <p:cNvSpPr/>
-          <p:nvPr/>
-        </p:nvSpPr>
-        <p:spPr>
-          <a:xfrm>
-            <a:off x="6998573" y="1631027"/>
-            <a:ext cx="3966607" cy="526472"/>
-          </a:xfrm>
-          <a:prstGeom prst="rect">
-            <a:avLst/>
-          </a:prstGeom>
-          <a:solidFill>
-            <a:srgbClr val="FFC000"/>
-          </a:solidFill>
-          <a:ln>
-            <a:noFill/>
-          </a:ln>
-        </p:spPr>
-        <p:style>
-          <a:lnRef idx="2">
-            <a:schemeClr val="accent1">
-              <a:shade val="15000"/>
-            </a:schemeClr>
-          </a:lnRef>
-          <a:fillRef idx="1">
-            <a:schemeClr val="accent1"/>
-          </a:fillRef>
-          <a:effectRef idx="0">
-            <a:schemeClr val="accent1"/>
-          </a:effectRef>
-          <a:fontRef idx="minor">
-            <a:schemeClr val="lt1"/>
-          </a:fontRef>
-        </p:style>
-        <p:txBody>
-          <a:bodyPr rtlCol="0" anchor="ctr"/>
-          <a:lstStyle/>
-          <a:p>
-            <a:pPr algn="ctr"/>
-            <a:r>
-              <a:rPr lang="en-US" sz="2000" b="1">
-                <a:solidFill>
-                  <a:sysClr val="windowText" lastClr="000000"/>
-                </a:solidFill>
-              </a:rPr>
-              <a:t>Login Peminjam</a:t>
-            </a:r>
-          </a:p>
-        </p:txBody>
-      </p:sp>
-    </p:spTree>
-    <p:extLst>
-      <p:ext uri="{BB962C8B-B14F-4D97-AF65-F5344CB8AC3E}">
-        <p14:creationId xmlns:p14="http://schemas.microsoft.com/office/powerpoint/2010/main" val="1323503123"/>
+        <p14:creationId xmlns:p14="http://schemas.microsoft.com/office/powerpoint/2010/main" val="1573759867"/>
       </p:ext>
     </p:extLst>
   </p:cSld>
@@ -5169,6 +5879,219 @@
       </p:grpSpPr>
       <p:pic>
         <p:nvPicPr>
+          <p:cNvPr id="4" name="Picture 3">
+            <a:extLst>
+              <a:ext uri="{FF2B5EF4-FFF2-40B4-BE49-F238E27FC236}">
+                <a16:creationId xmlns:a16="http://schemas.microsoft.com/office/drawing/2014/main" id="{B103EDB9-54CA-69B0-DC52-FE66B219F5AE}"/>
+              </a:ext>
+            </a:extLst>
+          </p:cNvPr>
+          <p:cNvPicPr>
+            <a:picLocks noChangeAspect="1"/>
+          </p:cNvPicPr>
+          <p:nvPr/>
+        </p:nvPicPr>
+        <p:blipFill>
+          <a:blip r:embed="rId2"/>
+          <a:stretch>
+            <a:fillRect/>
+          </a:stretch>
+        </p:blipFill>
+        <p:spPr>
+          <a:xfrm>
+            <a:off x="878548" y="1522582"/>
+            <a:ext cx="4061812" cy="3406435"/>
+          </a:xfrm>
+          <a:prstGeom prst="rect">
+            <a:avLst/>
+          </a:prstGeom>
+        </p:spPr>
+      </p:pic>
+      <p:sp>
+        <p:nvSpPr>
+          <p:cNvPr id="5" name="Rectangle: Rounded Corners 4">
+            <a:extLst>
+              <a:ext uri="{FF2B5EF4-FFF2-40B4-BE49-F238E27FC236}">
+                <a16:creationId xmlns:a16="http://schemas.microsoft.com/office/drawing/2014/main" id="{D8CE2272-6537-12DE-BB9F-CA0E5BEE3AC6}"/>
+              </a:ext>
+            </a:extLst>
+          </p:cNvPr>
+          <p:cNvSpPr/>
+          <p:nvPr/>
+        </p:nvSpPr>
+        <p:spPr>
+          <a:xfrm>
+            <a:off x="3158835" y="3807689"/>
+            <a:ext cx="1487055" cy="284020"/>
+          </a:xfrm>
+          <a:prstGeom prst="roundRect">
+            <a:avLst/>
+          </a:prstGeom>
+          <a:solidFill>
+            <a:srgbClr val="00B0F0"/>
+          </a:solidFill>
+          <a:ln>
+            <a:noFill/>
+          </a:ln>
+        </p:spPr>
+        <p:style>
+          <a:lnRef idx="2">
+            <a:schemeClr val="accent1">
+              <a:shade val="15000"/>
+            </a:schemeClr>
+          </a:lnRef>
+          <a:fillRef idx="1">
+            <a:schemeClr val="accent1"/>
+          </a:fillRef>
+          <a:effectRef idx="0">
+            <a:schemeClr val="accent1"/>
+          </a:effectRef>
+          <a:fontRef idx="minor">
+            <a:schemeClr val="lt1"/>
+          </a:fontRef>
+        </p:style>
+        <p:txBody>
+          <a:bodyPr rtlCol="0" anchor="ctr"/>
+          <a:lstStyle/>
+          <a:p>
+            <a:r>
+              <a:rPr lang="en-US" sz="1100" b="1">
+                <a:solidFill>
+                  <a:sysClr val="windowText" lastClr="000000"/>
+                </a:solidFill>
+              </a:rPr>
+              <a:t>Daftar akun Baru</a:t>
+            </a:r>
+          </a:p>
+        </p:txBody>
+      </p:sp>
+      <p:pic>
+        <p:nvPicPr>
+          <p:cNvPr id="10" name="Picture 9">
+            <a:extLst>
+              <a:ext uri="{FF2B5EF4-FFF2-40B4-BE49-F238E27FC236}">
+                <a16:creationId xmlns:a16="http://schemas.microsoft.com/office/drawing/2014/main" id="{C7B9FF38-6C90-712C-F20B-5E31EB518D00}"/>
+              </a:ext>
+            </a:extLst>
+          </p:cNvPr>
+          <p:cNvPicPr>
+            <a:picLocks noChangeAspect="1"/>
+          </p:cNvPicPr>
+          <p:nvPr/>
+        </p:nvPicPr>
+        <p:blipFill>
+          <a:blip r:embed="rId3"/>
+          <a:stretch>
+            <a:fillRect/>
+          </a:stretch>
+        </p:blipFill>
+        <p:spPr>
+          <a:xfrm>
+            <a:off x="6926177" y="1420982"/>
+            <a:ext cx="4206605" cy="3406435"/>
+          </a:xfrm>
+          <a:prstGeom prst="rect">
+            <a:avLst/>
+          </a:prstGeom>
+        </p:spPr>
+      </p:pic>
+      <p:sp>
+        <p:nvSpPr>
+          <p:cNvPr id="11" name="Rectangle 10">
+            <a:extLst>
+              <a:ext uri="{FF2B5EF4-FFF2-40B4-BE49-F238E27FC236}">
+                <a16:creationId xmlns:a16="http://schemas.microsoft.com/office/drawing/2014/main" id="{23691AEF-75E1-68DF-79B0-CCAC7194F27E}"/>
+              </a:ext>
+            </a:extLst>
+          </p:cNvPr>
+          <p:cNvSpPr/>
+          <p:nvPr/>
+        </p:nvSpPr>
+        <p:spPr>
+          <a:xfrm>
+            <a:off x="6998573" y="1631027"/>
+            <a:ext cx="3966607" cy="526472"/>
+          </a:xfrm>
+          <a:prstGeom prst="rect">
+            <a:avLst/>
+          </a:prstGeom>
+          <a:solidFill>
+            <a:srgbClr val="FFC000"/>
+          </a:solidFill>
+          <a:ln>
+            <a:noFill/>
+          </a:ln>
+        </p:spPr>
+        <p:style>
+          <a:lnRef idx="2">
+            <a:schemeClr val="accent1">
+              <a:shade val="15000"/>
+            </a:schemeClr>
+          </a:lnRef>
+          <a:fillRef idx="1">
+            <a:schemeClr val="accent1"/>
+          </a:fillRef>
+          <a:effectRef idx="0">
+            <a:schemeClr val="accent1"/>
+          </a:effectRef>
+          <a:fontRef idx="minor">
+            <a:schemeClr val="lt1"/>
+          </a:fontRef>
+        </p:style>
+        <p:txBody>
+          <a:bodyPr rtlCol="0" anchor="ctr"/>
+          <a:lstStyle/>
+          <a:p>
+            <a:pPr algn="ctr"/>
+            <a:r>
+              <a:rPr lang="en-US" sz="2000" b="1">
+                <a:solidFill>
+                  <a:sysClr val="windowText" lastClr="000000"/>
+                </a:solidFill>
+              </a:rPr>
+              <a:t>Login Peminjam</a:t>
+            </a:r>
+          </a:p>
+        </p:txBody>
+      </p:sp>
+    </p:spTree>
+    <p:extLst>
+      <p:ext uri="{BB962C8B-B14F-4D97-AF65-F5344CB8AC3E}">
+        <p14:creationId xmlns:p14="http://schemas.microsoft.com/office/powerpoint/2010/main" val="1323503123"/>
+      </p:ext>
+    </p:extLst>
+  </p:cSld>
+  <p:clrMapOvr>
+    <a:masterClrMapping/>
+  </p:clrMapOvr>
+</p:sld>
+</file>
+
+<file path=ppt/slides/slide4.xml><?xml version="1.0" encoding="utf-8"?>
+<p:sld xmlns:a="http://schemas.openxmlformats.org/drawingml/2006/main" xmlns:r="http://schemas.openxmlformats.org/officeDocument/2006/relationships" xmlns:p="http://schemas.openxmlformats.org/presentationml/2006/main">
+  <p:cSld>
+    <p:spTree>
+      <p:nvGrpSpPr>
+        <p:cNvPr id="1" name="">
+          <a:extLst>
+            <a:ext uri="{FF2B5EF4-FFF2-40B4-BE49-F238E27FC236}">
+              <a16:creationId xmlns:a16="http://schemas.microsoft.com/office/drawing/2014/main" id="{163110F5-6F6D-413E-FC99-133EC870DC5D}"/>
+            </a:ext>
+          </a:extLst>
+        </p:cNvPr>
+        <p:cNvGrpSpPr/>
+        <p:nvPr/>
+      </p:nvGrpSpPr>
+      <p:grpSpPr>
+        <a:xfrm>
+          <a:off x="0" y="0"/>
+          <a:ext cx="0" cy="0"/>
+          <a:chOff x="0" y="0"/>
+          <a:chExt cx="0" cy="0"/>
+        </a:xfrm>
+      </p:grpSpPr>
+      <p:pic>
+        <p:nvPicPr>
           <p:cNvPr id="6" name="Picture 5">
             <a:extLst>
               <a:ext uri="{FF2B5EF4-FFF2-40B4-BE49-F238E27FC236}">
@@ -5315,7 +6238,7 @@
 </p:sld>
 </file>
 
-<file path=ppt/slides/slide4.xml><?xml version="1.0" encoding="utf-8"?>
+<file path=ppt/slides/slide5.xml><?xml version="1.0" encoding="utf-8"?>
 <p:sld xmlns:a="http://schemas.openxmlformats.org/drawingml/2006/main" xmlns:r="http://schemas.openxmlformats.org/officeDocument/2006/relationships" xmlns:p="http://schemas.openxmlformats.org/presentationml/2006/main">
   <p:cSld>
     <p:spTree>
@@ -5503,7 +6426,7 @@
 </p:sld>
 </file>
 
-<file path=ppt/slides/slide5.xml><?xml version="1.0" encoding="utf-8"?>
+<file path=ppt/slides/slide6.xml><?xml version="1.0" encoding="utf-8"?>
 <p:sld xmlns:a="http://schemas.openxmlformats.org/drawingml/2006/main" xmlns:r="http://schemas.openxmlformats.org/officeDocument/2006/relationships" xmlns:p="http://schemas.openxmlformats.org/presentationml/2006/main">
   <p:cSld>
     <p:spTree>
@@ -5610,7 +6533,7 @@
 </p:sld>
 </file>
 
-<file path=ppt/slides/slide6.xml><?xml version="1.0" encoding="utf-8"?>
+<file path=ppt/slides/slide7.xml><?xml version="1.0" encoding="utf-8"?>
 <p:sld xmlns:a="http://schemas.openxmlformats.org/drawingml/2006/main" xmlns:r="http://schemas.openxmlformats.org/officeDocument/2006/relationships" xmlns:p="http://schemas.openxmlformats.org/presentationml/2006/main">
   <p:cSld>
     <p:spTree>
@@ -5727,102 +6650,6 @@
     <p:extLst>
       <p:ext uri="{BB962C8B-B14F-4D97-AF65-F5344CB8AC3E}">
         <p14:creationId xmlns:p14="http://schemas.microsoft.com/office/powerpoint/2010/main" val="2740473774"/>
-      </p:ext>
-    </p:extLst>
-  </p:cSld>
-  <p:clrMapOvr>
-    <a:masterClrMapping/>
-  </p:clrMapOvr>
-</p:sld>
-</file>
-
-<file path=ppt/slides/slide7.xml><?xml version="1.0" encoding="utf-8"?>
-<p:sld xmlns:a="http://schemas.openxmlformats.org/drawingml/2006/main" xmlns:r="http://schemas.openxmlformats.org/officeDocument/2006/relationships" xmlns:p="http://schemas.openxmlformats.org/presentationml/2006/main">
-  <p:cSld>
-    <p:spTree>
-      <p:nvGrpSpPr>
-        <p:cNvPr id="1" name="">
-          <a:extLst>
-            <a:ext uri="{FF2B5EF4-FFF2-40B4-BE49-F238E27FC236}">
-              <a16:creationId xmlns:a16="http://schemas.microsoft.com/office/drawing/2014/main" id="{163110F5-6F6D-413E-FC99-133EC870DC5D}"/>
-            </a:ext>
-          </a:extLst>
-        </p:cNvPr>
-        <p:cNvGrpSpPr/>
-        <p:nvPr/>
-      </p:nvGrpSpPr>
-      <p:grpSpPr>
-        <a:xfrm>
-          <a:off x="0" y="0"/>
-          <a:ext cx="0" cy="0"/>
-          <a:chOff x="0" y="0"/>
-          <a:chExt cx="0" cy="0"/>
-        </a:xfrm>
-      </p:grpSpPr>
-      <p:pic>
-        <p:nvPicPr>
-          <p:cNvPr id="3" name="Picture 2">
-            <a:extLst>
-              <a:ext uri="{FF2B5EF4-FFF2-40B4-BE49-F238E27FC236}">
-                <a16:creationId xmlns:a16="http://schemas.microsoft.com/office/drawing/2014/main" id="{B5E4C823-3076-E737-BD9C-9E1E0250C209}"/>
-              </a:ext>
-            </a:extLst>
-          </p:cNvPr>
-          <p:cNvPicPr>
-            <a:picLocks noChangeAspect="1"/>
-          </p:cNvPicPr>
-          <p:nvPr/>
-        </p:nvPicPr>
-        <p:blipFill>
-          <a:blip r:embed="rId2"/>
-          <a:stretch>
-            <a:fillRect/>
-          </a:stretch>
-        </p:blipFill>
-        <p:spPr>
-          <a:xfrm>
-            <a:off x="1834557" y="3690948"/>
-            <a:ext cx="7399788" cy="3028507"/>
-          </a:xfrm>
-          <a:prstGeom prst="rect">
-            <a:avLst/>
-          </a:prstGeom>
-        </p:spPr>
-      </p:pic>
-      <p:pic>
-        <p:nvPicPr>
-          <p:cNvPr id="7" name="Picture 6">
-            <a:extLst>
-              <a:ext uri="{FF2B5EF4-FFF2-40B4-BE49-F238E27FC236}">
-                <a16:creationId xmlns:a16="http://schemas.microsoft.com/office/drawing/2014/main" id="{04718C61-7734-8584-62FE-27EAA79A2988}"/>
-              </a:ext>
-            </a:extLst>
-          </p:cNvPr>
-          <p:cNvPicPr>
-            <a:picLocks noChangeAspect="1"/>
-          </p:cNvPicPr>
-          <p:nvPr/>
-        </p:nvPicPr>
-        <p:blipFill>
-          <a:blip r:embed="rId3"/>
-          <a:stretch>
-            <a:fillRect/>
-          </a:stretch>
-        </p:blipFill>
-        <p:spPr>
-          <a:xfrm>
-            <a:off x="1834557" y="138545"/>
-            <a:ext cx="7161661" cy="3018961"/>
-          </a:xfrm>
-          <a:prstGeom prst="rect">
-            <a:avLst/>
-          </a:prstGeom>
-        </p:spPr>
-      </p:pic>
-    </p:spTree>
-    <p:extLst>
-      <p:ext uri="{BB962C8B-B14F-4D97-AF65-F5344CB8AC3E}">
-        <p14:creationId xmlns:p14="http://schemas.microsoft.com/office/powerpoint/2010/main" val="3691796962"/>
       </p:ext>
     </p:extLst>
   </p:cSld>
@@ -5860,6 +6687,102 @@
           <p:cNvPr id="3" name="Picture 2">
             <a:extLst>
               <a:ext uri="{FF2B5EF4-FFF2-40B4-BE49-F238E27FC236}">
+                <a16:creationId xmlns:a16="http://schemas.microsoft.com/office/drawing/2014/main" id="{B5E4C823-3076-E737-BD9C-9E1E0250C209}"/>
+              </a:ext>
+            </a:extLst>
+          </p:cNvPr>
+          <p:cNvPicPr>
+            <a:picLocks noChangeAspect="1"/>
+          </p:cNvPicPr>
+          <p:nvPr/>
+        </p:nvPicPr>
+        <p:blipFill>
+          <a:blip r:embed="rId2"/>
+          <a:stretch>
+            <a:fillRect/>
+          </a:stretch>
+        </p:blipFill>
+        <p:spPr>
+          <a:xfrm>
+            <a:off x="1834557" y="3690948"/>
+            <a:ext cx="7399788" cy="3028507"/>
+          </a:xfrm>
+          <a:prstGeom prst="rect">
+            <a:avLst/>
+          </a:prstGeom>
+        </p:spPr>
+      </p:pic>
+      <p:pic>
+        <p:nvPicPr>
+          <p:cNvPr id="7" name="Picture 6">
+            <a:extLst>
+              <a:ext uri="{FF2B5EF4-FFF2-40B4-BE49-F238E27FC236}">
+                <a16:creationId xmlns:a16="http://schemas.microsoft.com/office/drawing/2014/main" id="{04718C61-7734-8584-62FE-27EAA79A2988}"/>
+              </a:ext>
+            </a:extLst>
+          </p:cNvPr>
+          <p:cNvPicPr>
+            <a:picLocks noChangeAspect="1"/>
+          </p:cNvPicPr>
+          <p:nvPr/>
+        </p:nvPicPr>
+        <p:blipFill>
+          <a:blip r:embed="rId3"/>
+          <a:stretch>
+            <a:fillRect/>
+          </a:stretch>
+        </p:blipFill>
+        <p:spPr>
+          <a:xfrm>
+            <a:off x="1834557" y="138545"/>
+            <a:ext cx="7161661" cy="3018961"/>
+          </a:xfrm>
+          <a:prstGeom prst="rect">
+            <a:avLst/>
+          </a:prstGeom>
+        </p:spPr>
+      </p:pic>
+    </p:spTree>
+    <p:extLst>
+      <p:ext uri="{BB962C8B-B14F-4D97-AF65-F5344CB8AC3E}">
+        <p14:creationId xmlns:p14="http://schemas.microsoft.com/office/powerpoint/2010/main" val="3691796962"/>
+      </p:ext>
+    </p:extLst>
+  </p:cSld>
+  <p:clrMapOvr>
+    <a:masterClrMapping/>
+  </p:clrMapOvr>
+</p:sld>
+</file>
+
+<file path=ppt/slides/slide9.xml><?xml version="1.0" encoding="utf-8"?>
+<p:sld xmlns:a="http://schemas.openxmlformats.org/drawingml/2006/main" xmlns:r="http://schemas.openxmlformats.org/officeDocument/2006/relationships" xmlns:p="http://schemas.openxmlformats.org/presentationml/2006/main">
+  <p:cSld>
+    <p:spTree>
+      <p:nvGrpSpPr>
+        <p:cNvPr id="1" name="">
+          <a:extLst>
+            <a:ext uri="{FF2B5EF4-FFF2-40B4-BE49-F238E27FC236}">
+              <a16:creationId xmlns:a16="http://schemas.microsoft.com/office/drawing/2014/main" id="{163110F5-6F6D-413E-FC99-133EC870DC5D}"/>
+            </a:ext>
+          </a:extLst>
+        </p:cNvPr>
+        <p:cNvGrpSpPr/>
+        <p:nvPr/>
+      </p:nvGrpSpPr>
+      <p:grpSpPr>
+        <a:xfrm>
+          <a:off x="0" y="0"/>
+          <a:ext cx="0" cy="0"/>
+          <a:chOff x="0" y="0"/>
+          <a:chExt cx="0" cy="0"/>
+        </a:xfrm>
+      </p:grpSpPr>
+      <p:pic>
+        <p:nvPicPr>
+          <p:cNvPr id="3" name="Picture 2">
+            <a:extLst>
+              <a:ext uri="{FF2B5EF4-FFF2-40B4-BE49-F238E27FC236}">
                 <a16:creationId xmlns:a16="http://schemas.microsoft.com/office/drawing/2014/main" id="{06022873-A011-166D-D2A3-D51EE18559D6}"/>
               </a:ext>
             </a:extLst>
@@ -6009,102 +6932,6 @@
     <p:extLst>
       <p:ext uri="{BB962C8B-B14F-4D97-AF65-F5344CB8AC3E}">
         <p14:creationId xmlns:p14="http://schemas.microsoft.com/office/powerpoint/2010/main" val="1654078093"/>
-      </p:ext>
-    </p:extLst>
-  </p:cSld>
-  <p:clrMapOvr>
-    <a:masterClrMapping/>
-  </p:clrMapOvr>
-</p:sld>
-</file>
-
-<file path=ppt/slides/slide9.xml><?xml version="1.0" encoding="utf-8"?>
-<p:sld xmlns:a="http://schemas.openxmlformats.org/drawingml/2006/main" xmlns:r="http://schemas.openxmlformats.org/officeDocument/2006/relationships" xmlns:p="http://schemas.openxmlformats.org/presentationml/2006/main">
-  <p:cSld>
-    <p:spTree>
-      <p:nvGrpSpPr>
-        <p:cNvPr id="1" name="">
-          <a:extLst>
-            <a:ext uri="{FF2B5EF4-FFF2-40B4-BE49-F238E27FC236}">
-              <a16:creationId xmlns:a16="http://schemas.microsoft.com/office/drawing/2014/main" id="{613E1468-512E-D483-8B23-3F382B04231B}"/>
-            </a:ext>
-          </a:extLst>
-        </p:cNvPr>
-        <p:cNvGrpSpPr/>
-        <p:nvPr/>
-      </p:nvGrpSpPr>
-      <p:grpSpPr>
-        <a:xfrm>
-          <a:off x="0" y="0"/>
-          <a:ext cx="0" cy="0"/>
-          <a:chOff x="0" y="0"/>
-          <a:chExt cx="0" cy="0"/>
-        </a:xfrm>
-      </p:grpSpPr>
-      <p:pic>
-        <p:nvPicPr>
-          <p:cNvPr id="18" name="Picture 17">
-            <a:extLst>
-              <a:ext uri="{FF2B5EF4-FFF2-40B4-BE49-F238E27FC236}">
-                <a16:creationId xmlns:a16="http://schemas.microsoft.com/office/drawing/2014/main" id="{596D81BC-4A09-9F46-92CD-B86B0CCEEA35}"/>
-              </a:ext>
-            </a:extLst>
-          </p:cNvPr>
-          <p:cNvPicPr>
-            <a:picLocks noChangeAspect="1"/>
-          </p:cNvPicPr>
-          <p:nvPr/>
-        </p:nvPicPr>
-        <p:blipFill>
-          <a:blip r:embed="rId3"/>
-          <a:stretch>
-            <a:fillRect/>
-          </a:stretch>
-        </p:blipFill>
-        <p:spPr>
-          <a:xfrm>
-            <a:off x="1167800" y="397769"/>
-            <a:ext cx="9856400" cy="4561693"/>
-          </a:xfrm>
-          <a:prstGeom prst="rect">
-            <a:avLst/>
-          </a:prstGeom>
-        </p:spPr>
-      </p:pic>
-      <p:pic>
-        <p:nvPicPr>
-          <p:cNvPr id="20" name="Picture 19">
-            <a:extLst>
-              <a:ext uri="{FF2B5EF4-FFF2-40B4-BE49-F238E27FC236}">
-                <a16:creationId xmlns:a16="http://schemas.microsoft.com/office/drawing/2014/main" id="{ADCD799A-D444-D2C4-64C8-E5350B9EFC61}"/>
-              </a:ext>
-            </a:extLst>
-          </p:cNvPr>
-          <p:cNvPicPr>
-            <a:picLocks noChangeAspect="1"/>
-          </p:cNvPicPr>
-          <p:nvPr/>
-        </p:nvPicPr>
-        <p:blipFill>
-          <a:blip r:embed="rId4"/>
-          <a:stretch>
-            <a:fillRect/>
-          </a:stretch>
-        </p:blipFill>
-        <p:spPr>
-          <a:xfrm>
-            <a:off x="3064213" y="4959462"/>
-            <a:ext cx="7855704" cy="1711704"/>
-          </a:xfrm>
-          <a:prstGeom prst="rect">
-            <a:avLst/>
-          </a:prstGeom>
-        </p:spPr>
-      </p:pic>
-    </p:spTree>
-    <p:extLst>
-      <p:ext uri="{BB962C8B-B14F-4D97-AF65-F5344CB8AC3E}">
-        <p14:creationId xmlns:p14="http://schemas.microsoft.com/office/powerpoint/2010/main" val="1649722496"/>
       </p:ext>
     </p:extLst>
   </p:cSld>

</xml_diff>